<commit_message>
change dataset name and also updated doc
</commit_message>
<xml_diff>
--- a/CheckpointII/Lab04-PresentationTemplate.pptx
+++ b/CheckpointII/Lab04-PresentationTemplate.pptx
@@ -126,7 +126,7 @@
   </p:defaultTextStyle>
   <p:extLst>
     <p:ext uri="{EFAFB233-063F-42B5-8137-9DF3F51BA10A}">
-      <p15:sldGuideLst xmlns:p15="http://schemas.microsoft.com/office/powerpoint/2012/main" xmlns="">
+      <p15:sldGuideLst xmlns:p15="http://schemas.microsoft.com/office/powerpoint/2012/main">
         <p15:guide id="1" orient="horz" pos="2160">
           <p15:clr>
             <a:srgbClr val="A4A3A4"/>
@@ -225,7 +225,7 @@
           <a:p>
             <a:fld id="{745C36E7-9E00-462E-80A3-32F2BE615C7A}" type="datetimeFigureOut">
               <a:rPr lang="en-US" smtClean="0"/>
-              <a:t>12/10/15</a:t>
+              <a:t>15-Oct-19</a:t>
             </a:fld>
             <a:endParaRPr lang="en-US"/>
           </a:p>
@@ -291,7 +291,7 @@
           <a:p>
             <a:fld id="{C7B702CB-D988-47C5-8204-95032A6A7C26}" type="slidenum">
               <a:rPr lang="en-US" smtClean="0"/>
-              <a:t>‹#›</a:t>
+              <a:t>‹nº›</a:t>
             </a:fld>
             <a:endParaRPr lang="en-US"/>
           </a:p>
@@ -391,7 +391,7 @@
             <a:fld id="{01F3E309-ED8D-4193-99AF-E5EA90965E98}" type="datetimeFigureOut">
               <a:rPr lang="en-US" smtClean="0"/>
               <a:pPr/>
-              <a:t>12/10/15</a:t>
+              <a:t>15-Oct-19</a:t>
             </a:fld>
             <a:endParaRPr lang="en-US"/>
           </a:p>
@@ -457,38 +457,37 @@
           <a:p>
             <a:pPr lvl="0"/>
             <a:r>
-              <a:rPr lang="en-US" smtClean="0"/>
+              <a:rPr lang="en-US"/>
               <a:t>Click to edit Master text styles</a:t>
             </a:r>
           </a:p>
           <a:p>
             <a:pPr lvl="1"/>
             <a:r>
-              <a:rPr lang="en-US" smtClean="0"/>
+              <a:rPr lang="en-US"/>
               <a:t>Second level</a:t>
             </a:r>
           </a:p>
           <a:p>
             <a:pPr lvl="2"/>
             <a:r>
-              <a:rPr lang="en-US" smtClean="0"/>
+              <a:rPr lang="en-US"/>
               <a:t>Third level</a:t>
             </a:r>
           </a:p>
           <a:p>
             <a:pPr lvl="3"/>
             <a:r>
-              <a:rPr lang="en-US" smtClean="0"/>
+              <a:rPr lang="en-US"/>
               <a:t>Fourth level</a:t>
             </a:r>
           </a:p>
           <a:p>
             <a:pPr lvl="4"/>
             <a:r>
-              <a:rPr lang="en-US" smtClean="0"/>
+              <a:rPr lang="en-US"/>
               <a:t>Fifth level</a:t>
             </a:r>
-            <a:endParaRPr lang="en-US"/>
           </a:p>
         </p:txBody>
       </p:sp>
@@ -553,7 +552,7 @@
             <a:fld id="{F535F173-C1DD-4975-94BF-5B9ED67F7674}" type="slidenum">
               <a:rPr lang="en-US" smtClean="0"/>
               <a:pPr/>
-              <a:t>‹#›</a:t>
+              <a:t>‹nº›</a:t>
             </a:fld>
             <a:endParaRPr lang="en-US"/>
           </a:p>
@@ -706,7 +705,7 @@
           <a:bodyPr/>
           <a:lstStyle/>
           <a:p>
-            <a:endParaRPr lang="en-US" baseline="0" dirty="0" smtClean="0"/>
+            <a:endParaRPr lang="en-US" baseline="0" dirty="0"/>
           </a:p>
         </p:txBody>
       </p:sp>
@@ -791,7 +790,7 @@
           <a:bodyPr/>
           <a:lstStyle/>
           <a:p>
-            <a:endParaRPr lang="en-US" baseline="0" dirty="0" smtClean="0"/>
+            <a:endParaRPr lang="en-US" baseline="0" dirty="0"/>
           </a:p>
         </p:txBody>
       </p:sp>
@@ -876,7 +875,7 @@
           <a:bodyPr/>
           <a:lstStyle/>
           <a:p>
-            <a:endParaRPr lang="en-US" baseline="0" dirty="0" smtClean="0"/>
+            <a:endParaRPr lang="en-US" baseline="0" dirty="0"/>
           </a:p>
         </p:txBody>
       </p:sp>
@@ -961,7 +960,7 @@
           <a:bodyPr/>
           <a:lstStyle/>
           <a:p>
-            <a:endParaRPr lang="en-US" baseline="0" dirty="0" smtClean="0"/>
+            <a:endParaRPr lang="en-US" baseline="0" dirty="0"/>
           </a:p>
         </p:txBody>
       </p:sp>
@@ -1046,7 +1045,7 @@
           <a:bodyPr/>
           <a:lstStyle/>
           <a:p>
-            <a:endParaRPr lang="en-US" baseline="0" dirty="0" smtClean="0"/>
+            <a:endParaRPr lang="en-US" baseline="0" dirty="0"/>
           </a:p>
         </p:txBody>
       </p:sp>
@@ -1131,7 +1130,7 @@
           <a:bodyPr/>
           <a:lstStyle/>
           <a:p>
-            <a:endParaRPr lang="en-US" baseline="0" dirty="0" smtClean="0"/>
+            <a:endParaRPr lang="en-US" baseline="0" dirty="0"/>
           </a:p>
         </p:txBody>
       </p:sp>
@@ -1216,7 +1215,7 @@
           <a:bodyPr/>
           <a:lstStyle/>
           <a:p>
-            <a:endParaRPr lang="en-US" baseline="0" dirty="0" smtClean="0"/>
+            <a:endParaRPr lang="en-US" baseline="0" dirty="0"/>
           </a:p>
         </p:txBody>
       </p:sp>
@@ -1301,7 +1300,7 @@
           <a:bodyPr/>
           <a:lstStyle/>
           <a:p>
-            <a:endParaRPr lang="en-US" baseline="0" dirty="0" smtClean="0"/>
+            <a:endParaRPr lang="en-US" baseline="0" dirty="0"/>
           </a:p>
         </p:txBody>
       </p:sp>
@@ -1386,7 +1385,7 @@
           <a:bodyPr/>
           <a:lstStyle/>
           <a:p>
-            <a:endParaRPr lang="en-US" baseline="0" dirty="0" smtClean="0"/>
+            <a:endParaRPr lang="en-US" baseline="0" dirty="0"/>
           </a:p>
         </p:txBody>
       </p:sp>
@@ -1504,7 +1503,7 @@
           <a:lstStyle/>
           <a:p>
             <a:r>
-              <a:rPr lang="en-US" smtClean="0"/>
+              <a:rPr lang="en-US"/>
               <a:t>Click to edit Master title style</a:t>
             </a:r>
             <a:endParaRPr lang="pt-PT" dirty="0"/>
@@ -1577,7 +1576,7 @@
           <a:p>
             <a:pPr lvl="0"/>
             <a:r>
-              <a:rPr lang="en-US" smtClean="0"/>
+              <a:rPr lang="en-US"/>
               <a:t>Click to edit Master text styles</a:t>
             </a:r>
           </a:p>
@@ -1624,7 +1623,7 @@
           <a:lstStyle/>
           <a:p>
             <a:r>
-              <a:rPr lang="en-US" smtClean="0"/>
+              <a:rPr lang="en-US"/>
               <a:t>Click to edit Master title style</a:t>
             </a:r>
             <a:endParaRPr lang="pt-PT"/>
@@ -1648,35 +1647,35 @@
           <a:p>
             <a:pPr lvl="0"/>
             <a:r>
-              <a:rPr lang="en-US" smtClean="0"/>
+              <a:rPr lang="en-US"/>
               <a:t>Click to edit Master text styles</a:t>
             </a:r>
           </a:p>
           <a:p>
             <a:pPr lvl="1"/>
             <a:r>
-              <a:rPr lang="en-US" smtClean="0"/>
+              <a:rPr lang="en-US"/>
               <a:t>Second level</a:t>
             </a:r>
           </a:p>
           <a:p>
             <a:pPr lvl="2"/>
             <a:r>
-              <a:rPr lang="en-US" smtClean="0"/>
+              <a:rPr lang="en-US"/>
               <a:t>Third level</a:t>
             </a:r>
           </a:p>
           <a:p>
             <a:pPr lvl="3"/>
             <a:r>
-              <a:rPr lang="en-US" smtClean="0"/>
+              <a:rPr lang="en-US"/>
               <a:t>Fourth level</a:t>
             </a:r>
           </a:p>
           <a:p>
             <a:pPr lvl="4"/>
             <a:r>
-              <a:rPr lang="en-US" smtClean="0"/>
+              <a:rPr lang="en-US"/>
               <a:t>Fifth level</a:t>
             </a:r>
             <a:endParaRPr lang="pt-PT"/>
@@ -1729,7 +1728,7 @@
           <a:lstStyle/>
           <a:p>
             <a:r>
-              <a:rPr lang="en-US" smtClean="0"/>
+              <a:rPr lang="en-US"/>
               <a:t>Click to edit Master title style</a:t>
             </a:r>
             <a:endParaRPr lang="pt-PT"/>
@@ -1758,35 +1757,35 @@
           <a:p>
             <a:pPr lvl="0"/>
             <a:r>
-              <a:rPr lang="en-US" smtClean="0"/>
+              <a:rPr lang="en-US"/>
               <a:t>Click to edit Master text styles</a:t>
             </a:r>
           </a:p>
           <a:p>
             <a:pPr lvl="1"/>
             <a:r>
-              <a:rPr lang="en-US" smtClean="0"/>
+              <a:rPr lang="en-US"/>
               <a:t>Second level</a:t>
             </a:r>
           </a:p>
           <a:p>
             <a:pPr lvl="2"/>
             <a:r>
-              <a:rPr lang="en-US" smtClean="0"/>
+              <a:rPr lang="en-US"/>
               <a:t>Third level</a:t>
             </a:r>
           </a:p>
           <a:p>
             <a:pPr lvl="3"/>
             <a:r>
-              <a:rPr lang="en-US" smtClean="0"/>
+              <a:rPr lang="en-US"/>
               <a:t>Fourth level</a:t>
             </a:r>
           </a:p>
           <a:p>
             <a:pPr lvl="4"/>
             <a:r>
-              <a:rPr lang="en-US" smtClean="0"/>
+              <a:rPr lang="en-US"/>
               <a:t>Fifth level</a:t>
             </a:r>
             <a:endParaRPr lang="pt-PT"/>
@@ -1834,7 +1833,7 @@
           <a:lstStyle/>
           <a:p>
             <a:r>
-              <a:rPr lang="en-US" smtClean="0"/>
+              <a:rPr lang="en-US"/>
               <a:t>Click to edit Master title style</a:t>
             </a:r>
             <a:endParaRPr lang="pt-PT"/>
@@ -1858,35 +1857,35 @@
           <a:p>
             <a:pPr lvl="0"/>
             <a:r>
-              <a:rPr lang="en-US" smtClean="0"/>
+              <a:rPr lang="en-US"/>
               <a:t>Click to edit Master text styles</a:t>
             </a:r>
           </a:p>
           <a:p>
             <a:pPr lvl="1"/>
             <a:r>
-              <a:rPr lang="en-US" smtClean="0"/>
+              <a:rPr lang="en-US"/>
               <a:t>Second level</a:t>
             </a:r>
           </a:p>
           <a:p>
             <a:pPr lvl="2"/>
             <a:r>
-              <a:rPr lang="en-US" smtClean="0"/>
+              <a:rPr lang="en-US"/>
               <a:t>Third level</a:t>
             </a:r>
           </a:p>
           <a:p>
             <a:pPr lvl="3"/>
             <a:r>
-              <a:rPr lang="en-US" smtClean="0"/>
+              <a:rPr lang="en-US"/>
               <a:t>Fourth level</a:t>
             </a:r>
           </a:p>
           <a:p>
             <a:pPr lvl="4"/>
             <a:r>
-              <a:rPr lang="en-US" smtClean="0"/>
+              <a:rPr lang="en-US"/>
               <a:t>Fifth level</a:t>
             </a:r>
             <a:endParaRPr lang="pt-PT" dirty="0"/>
@@ -1919,7 +1918,7 @@
             <a:fld id="{F3CC9924-33BC-4796-B0F9-D37DB5D899BF}" type="datetimeFigureOut">
               <a:rPr lang="pt-PT" smtClean="0"/>
               <a:pPr/>
-              <a:t>12/10/15</a:t>
+              <a:t>15/10/2019</a:t>
             </a:fld>
             <a:endParaRPr lang="pt-PT"/>
           </a:p>
@@ -1978,7 +1977,7 @@
             <a:fld id="{B5EBF8D4-C87A-47B7-9996-84452461937B}" type="slidenum">
               <a:rPr lang="pt-PT" smtClean="0"/>
               <a:pPr/>
-              <a:t>‹#›</a:t>
+              <a:t>‹nº›</a:t>
             </a:fld>
             <a:endParaRPr lang="pt-PT"/>
           </a:p>
@@ -2036,7 +2035,7 @@
           <a:p>
             <a:pPr lvl="0"/>
             <a:r>
-              <a:rPr lang="en-US" smtClean="0"/>
+              <a:rPr lang="en-US"/>
               <a:t>Click to edit Master text styles</a:t>
             </a:r>
           </a:p>
@@ -2108,7 +2107,7 @@
           <a:p>
             <a:pPr lvl="0"/>
             <a:r>
-              <a:rPr lang="en-US" smtClean="0"/>
+              <a:rPr lang="en-US"/>
               <a:t>Click to edit Master text styles</a:t>
             </a:r>
           </a:p>
@@ -2150,7 +2149,7 @@
           </a:lstStyle>
           <a:p>
             <a:r>
-              <a:rPr lang="en-US" smtClean="0"/>
+              <a:rPr lang="en-US"/>
               <a:t>Click to edit Master title style</a:t>
             </a:r>
             <a:endParaRPr lang="pt-PT" dirty="0"/>
@@ -2198,7 +2197,7 @@
           <a:lstStyle/>
           <a:p>
             <a:r>
-              <a:rPr lang="en-US" smtClean="0"/>
+              <a:rPr lang="en-US"/>
               <a:t>Click to edit Master title style</a:t>
             </a:r>
             <a:endParaRPr lang="pt-PT"/>
@@ -2255,35 +2254,35 @@
           <a:p>
             <a:pPr lvl="0"/>
             <a:r>
-              <a:rPr lang="en-US" smtClean="0"/>
+              <a:rPr lang="en-US"/>
               <a:t>Click to edit Master text styles</a:t>
             </a:r>
           </a:p>
           <a:p>
             <a:pPr lvl="1"/>
             <a:r>
-              <a:rPr lang="en-US" smtClean="0"/>
+              <a:rPr lang="en-US"/>
               <a:t>Second level</a:t>
             </a:r>
           </a:p>
           <a:p>
             <a:pPr lvl="2"/>
             <a:r>
-              <a:rPr lang="en-US" smtClean="0"/>
+              <a:rPr lang="en-US"/>
               <a:t>Third level</a:t>
             </a:r>
           </a:p>
           <a:p>
             <a:pPr lvl="3"/>
             <a:r>
-              <a:rPr lang="en-US" smtClean="0"/>
+              <a:rPr lang="en-US"/>
               <a:t>Fourth level</a:t>
             </a:r>
           </a:p>
           <a:p>
             <a:pPr lvl="4"/>
             <a:r>
-              <a:rPr lang="en-US" smtClean="0"/>
+              <a:rPr lang="en-US"/>
               <a:t>Fifth level</a:t>
             </a:r>
             <a:endParaRPr lang="pt-PT"/>
@@ -2340,35 +2339,35 @@
           <a:p>
             <a:pPr lvl="0"/>
             <a:r>
-              <a:rPr lang="en-US" smtClean="0"/>
+              <a:rPr lang="en-US"/>
               <a:t>Click to edit Master text styles</a:t>
             </a:r>
           </a:p>
           <a:p>
             <a:pPr lvl="1"/>
             <a:r>
-              <a:rPr lang="en-US" smtClean="0"/>
+              <a:rPr lang="en-US"/>
               <a:t>Second level</a:t>
             </a:r>
           </a:p>
           <a:p>
             <a:pPr lvl="2"/>
             <a:r>
-              <a:rPr lang="en-US" smtClean="0"/>
+              <a:rPr lang="en-US"/>
               <a:t>Third level</a:t>
             </a:r>
           </a:p>
           <a:p>
             <a:pPr lvl="3"/>
             <a:r>
-              <a:rPr lang="en-US" smtClean="0"/>
+              <a:rPr lang="en-US"/>
               <a:t>Fourth level</a:t>
             </a:r>
           </a:p>
           <a:p>
             <a:pPr lvl="4"/>
             <a:r>
-              <a:rPr lang="en-US" smtClean="0"/>
+              <a:rPr lang="en-US"/>
               <a:t>Fifth level</a:t>
             </a:r>
             <a:endParaRPr lang="pt-PT"/>
@@ -2420,7 +2419,7 @@
           </a:lstStyle>
           <a:p>
             <a:r>
-              <a:rPr lang="en-US" smtClean="0"/>
+              <a:rPr lang="en-US"/>
               <a:t>Click to edit Master title style</a:t>
             </a:r>
             <a:endParaRPr lang="pt-PT"/>
@@ -2486,7 +2485,7 @@
           <a:p>
             <a:pPr lvl="0"/>
             <a:r>
-              <a:rPr lang="en-US" smtClean="0"/>
+              <a:rPr lang="en-US"/>
               <a:t>Click to edit Master text styles</a:t>
             </a:r>
           </a:p>
@@ -2542,35 +2541,35 @@
           <a:p>
             <a:pPr lvl="0"/>
             <a:r>
-              <a:rPr lang="en-US" smtClean="0"/>
+              <a:rPr lang="en-US"/>
               <a:t>Click to edit Master text styles</a:t>
             </a:r>
           </a:p>
           <a:p>
             <a:pPr lvl="1"/>
             <a:r>
-              <a:rPr lang="en-US" smtClean="0"/>
+              <a:rPr lang="en-US"/>
               <a:t>Second level</a:t>
             </a:r>
           </a:p>
           <a:p>
             <a:pPr lvl="2"/>
             <a:r>
-              <a:rPr lang="en-US" smtClean="0"/>
+              <a:rPr lang="en-US"/>
               <a:t>Third level</a:t>
             </a:r>
           </a:p>
           <a:p>
             <a:pPr lvl="3"/>
             <a:r>
-              <a:rPr lang="en-US" smtClean="0"/>
+              <a:rPr lang="en-US"/>
               <a:t>Fourth level</a:t>
             </a:r>
           </a:p>
           <a:p>
             <a:pPr lvl="4"/>
             <a:r>
-              <a:rPr lang="en-US" smtClean="0"/>
+              <a:rPr lang="en-US"/>
               <a:t>Fifth level</a:t>
             </a:r>
             <a:endParaRPr lang="pt-PT"/>
@@ -2636,7 +2635,7 @@
           <a:p>
             <a:pPr lvl="0"/>
             <a:r>
-              <a:rPr lang="en-US" smtClean="0"/>
+              <a:rPr lang="en-US"/>
               <a:t>Click to edit Master text styles</a:t>
             </a:r>
           </a:p>
@@ -2692,35 +2691,35 @@
           <a:p>
             <a:pPr lvl="0"/>
             <a:r>
-              <a:rPr lang="en-US" smtClean="0"/>
+              <a:rPr lang="en-US"/>
               <a:t>Click to edit Master text styles</a:t>
             </a:r>
           </a:p>
           <a:p>
             <a:pPr lvl="1"/>
             <a:r>
-              <a:rPr lang="en-US" smtClean="0"/>
+              <a:rPr lang="en-US"/>
               <a:t>Second level</a:t>
             </a:r>
           </a:p>
           <a:p>
             <a:pPr lvl="2"/>
             <a:r>
-              <a:rPr lang="en-US" smtClean="0"/>
+              <a:rPr lang="en-US"/>
               <a:t>Third level</a:t>
             </a:r>
           </a:p>
           <a:p>
             <a:pPr lvl="3"/>
             <a:r>
-              <a:rPr lang="en-US" smtClean="0"/>
+              <a:rPr lang="en-US"/>
               <a:t>Fourth level</a:t>
             </a:r>
           </a:p>
           <a:p>
             <a:pPr lvl="4"/>
             <a:r>
-              <a:rPr lang="en-US" smtClean="0"/>
+              <a:rPr lang="en-US"/>
               <a:t>Fifth level</a:t>
             </a:r>
             <a:endParaRPr lang="pt-PT"/>
@@ -2768,7 +2767,7 @@
           <a:lstStyle/>
           <a:p>
             <a:r>
-              <a:rPr lang="en-US" smtClean="0"/>
+              <a:rPr lang="en-US"/>
               <a:t>Click to edit Master title style</a:t>
             </a:r>
             <a:endParaRPr lang="pt-PT"/>
@@ -2850,7 +2849,7 @@
           </a:lstStyle>
           <a:p>
             <a:r>
-              <a:rPr lang="en-US" smtClean="0"/>
+              <a:rPr lang="en-US"/>
               <a:t>Click to edit Master title style</a:t>
             </a:r>
             <a:endParaRPr lang="pt-PT" dirty="0"/>
@@ -2907,35 +2906,35 @@
           <a:p>
             <a:pPr lvl="0"/>
             <a:r>
-              <a:rPr lang="en-US" smtClean="0"/>
+              <a:rPr lang="en-US"/>
               <a:t>Click to edit Master text styles</a:t>
             </a:r>
           </a:p>
           <a:p>
             <a:pPr lvl="1"/>
             <a:r>
-              <a:rPr lang="en-US" smtClean="0"/>
+              <a:rPr lang="en-US"/>
               <a:t>Second level</a:t>
             </a:r>
           </a:p>
           <a:p>
             <a:pPr lvl="2"/>
             <a:r>
-              <a:rPr lang="en-US" smtClean="0"/>
+              <a:rPr lang="en-US"/>
               <a:t>Third level</a:t>
             </a:r>
           </a:p>
           <a:p>
             <a:pPr lvl="3"/>
             <a:r>
-              <a:rPr lang="en-US" smtClean="0"/>
+              <a:rPr lang="en-US"/>
               <a:t>Fourth level</a:t>
             </a:r>
           </a:p>
           <a:p>
             <a:pPr lvl="4"/>
             <a:r>
-              <a:rPr lang="en-US" smtClean="0"/>
+              <a:rPr lang="en-US"/>
               <a:t>Fifth level</a:t>
             </a:r>
             <a:endParaRPr lang="pt-PT"/>
@@ -3001,7 +3000,7 @@
           <a:p>
             <a:pPr lvl="0"/>
             <a:r>
-              <a:rPr lang="en-US" smtClean="0"/>
+              <a:rPr lang="en-US"/>
               <a:t>Click to edit Master text styles</a:t>
             </a:r>
           </a:p>
@@ -3057,7 +3056,7 @@
           </a:lstStyle>
           <a:p>
             <a:r>
-              <a:rPr lang="en-US" smtClean="0"/>
+              <a:rPr lang="en-US"/>
               <a:t>Click to edit Master title style</a:t>
             </a:r>
             <a:endParaRPr lang="pt-PT"/>
@@ -3122,7 +3121,7 @@
           </a:lstStyle>
           <a:p>
             <a:r>
-              <a:rPr lang="en-US" smtClean="0"/>
+              <a:rPr lang="en-US"/>
               <a:t>Click icon to add picture</a:t>
             </a:r>
             <a:endParaRPr lang="pt-PT"/>
@@ -3188,7 +3187,7 @@
           <a:p>
             <a:pPr lvl="0"/>
             <a:r>
-              <a:rPr lang="en-US" smtClean="0"/>
+              <a:rPr lang="en-US"/>
               <a:t>Click to edit Master text styles</a:t>
             </a:r>
           </a:p>
@@ -3253,7 +3252,7 @@
           <a:lstStyle/>
           <a:p>
             <a:r>
-              <a:rPr lang="en-US" smtClean="0"/>
+              <a:rPr lang="en-US"/>
               <a:t>Click to edit Master title style</a:t>
             </a:r>
             <a:endParaRPr lang="pt-PT" dirty="0"/>
@@ -3287,35 +3286,35 @@
           <a:p>
             <a:pPr lvl="0"/>
             <a:r>
-              <a:rPr lang="en-US" smtClean="0"/>
+              <a:rPr lang="en-US"/>
               <a:t>Click to edit Master text styles</a:t>
             </a:r>
           </a:p>
           <a:p>
             <a:pPr lvl="1"/>
             <a:r>
-              <a:rPr lang="en-US" smtClean="0"/>
+              <a:rPr lang="en-US"/>
               <a:t>Second level</a:t>
             </a:r>
           </a:p>
           <a:p>
             <a:pPr lvl="2"/>
             <a:r>
-              <a:rPr lang="en-US" smtClean="0"/>
+              <a:rPr lang="en-US"/>
               <a:t>Third level</a:t>
             </a:r>
           </a:p>
           <a:p>
             <a:pPr lvl="3"/>
             <a:r>
-              <a:rPr lang="en-US" smtClean="0"/>
+              <a:rPr lang="en-US"/>
               <a:t>Fourth level</a:t>
             </a:r>
           </a:p>
           <a:p>
             <a:pPr lvl="4"/>
             <a:r>
-              <a:rPr lang="en-US" smtClean="0"/>
+              <a:rPr lang="en-US"/>
               <a:t>Fifth level</a:t>
             </a:r>
             <a:endParaRPr lang="pt-PT" dirty="0"/>
@@ -3642,50 +3641,46 @@
           <a:p>
             <a:pPr algn="ctr"/>
             <a:r>
-              <a:rPr lang="pt-PT" sz="4800" b="1" dirty="0" err="1" smtClean="0"/>
+              <a:rPr lang="pt-PT" sz="4800" b="1" dirty="0" err="1"/>
               <a:t>Information</a:t>
             </a:r>
             <a:r>
-              <a:rPr lang="pt-PT" sz="4800" b="1" dirty="0" smtClean="0"/>
+              <a:rPr lang="pt-PT" sz="4800" b="1" dirty="0"/>
               <a:t> </a:t>
             </a:r>
             <a:r>
-              <a:rPr lang="pt-PT" sz="4800" b="1" dirty="0" err="1" smtClean="0"/>
+              <a:rPr lang="pt-PT" sz="4800" b="1" dirty="0" err="1"/>
               <a:t>Visualization</a:t>
             </a:r>
-            <a:r>
-              <a:rPr lang="pt-PT" sz="4800" b="1" dirty="0" smtClean="0"/>
-              <a:t/>
-            </a:r>
             <a:br>
-              <a:rPr lang="pt-PT" sz="4800" b="1" dirty="0" smtClean="0"/>
+              <a:rPr lang="pt-PT" sz="4800" b="1" dirty="0"/>
             </a:br>
             <a:r>
-              <a:rPr lang="pt-PT" sz="4800" dirty="0" err="1" smtClean="0"/>
+              <a:rPr lang="pt-PT" sz="4800" dirty="0" err="1"/>
               <a:t>Project</a:t>
             </a:r>
             <a:r>
-              <a:rPr lang="pt-PT" sz="4800" dirty="0" smtClean="0"/>
+              <a:rPr lang="pt-PT" sz="4800" dirty="0"/>
               <a:t> </a:t>
             </a:r>
             <a:r>
-              <a:rPr lang="pt-PT" sz="4800" dirty="0" err="1" smtClean="0"/>
+              <a:rPr lang="pt-PT" sz="4800" dirty="0" err="1"/>
               <a:t>Proposal</a:t>
             </a:r>
             <a:r>
-              <a:rPr lang="pt-PT" sz="4800" dirty="0" smtClean="0"/>
+              <a:rPr lang="pt-PT" sz="4800" dirty="0"/>
               <a:t> </a:t>
             </a:r>
             <a:r>
-              <a:rPr lang="pt-PT" sz="4800" dirty="0" err="1" smtClean="0"/>
+              <a:rPr lang="pt-PT" sz="4800" dirty="0" err="1"/>
               <a:t>and</a:t>
             </a:r>
             <a:r>
-              <a:rPr lang="pt-PT" sz="4800" dirty="0" smtClean="0"/>
+              <a:rPr lang="pt-PT" sz="4800" dirty="0"/>
               <a:t> </a:t>
             </a:r>
             <a:r>
-              <a:rPr lang="pt-PT" sz="4800" dirty="0" err="1" smtClean="0"/>
+              <a:rPr lang="pt-PT" sz="4800" dirty="0" err="1"/>
               <a:t>Dataset</a:t>
             </a:r>
             <a:endParaRPr lang="pt-PT" sz="4800" dirty="0"/>
@@ -3716,12 +3711,12 @@
           <a:lstStyle/>
           <a:p>
             <a:r>
-              <a:rPr lang="pt-PT" sz="4600" dirty="0" smtClean="0">
+              <a:rPr lang="pt-PT" sz="4600" dirty="0">
                 <a:solidFill>
                   <a:schemeClr val="bg2"/>
                 </a:solidFill>
               </a:rPr>
-              <a:t>GX-A/T</a:t>
+              <a:t>G15-A</a:t>
             </a:r>
           </a:p>
         </p:txBody>
@@ -3737,14 +3732,12 @@
         <p:spPr>
           <a:xfrm>
             <a:off x="1979712" y="4571984"/>
-            <a:ext cx="2285984" cy="2286016"/>
+            <a:ext cx="3528392" cy="2286016"/>
           </a:xfrm>
           <a:prstGeom prst="rect">
             <a:avLst/>
           </a:prstGeom>
-          <a:solidFill>
-            <a:schemeClr val="bg1"/>
-          </a:solidFill>
+          <a:noFill/>
           <a:ln>
             <a:noFill/>
           </a:ln>
@@ -3891,44 +3884,44 @@
             </a:lvl9pPr>
           </a:lstStyle>
           <a:p>
-            <a:r>
-              <a:rPr lang="pt-PT" sz="2400" b="0" dirty="0" err="1" smtClean="0">
+            <a:pPr algn="l"/>
+            <a:r>
+              <a:rPr lang="pt-PT" sz="2400" b="0" dirty="0">
                 <a:solidFill>
                   <a:schemeClr val="bg2"/>
                 </a:solidFill>
               </a:rPr>
-              <a:t>Number</a:t>
-            </a:r>
-            <a:r>
-              <a:rPr lang="pt-PT" sz="2400" b="0" dirty="0" smtClean="0">
+              <a:t>88647 – Yasser  Zacarias</a:t>
+            </a:r>
+          </a:p>
+          <a:p>
+            <a:pPr algn="l"/>
+            <a:r>
+              <a:rPr lang="pt-PT" sz="2400" b="0" dirty="0">
                 <a:solidFill>
                   <a:schemeClr val="bg2"/>
                 </a:solidFill>
               </a:rPr>
-              <a:t> – </a:t>
-            </a:r>
-            <a:r>
-              <a:rPr lang="pt-PT" sz="2400" b="0" dirty="0" err="1" smtClean="0">
+              <a:t>86473 – Margarida Morais</a:t>
+            </a:r>
+          </a:p>
+          <a:p>
+            <a:pPr algn="l"/>
+            <a:r>
+              <a:rPr lang="pt-PT" sz="2400" b="0" dirty="0">
                 <a:solidFill>
                   <a:schemeClr val="bg2"/>
                 </a:solidFill>
               </a:rPr>
-              <a:t>Name</a:t>
-            </a:r>
-            <a:endParaRPr lang="pt-PT" sz="2400" b="0" dirty="0" smtClean="0">
-              <a:solidFill>
-                <a:schemeClr val="bg2"/>
-              </a:solidFill>
-            </a:endParaRPr>
-          </a:p>
-          <a:p>
+              <a:t>79457 – Maxwell </a:t>
+            </a:r>
             <a:r>
               <a:rPr lang="pt-PT" sz="2400" b="0" dirty="0" err="1">
                 <a:solidFill>
                   <a:schemeClr val="bg2"/>
                 </a:solidFill>
               </a:rPr>
-              <a:t>Number</a:t>
+              <a:t>Junior</a:t>
             </a:r>
             <a:r>
               <a:rPr lang="pt-PT" sz="2400" b="0" dirty="0">
@@ -3936,52 +3929,8 @@
                   <a:schemeClr val="bg2"/>
                 </a:solidFill>
               </a:rPr>
-              <a:t> – </a:t>
-            </a:r>
-            <a:r>
-              <a:rPr lang="pt-PT" sz="2400" b="0" dirty="0" err="1">
-                <a:solidFill>
-                  <a:schemeClr val="bg2"/>
-                </a:solidFill>
-              </a:rPr>
-              <a:t>Name</a:t>
-            </a:r>
-            <a:endParaRPr lang="pt-PT" sz="2400" b="0" dirty="0">
-              <a:solidFill>
-                <a:schemeClr val="bg2"/>
-              </a:solidFill>
-            </a:endParaRPr>
-          </a:p>
-          <a:p>
-            <a:r>
-              <a:rPr lang="pt-PT" sz="2400" b="0" dirty="0" err="1">
-                <a:solidFill>
-                  <a:schemeClr val="bg2"/>
-                </a:solidFill>
-              </a:rPr>
-              <a:t>Number</a:t>
-            </a:r>
-            <a:r>
-              <a:rPr lang="pt-PT" sz="2400" b="0" dirty="0">
-                <a:solidFill>
-                  <a:schemeClr val="bg2"/>
-                </a:solidFill>
-              </a:rPr>
-              <a:t> – </a:t>
-            </a:r>
-            <a:r>
-              <a:rPr lang="pt-PT" sz="2400" b="0" dirty="0" err="1" smtClean="0">
-                <a:solidFill>
-                  <a:schemeClr val="bg2"/>
-                </a:solidFill>
-              </a:rPr>
-              <a:t>Name</a:t>
-            </a:r>
-            <a:endParaRPr lang="pt-PT" sz="2400" b="0" dirty="0">
-              <a:solidFill>
-                <a:schemeClr val="bg2"/>
-              </a:solidFill>
-            </a:endParaRPr>
+              <a:t> </a:t>
+            </a:r>
           </a:p>
         </p:txBody>
       </p:sp>
@@ -3990,13 +3939,6 @@
   <p:clrMapOvr>
     <a:masterClrMapping/>
   </p:clrMapOvr>
-  <p:timing>
-    <p:tnLst>
-      <p:par>
-        <p:cTn xmlns:p14="http://schemas.microsoft.com/office/powerpoint/2010/main" id="1" dur="indefinite" restart="never" nodeType="tmRoot"/>
-      </p:par>
-    </p:tnLst>
-  </p:timing>
 </p:sld>
 </file>
 
@@ -4033,7 +3975,7 @@
           <a:lstStyle/>
           <a:p>
             <a:r>
-              <a:rPr lang="en-US" dirty="0" smtClean="0"/>
+              <a:rPr lang="en-US" dirty="0"/>
               <a:t>Data abstraction</a:t>
             </a:r>
             <a:endParaRPr lang="pt-PT" dirty="0"/>
@@ -4063,7 +4005,7 @@
           <a:lstStyle/>
           <a:p>
             <a:r>
-              <a:rPr lang="en-US" sz="3600" dirty="0" smtClean="0"/>
+              <a:rPr lang="en-US" sz="3600" dirty="0"/>
               <a:t>Semantics:</a:t>
             </a:r>
           </a:p>
@@ -4079,13 +4021,6 @@
   <p:clrMapOvr>
     <a:masterClrMapping/>
   </p:clrMapOvr>
-  <p:timing>
-    <p:tnLst>
-      <p:par>
-        <p:cTn xmlns:p14="http://schemas.microsoft.com/office/powerpoint/2010/main" id="1" dur="indefinite" restart="never" nodeType="tmRoot"/>
-      </p:par>
-    </p:tnLst>
-  </p:timing>
 </p:sld>
 </file>
 
@@ -4141,10 +4076,9 @@
           <a:lstStyle/>
           <a:p>
             <a:r>
-              <a:rPr lang="pt-PT" sz="16600" dirty="0" smtClean="0"/>
+              <a:rPr lang="pt-PT" sz="16600" dirty="0"/>
               <a:t>04</a:t>
             </a:r>
-            <a:endParaRPr lang="pt-PT" sz="16600" dirty="0"/>
           </a:p>
         </p:txBody>
       </p:sp>
@@ -4177,15 +4111,15 @@
           <a:p>
             <a:pPr marL="0" algn="r"/>
             <a:r>
-              <a:rPr lang="pt-PT" sz="6000" dirty="0" err="1" smtClean="0"/>
+              <a:rPr lang="pt-PT" sz="6000" dirty="0" err="1"/>
               <a:t>Dataset</a:t>
             </a:r>
             <a:r>
-              <a:rPr lang="pt-PT" sz="6000" dirty="0" smtClean="0"/>
+              <a:rPr lang="pt-PT" sz="6000" dirty="0"/>
               <a:t> </a:t>
             </a:r>
             <a:r>
-              <a:rPr lang="pt-PT" sz="6000" dirty="0" err="1" smtClean="0"/>
+              <a:rPr lang="pt-PT" sz="6000" dirty="0" err="1"/>
               <a:t>processing</a:t>
             </a:r>
             <a:endParaRPr lang="pt-PT" sz="6000" dirty="0"/>
@@ -4202,13 +4136,6 @@
   <p:clrMapOvr>
     <a:masterClrMapping/>
   </p:clrMapOvr>
-  <p:timing>
-    <p:tnLst>
-      <p:par>
-        <p:cTn xmlns:p14="http://schemas.microsoft.com/office/powerpoint/2010/main" id="1" dur="indefinite" restart="never" nodeType="tmRoot"/>
-      </p:par>
-    </p:tnLst>
-  </p:timing>
 </p:sld>
 </file>
 
@@ -4245,7 +4172,7 @@
           <a:lstStyle/>
           <a:p>
             <a:r>
-              <a:rPr lang="en-US" dirty="0" smtClean="0"/>
+              <a:rPr lang="en-US" dirty="0"/>
               <a:t>Dataset processing</a:t>
             </a:r>
             <a:endParaRPr lang="pt-PT" dirty="0"/>
@@ -4275,7 +4202,7 @@
           <a:lstStyle/>
           <a:p>
             <a:r>
-              <a:rPr lang="en-US" sz="4000" dirty="0" smtClean="0"/>
+              <a:rPr lang="en-US" sz="4000" dirty="0"/>
               <a:t>Dataset cleaning description</a:t>
             </a:r>
           </a:p>
@@ -4285,20 +4212,15 @@
           <a:p>
             <a:pPr lvl="1"/>
             <a:r>
-              <a:rPr lang="en-US" sz="3600" dirty="0" smtClean="0"/>
+              <a:rPr lang="en-US" sz="3600" dirty="0"/>
               <a:t>Entry1</a:t>
             </a:r>
-            <a:endParaRPr lang="en-US" sz="3600" dirty="0"/>
           </a:p>
           <a:p>
             <a:pPr lvl="1"/>
             <a:r>
-              <a:rPr lang="en-US" sz="3600" dirty="0" smtClean="0"/>
-              <a:t>Entr</a:t>
-            </a:r>
-            <a:r>
-              <a:rPr lang="en-US" sz="3600" dirty="0" smtClean="0"/>
-              <a:t>y2</a:t>
+              <a:rPr lang="en-US" sz="3600" dirty="0"/>
+              <a:t>Entry2</a:t>
             </a:r>
           </a:p>
           <a:p>
@@ -4308,10 +4230,9 @@
           <a:p>
             <a:pPr lvl="1"/>
             <a:r>
-              <a:rPr lang="en-US" sz="3600" dirty="0" smtClean="0"/>
+              <a:rPr lang="en-US" sz="3600" dirty="0"/>
               <a:t>…</a:t>
             </a:r>
-            <a:endParaRPr lang="en-US" sz="3600" dirty="0" smtClean="0"/>
           </a:p>
         </p:txBody>
       </p:sp>
@@ -4325,13 +4246,6 @@
   <p:clrMapOvr>
     <a:masterClrMapping/>
   </p:clrMapOvr>
-  <p:timing>
-    <p:tnLst>
-      <p:par>
-        <p:cTn xmlns:p14="http://schemas.microsoft.com/office/powerpoint/2010/main" id="1" dur="indefinite" restart="never" nodeType="tmRoot"/>
-      </p:par>
-    </p:tnLst>
-  </p:timing>
 </p:sld>
 </file>
 
@@ -4368,7 +4282,7 @@
           <a:lstStyle/>
           <a:p>
             <a:r>
-              <a:rPr lang="en-US" dirty="0" smtClean="0"/>
+              <a:rPr lang="en-US" dirty="0"/>
               <a:t>Dataset processing</a:t>
             </a:r>
             <a:endParaRPr lang="pt-PT" dirty="0"/>
@@ -4398,42 +4312,42 @@
           <a:lstStyle/>
           <a:p>
             <a:r>
-              <a:rPr lang="en-US" sz="4000" dirty="0" smtClean="0"/>
+              <a:rPr lang="en-US" sz="4000" dirty="0"/>
               <a:t>Problems found:</a:t>
             </a:r>
           </a:p>
           <a:p>
             <a:pPr lvl="1"/>
             <a:r>
-              <a:rPr lang="en-US" sz="3600" dirty="0" smtClean="0"/>
+              <a:rPr lang="en-US" sz="3600" dirty="0"/>
               <a:t>Problem 1</a:t>
             </a:r>
           </a:p>
           <a:p>
             <a:pPr lvl="1"/>
             <a:r>
-              <a:rPr lang="en-US" sz="3600" dirty="0" smtClean="0"/>
+              <a:rPr lang="en-US" sz="3600" dirty="0"/>
               <a:t>Solution</a:t>
             </a:r>
           </a:p>
           <a:p>
             <a:pPr lvl="1"/>
-            <a:endParaRPr lang="en-US" sz="3600" dirty="0" smtClean="0"/>
+            <a:endParaRPr lang="en-US" sz="3600" dirty="0"/>
           </a:p>
           <a:p>
             <a:pPr lvl="1"/>
             <a:r>
-              <a:rPr lang="en-US" sz="3600" dirty="0" smtClean="0"/>
+              <a:rPr lang="en-US" sz="3600" dirty="0"/>
               <a:t>Problem 2</a:t>
             </a:r>
           </a:p>
           <a:p>
             <a:pPr lvl="1"/>
             <a:r>
-              <a:rPr lang="en-US" sz="3600" dirty="0" smtClean="0"/>
+              <a:rPr lang="en-US" sz="3600" dirty="0"/>
               <a:t>Solution</a:t>
             </a:r>
-            <a:endParaRPr lang="en-US" sz="4000" dirty="0" smtClean="0"/>
+            <a:endParaRPr lang="en-US" sz="4000" dirty="0"/>
           </a:p>
           <a:p>
             <a:endParaRPr lang="en-US" sz="4000" dirty="0"/>
@@ -4450,13 +4364,6 @@
   <p:clrMapOvr>
     <a:masterClrMapping/>
   </p:clrMapOvr>
-  <p:timing>
-    <p:tnLst>
-      <p:par>
-        <p:cTn xmlns:p14="http://schemas.microsoft.com/office/powerpoint/2010/main" id="1" dur="indefinite" restart="never" nodeType="tmRoot"/>
-      </p:par>
-    </p:tnLst>
-  </p:timing>
 </p:sld>
 </file>
 
@@ -4512,10 +4419,9 @@
           <a:lstStyle/>
           <a:p>
             <a:r>
-              <a:rPr lang="pt-PT" sz="16600" dirty="0" smtClean="0"/>
+              <a:rPr lang="pt-PT" sz="16600" dirty="0"/>
               <a:t>05</a:t>
             </a:r>
-            <a:endParaRPr lang="pt-PT" sz="16600" dirty="0"/>
           </a:p>
         </p:txBody>
       </p:sp>
@@ -4548,7 +4454,7 @@
           <a:p>
             <a:pPr marL="0" algn="r"/>
             <a:r>
-              <a:rPr lang="pt-PT" sz="6000" dirty="0" err="1" smtClean="0"/>
+              <a:rPr lang="pt-PT" sz="6000" dirty="0" err="1"/>
               <a:t>Mapping</a:t>
             </a:r>
             <a:endParaRPr lang="pt-PT" sz="6000" dirty="0"/>
@@ -4565,13 +4471,6 @@
   <p:clrMapOvr>
     <a:masterClrMapping/>
   </p:clrMapOvr>
-  <p:timing>
-    <p:tnLst>
-      <p:par>
-        <p:cTn xmlns:p14="http://schemas.microsoft.com/office/powerpoint/2010/main" id="1" dur="indefinite" restart="never" nodeType="tmRoot"/>
-      </p:par>
-    </p:tnLst>
-  </p:timing>
 </p:sld>
 </file>
 
@@ -4608,7 +4507,7 @@
           <a:lstStyle/>
           <a:p>
             <a:r>
-              <a:rPr lang="en-US" dirty="0" smtClean="0"/>
+              <a:rPr lang="en-US" dirty="0"/>
               <a:t>Mapping</a:t>
             </a:r>
             <a:endParaRPr lang="pt-PT" dirty="0"/>
@@ -4638,37 +4537,14 @@
           <a:lstStyle/>
           <a:p>
             <a:r>
-              <a:rPr lang="en-US" sz="4000" dirty="0" smtClean="0"/>
+              <a:rPr lang="en-US" sz="4000" dirty="0"/>
               <a:t>Question 1</a:t>
             </a:r>
           </a:p>
           <a:p>
             <a:pPr lvl="1"/>
             <a:r>
-              <a:rPr lang="en-US" sz="3600" dirty="0" smtClean="0"/>
-              <a:t>Data</a:t>
-            </a:r>
-            <a:endParaRPr lang="en-US" sz="3600" dirty="0" smtClean="0"/>
-          </a:p>
-          <a:p>
-            <a:pPr lvl="1"/>
-            <a:endParaRPr lang="en-US" sz="3600" dirty="0" smtClean="0"/>
-          </a:p>
-          <a:p>
-            <a:r>
-              <a:rPr lang="en-US" sz="4000" dirty="0"/>
-              <a:t>Question </a:t>
-            </a:r>
-            <a:r>
-              <a:rPr lang="en-US" sz="4000" dirty="0" smtClean="0"/>
-              <a:t>2</a:t>
-            </a:r>
-            <a:endParaRPr lang="en-US" sz="4000" dirty="0"/>
-          </a:p>
-          <a:p>
-            <a:pPr lvl="1"/>
-            <a:r>
-              <a:rPr lang="en-US" sz="3600" dirty="0" smtClean="0"/>
+              <a:rPr lang="en-US" sz="3600" dirty="0"/>
               <a:t>Data</a:t>
             </a:r>
           </a:p>
@@ -4678,7 +4554,24 @@
           </a:p>
           <a:p>
             <a:r>
-              <a:rPr lang="en-US" sz="4000" dirty="0" smtClean="0"/>
+              <a:rPr lang="en-US" sz="4000" dirty="0"/>
+              <a:t>Question 2</a:t>
+            </a:r>
+          </a:p>
+          <a:p>
+            <a:pPr lvl="1"/>
+            <a:r>
+              <a:rPr lang="en-US" sz="3600" dirty="0"/>
+              <a:t>Data</a:t>
+            </a:r>
+          </a:p>
+          <a:p>
+            <a:pPr lvl="1"/>
+            <a:endParaRPr lang="en-US" sz="3600" dirty="0"/>
+          </a:p>
+          <a:p>
+            <a:r>
+              <a:rPr lang="en-US" sz="4000" dirty="0"/>
               <a:t>…</a:t>
             </a:r>
             <a:endParaRPr lang="en-US" sz="4400" dirty="0"/>
@@ -4695,13 +4588,6 @@
   <p:clrMapOvr>
     <a:masterClrMapping/>
   </p:clrMapOvr>
-  <p:timing>
-    <p:tnLst>
-      <p:par>
-        <p:cTn xmlns:p14="http://schemas.microsoft.com/office/powerpoint/2010/main" id="1" dur="indefinite" restart="never" nodeType="tmRoot"/>
-      </p:par>
-    </p:tnLst>
-  </p:timing>
 </p:sld>
 </file>
 
@@ -4757,10 +4643,9 @@
           <a:lstStyle/>
           <a:p>
             <a:r>
-              <a:rPr lang="pt-PT" sz="16600" dirty="0" smtClean="0"/>
+              <a:rPr lang="pt-PT" sz="16600" dirty="0"/>
               <a:t>01</a:t>
             </a:r>
-            <a:endParaRPr lang="pt-PT" sz="16600" dirty="0"/>
           </a:p>
         </p:txBody>
       </p:sp>
@@ -4793,10 +4678,9 @@
           <a:p>
             <a:pPr marL="0" algn="r"/>
             <a:r>
-              <a:rPr lang="pt-PT" sz="6000" dirty="0" smtClean="0"/>
+              <a:rPr lang="pt-PT" sz="6000" dirty="0"/>
               <a:t>INITIAL DATASET</a:t>
             </a:r>
-            <a:endParaRPr lang="pt-PT" sz="6000" dirty="0"/>
           </a:p>
         </p:txBody>
       </p:sp>
@@ -4805,13 +4689,6 @@
   <p:clrMapOvr>
     <a:masterClrMapping/>
   </p:clrMapOvr>
-  <p:timing>
-    <p:tnLst>
-      <p:par>
-        <p:cTn xmlns:p14="http://schemas.microsoft.com/office/powerpoint/2010/main" id="1" dur="indefinite" restart="never" nodeType="tmRoot"/>
-      </p:par>
-    </p:tnLst>
-  </p:timing>
 </p:sld>
 </file>
 
@@ -4848,7 +4725,7 @@
           <a:lstStyle/>
           <a:p>
             <a:r>
-              <a:rPr lang="en-US" dirty="0" smtClean="0"/>
+              <a:rPr lang="en-US" dirty="0"/>
               <a:t>Initial Dataset</a:t>
             </a:r>
             <a:endParaRPr lang="pt-PT" dirty="0"/>
@@ -4873,19 +4750,18 @@
           <a:lstStyle/>
           <a:p>
             <a:r>
-              <a:rPr lang="en-US" sz="4000" dirty="0" smtClean="0"/>
+              <a:rPr lang="en-US" sz="4000" dirty="0"/>
               <a:t>Description</a:t>
             </a:r>
           </a:p>
           <a:p>
-            <a:endParaRPr lang="en-US" sz="4000" dirty="0" smtClean="0"/>
-          </a:p>
-          <a:p>
-            <a:r>
-              <a:rPr lang="en-US" sz="4000" dirty="0" smtClean="0"/>
+            <a:endParaRPr lang="en-US" sz="4000" dirty="0"/>
+          </a:p>
+          <a:p>
+            <a:r>
+              <a:rPr lang="en-US" sz="4000" dirty="0"/>
               <a:t>Data sample</a:t>
             </a:r>
-            <a:endParaRPr lang="en-US" sz="4000" dirty="0" smtClean="0"/>
           </a:p>
         </p:txBody>
       </p:sp>
@@ -4899,13 +4775,6 @@
   <p:clrMapOvr>
     <a:masterClrMapping/>
   </p:clrMapOvr>
-  <p:timing>
-    <p:tnLst>
-      <p:par>
-        <p:cTn xmlns:p14="http://schemas.microsoft.com/office/powerpoint/2010/main" id="1" dur="indefinite" restart="never" nodeType="tmRoot"/>
-      </p:par>
-    </p:tnLst>
-  </p:timing>
 </p:sld>
 </file>
 
@@ -4961,10 +4830,9 @@
           <a:lstStyle/>
           <a:p>
             <a:r>
-              <a:rPr lang="pt-PT" sz="16600" dirty="0" smtClean="0"/>
+              <a:rPr lang="pt-PT" sz="16600" dirty="0"/>
               <a:t>02</a:t>
             </a:r>
-            <a:endParaRPr lang="pt-PT" sz="16600" dirty="0"/>
           </a:p>
         </p:txBody>
       </p:sp>
@@ -4997,22 +4865,21 @@
           <a:p>
             <a:pPr marL="0" algn="r"/>
             <a:r>
-              <a:rPr lang="pt-PT" sz="6000" dirty="0" err="1" smtClean="0"/>
+              <a:rPr lang="pt-PT" sz="6000" dirty="0" err="1"/>
               <a:t>Selected</a:t>
             </a:r>
             <a:r>
-              <a:rPr lang="pt-PT" sz="6000" dirty="0" smtClean="0"/>
+              <a:rPr lang="pt-PT" sz="6000" dirty="0"/>
               <a:t> / </a:t>
             </a:r>
             <a:r>
-              <a:rPr lang="pt-PT" sz="6000" dirty="0" err="1" smtClean="0"/>
+              <a:rPr lang="pt-PT" sz="6000" dirty="0" err="1"/>
               <a:t>derived</a:t>
             </a:r>
             <a:r>
-              <a:rPr lang="pt-PT" sz="6000" dirty="0" smtClean="0"/>
+              <a:rPr lang="pt-PT" sz="6000" dirty="0"/>
               <a:t> data</a:t>
             </a:r>
-            <a:endParaRPr lang="pt-PT" sz="6000" dirty="0"/>
           </a:p>
         </p:txBody>
       </p:sp>
@@ -5026,13 +4893,6 @@
   <p:clrMapOvr>
     <a:masterClrMapping/>
   </p:clrMapOvr>
-  <p:timing>
-    <p:tnLst>
-      <p:par>
-        <p:cTn xmlns:p14="http://schemas.microsoft.com/office/powerpoint/2010/main" id="1" dur="indefinite" restart="never" nodeType="tmRoot"/>
-      </p:par>
-    </p:tnLst>
-  </p:timing>
 </p:sld>
 </file>
 
@@ -5069,7 +4929,7 @@
           <a:lstStyle/>
           <a:p>
             <a:r>
-              <a:rPr lang="en-US" dirty="0" smtClean="0"/>
+              <a:rPr lang="en-US" dirty="0"/>
               <a:t>Selected data</a:t>
             </a:r>
             <a:endParaRPr lang="pt-PT" dirty="0"/>
@@ -5094,14 +4954,13 @@
           <a:lstStyle/>
           <a:p>
             <a:r>
-              <a:rPr lang="en-US" sz="4000" dirty="0" smtClean="0"/>
+              <a:rPr lang="en-US" sz="4000" dirty="0"/>
               <a:t>Data description</a:t>
             </a:r>
-            <a:endParaRPr lang="en-US" sz="4000" dirty="0" smtClean="0"/>
           </a:p>
           <a:p>
             <a:pPr lvl="1"/>
-            <a:endParaRPr lang="en-US" dirty="0" smtClean="0"/>
+            <a:endParaRPr lang="en-US" dirty="0"/>
           </a:p>
         </p:txBody>
       </p:sp>
@@ -5115,13 +4974,6 @@
   <p:clrMapOvr>
     <a:masterClrMapping/>
   </p:clrMapOvr>
-  <p:timing>
-    <p:tnLst>
-      <p:par>
-        <p:cTn xmlns:p14="http://schemas.microsoft.com/office/powerpoint/2010/main" id="1" dur="indefinite" restart="never" nodeType="tmRoot"/>
-      </p:par>
-    </p:tnLst>
-  </p:timing>
 </p:sld>
 </file>
 
@@ -5158,7 +5010,7 @@
           <a:lstStyle/>
           <a:p>
             <a:r>
-              <a:rPr lang="en-US" dirty="0" smtClean="0"/>
+              <a:rPr lang="en-US" dirty="0"/>
               <a:t>Derived data</a:t>
             </a:r>
             <a:endParaRPr lang="pt-PT" dirty="0"/>
@@ -5183,28 +5035,27 @@
           <a:lstStyle/>
           <a:p>
             <a:r>
-              <a:rPr lang="en-US" sz="4000" dirty="0" smtClean="0"/>
+              <a:rPr lang="en-US" sz="4000" dirty="0"/>
               <a:t>Derived data description</a:t>
             </a:r>
           </a:p>
           <a:p>
             <a:pPr lvl="1"/>
             <a:r>
-              <a:rPr lang="en-US" sz="3600" dirty="0" smtClean="0"/>
+              <a:rPr lang="en-US" sz="3600" dirty="0"/>
               <a:t>Which measures?</a:t>
             </a:r>
           </a:p>
           <a:p>
             <a:pPr lvl="1"/>
             <a:r>
-              <a:rPr lang="en-US" sz="3600" dirty="0" smtClean="0"/>
+              <a:rPr lang="en-US" sz="3600" dirty="0"/>
               <a:t>Why?</a:t>
             </a:r>
-            <a:endParaRPr lang="en-US" sz="3600" dirty="0" smtClean="0"/>
           </a:p>
           <a:p>
             <a:pPr lvl="1"/>
-            <a:endParaRPr lang="en-US" dirty="0" smtClean="0"/>
+            <a:endParaRPr lang="en-US" dirty="0"/>
           </a:p>
         </p:txBody>
       </p:sp>
@@ -5218,13 +5069,6 @@
   <p:clrMapOvr>
     <a:masterClrMapping/>
   </p:clrMapOvr>
-  <p:timing>
-    <p:tnLst>
-      <p:par>
-        <p:cTn xmlns:p14="http://schemas.microsoft.com/office/powerpoint/2010/main" id="1" dur="indefinite" restart="never" nodeType="tmRoot"/>
-      </p:par>
-    </p:tnLst>
-  </p:timing>
 </p:sld>
 </file>
 
@@ -5280,10 +5124,9 @@
           <a:lstStyle/>
           <a:p>
             <a:r>
-              <a:rPr lang="pt-PT" sz="16600" dirty="0" smtClean="0"/>
+              <a:rPr lang="pt-PT" sz="16600" dirty="0"/>
               <a:t>03</a:t>
             </a:r>
-            <a:endParaRPr lang="pt-PT" sz="16600" dirty="0"/>
           </a:p>
         </p:txBody>
       </p:sp>
@@ -5316,11 +5159,11 @@
           <a:p>
             <a:pPr marL="0" algn="r"/>
             <a:r>
-              <a:rPr lang="pt-PT" sz="6000" dirty="0" smtClean="0"/>
+              <a:rPr lang="pt-PT" sz="6000" dirty="0"/>
               <a:t>Data </a:t>
             </a:r>
             <a:r>
-              <a:rPr lang="pt-PT" sz="6000" dirty="0" err="1" smtClean="0"/>
+              <a:rPr lang="pt-PT" sz="6000" dirty="0" err="1"/>
               <a:t>abstraction</a:t>
             </a:r>
             <a:endParaRPr lang="pt-PT" sz="6000" dirty="0"/>
@@ -5337,13 +5180,6 @@
   <p:clrMapOvr>
     <a:masterClrMapping/>
   </p:clrMapOvr>
-  <p:timing>
-    <p:tnLst>
-      <p:par>
-        <p:cTn xmlns:p14="http://schemas.microsoft.com/office/powerpoint/2010/main" id="1" dur="indefinite" restart="never" nodeType="tmRoot"/>
-      </p:par>
-    </p:tnLst>
-  </p:timing>
 </p:sld>
 </file>
 
@@ -5380,7 +5216,7 @@
           <a:lstStyle/>
           <a:p>
             <a:r>
-              <a:rPr lang="en-US" dirty="0" smtClean="0"/>
+              <a:rPr lang="en-US" dirty="0"/>
               <a:t>Data abstraction</a:t>
             </a:r>
             <a:endParaRPr lang="pt-PT" dirty="0"/>
@@ -5410,23 +5246,22 @@
           <a:lstStyle/>
           <a:p>
             <a:r>
-              <a:rPr lang="en-US" sz="3600" dirty="0" smtClean="0"/>
+              <a:rPr lang="en-US" sz="3600" dirty="0"/>
               <a:t>Description:</a:t>
             </a:r>
-            <a:endParaRPr lang="en-US" sz="3600" dirty="0" smtClean="0"/>
           </a:p>
           <a:p>
             <a:pPr lvl="1"/>
-            <a:endParaRPr lang="en-US" sz="3200" dirty="0" smtClean="0"/>
-          </a:p>
-          <a:p>
-            <a:r>
-              <a:rPr lang="en-US" sz="3600" dirty="0" smtClean="0"/>
+            <a:endParaRPr lang="en-US" sz="3200" dirty="0"/>
+          </a:p>
+          <a:p>
+            <a:r>
+              <a:rPr lang="en-US" sz="3600" dirty="0"/>
               <a:t>Dataset type:</a:t>
             </a:r>
           </a:p>
           <a:p>
-            <a:endParaRPr lang="en-US" sz="3600" dirty="0" smtClean="0"/>
+            <a:endParaRPr lang="en-US" sz="3600" dirty="0"/>
           </a:p>
         </p:txBody>
       </p:sp>
@@ -5440,13 +5275,6 @@
   <p:clrMapOvr>
     <a:masterClrMapping/>
   </p:clrMapOvr>
-  <p:timing>
-    <p:tnLst>
-      <p:par>
-        <p:cTn xmlns:p14="http://schemas.microsoft.com/office/powerpoint/2010/main" id="1" dur="indefinite" restart="never" nodeType="tmRoot"/>
-      </p:par>
-    </p:tnLst>
-  </p:timing>
 </p:sld>
 </file>
 
@@ -5483,7 +5311,7 @@
           <a:lstStyle/>
           <a:p>
             <a:r>
-              <a:rPr lang="en-US" dirty="0" smtClean="0"/>
+              <a:rPr lang="en-US" dirty="0"/>
               <a:t>Data abstraction</a:t>
             </a:r>
             <a:endParaRPr lang="pt-PT" dirty="0"/>
@@ -5514,14 +5342,14 @@
           <a:p>
             <a:pPr lvl="1"/>
             <a:r>
-              <a:rPr lang="en-US" sz="3200" dirty="0" smtClean="0"/>
+              <a:rPr lang="en-US" sz="3200" dirty="0"/>
               <a:t>Item1 description</a:t>
             </a:r>
           </a:p>
           <a:p>
             <a:pPr lvl="1"/>
             <a:r>
-              <a:rPr lang="en-US" sz="2400" dirty="0" smtClean="0"/>
+              <a:rPr lang="en-US" sz="2400" dirty="0"/>
               <a:t>	Attribute1 description</a:t>
             </a:r>
             <a:endParaRPr lang="en-US" sz="1800" dirty="0"/>
@@ -5529,7 +5357,7 @@
           <a:p>
             <a:pPr lvl="1"/>
             <a:r>
-              <a:rPr lang="en-US" sz="2400" dirty="0" smtClean="0"/>
+              <a:rPr lang="en-US" sz="2400" dirty="0"/>
               <a:t>	Attribute2 description</a:t>
             </a:r>
           </a:p>
@@ -5540,45 +5368,36 @@
           <a:p>
             <a:pPr lvl="1"/>
             <a:r>
-              <a:rPr lang="en-US" sz="3200" dirty="0" smtClean="0"/>
+              <a:rPr lang="en-US" sz="3200" dirty="0"/>
               <a:t>Item2 description</a:t>
             </a:r>
           </a:p>
           <a:p>
             <a:pPr lvl="1"/>
             <a:r>
-              <a:rPr lang="en-US" sz="2400" dirty="0" smtClean="0"/>
-              <a:t>	Attribute1 </a:t>
-            </a:r>
-            <a:r>
               <a:rPr lang="en-US" sz="2400" dirty="0"/>
-              <a:t>description</a:t>
+              <a:t>	Attribute1 description</a:t>
             </a:r>
             <a:endParaRPr lang="en-US" sz="1800" dirty="0"/>
           </a:p>
           <a:p>
             <a:pPr lvl="1"/>
             <a:r>
-              <a:rPr lang="en-US" sz="2400" dirty="0" smtClean="0"/>
-              <a:t>	Attribute2 </a:t>
-            </a:r>
-            <a:r>
               <a:rPr lang="en-US" sz="2400" dirty="0"/>
-              <a:t>description</a:t>
+              <a:t>	Attribute2 description</a:t>
             </a:r>
             <a:endParaRPr lang="en-US" sz="1800" dirty="0"/>
           </a:p>
           <a:p>
             <a:pPr lvl="1"/>
-            <a:endParaRPr lang="en-US" sz="3200" dirty="0" smtClean="0"/>
+            <a:endParaRPr lang="en-US" sz="3200" dirty="0"/>
           </a:p>
           <a:p>
             <a:pPr lvl="1"/>
             <a:r>
-              <a:rPr lang="en-US" sz="3200" dirty="0" smtClean="0"/>
+              <a:rPr lang="en-US" sz="3200" dirty="0"/>
               <a:t>…</a:t>
             </a:r>
-            <a:endParaRPr lang="en-US" sz="3200" dirty="0"/>
           </a:p>
         </p:txBody>
       </p:sp>
@@ -5592,13 +5411,6 @@
   <p:clrMapOvr>
     <a:masterClrMapping/>
   </p:clrMapOvr>
-  <p:timing>
-    <p:tnLst>
-      <p:par>
-        <p:cTn xmlns:p14="http://schemas.microsoft.com/office/powerpoint/2010/main" id="1" dur="indefinite" restart="never" nodeType="tmRoot"/>
-      </p:par>
-    </p:tnLst>
-  </p:timing>
 </p:sld>
 </file>
 

</xml_diff>

<commit_message>
started editing the ppt
</commit_message>
<xml_diff>
--- a/CheckpointII/Lab04-PresentationTemplate.pptx
+++ b/CheckpointII/Lab04-PresentationTemplate.pptx
@@ -5,27 +5,29 @@
     <p:sldMasterId id="2147483648" r:id="rId1"/>
   </p:sldMasterIdLst>
   <p:notesMasterIdLst>
-    <p:notesMasterId r:id="rId17"/>
+    <p:notesMasterId r:id="rId19"/>
   </p:notesMasterIdLst>
   <p:handoutMasterIdLst>
-    <p:handoutMasterId r:id="rId18"/>
+    <p:handoutMasterId r:id="rId20"/>
   </p:handoutMasterIdLst>
   <p:sldIdLst>
     <p:sldId id="256" r:id="rId2"/>
     <p:sldId id="257" r:id="rId3"/>
     <p:sldId id="1096" r:id="rId4"/>
-    <p:sldId id="1097" r:id="rId5"/>
-    <p:sldId id="1098" r:id="rId6"/>
-    <p:sldId id="1105" r:id="rId7"/>
-    <p:sldId id="1099" r:id="rId8"/>
-    <p:sldId id="1100" r:id="rId9"/>
-    <p:sldId id="1106" r:id="rId10"/>
-    <p:sldId id="1107" r:id="rId11"/>
-    <p:sldId id="1101" r:id="rId12"/>
-    <p:sldId id="1102" r:id="rId13"/>
-    <p:sldId id="1108" r:id="rId14"/>
-    <p:sldId id="1103" r:id="rId15"/>
-    <p:sldId id="1104" r:id="rId16"/>
+    <p:sldId id="1109" r:id="rId5"/>
+    <p:sldId id="1110" r:id="rId6"/>
+    <p:sldId id="1097" r:id="rId7"/>
+    <p:sldId id="1098" r:id="rId8"/>
+    <p:sldId id="1105" r:id="rId9"/>
+    <p:sldId id="1099" r:id="rId10"/>
+    <p:sldId id="1100" r:id="rId11"/>
+    <p:sldId id="1106" r:id="rId12"/>
+    <p:sldId id="1107" r:id="rId13"/>
+    <p:sldId id="1101" r:id="rId14"/>
+    <p:sldId id="1102" r:id="rId15"/>
+    <p:sldId id="1108" r:id="rId16"/>
+    <p:sldId id="1103" r:id="rId17"/>
+    <p:sldId id="1104" r:id="rId18"/>
   </p:sldIdLst>
   <p:sldSz cx="9144000" cy="6858000" type="screen4x3"/>
   <p:notesSz cx="6858000" cy="9144000"/>
@@ -746,6 +748,91 @@
 </p:notes>
 </file>
 
+<file path=ppt/notesSlides/notesSlide10.xml><?xml version="1.0" encoding="utf-8"?>
+<p:notes xmlns:a="http://schemas.openxmlformats.org/drawingml/2006/main" xmlns:r="http://schemas.openxmlformats.org/officeDocument/2006/relationships" xmlns:p="http://schemas.openxmlformats.org/presentationml/2006/main">
+  <p:cSld>
+    <p:spTree>
+      <p:nvGrpSpPr>
+        <p:cNvPr id="1" name=""/>
+        <p:cNvGrpSpPr/>
+        <p:nvPr/>
+      </p:nvGrpSpPr>
+      <p:grpSpPr>
+        <a:xfrm>
+          <a:off x="0" y="0"/>
+          <a:ext cx="0" cy="0"/>
+          <a:chOff x="0" y="0"/>
+          <a:chExt cx="0" cy="0"/>
+        </a:xfrm>
+      </p:grpSpPr>
+      <p:sp>
+        <p:nvSpPr>
+          <p:cNvPr id="2" name="Slide Image Placeholder 1"/>
+          <p:cNvSpPr>
+            <a:spLocks noGrp="1" noRot="1" noChangeAspect="1"/>
+          </p:cNvSpPr>
+          <p:nvPr>
+            <p:ph type="sldImg"/>
+          </p:nvPr>
+        </p:nvSpPr>
+        <p:spPr/>
+      </p:sp>
+      <p:sp>
+        <p:nvSpPr>
+          <p:cNvPr id="3" name="Notes Placeholder 2"/>
+          <p:cNvSpPr>
+            <a:spLocks noGrp="1"/>
+          </p:cNvSpPr>
+          <p:nvPr>
+            <p:ph type="body" idx="1"/>
+          </p:nvPr>
+        </p:nvSpPr>
+        <p:spPr/>
+        <p:txBody>
+          <a:bodyPr/>
+          <a:lstStyle/>
+          <a:p>
+            <a:endParaRPr lang="en-US" baseline="0" dirty="0"/>
+          </a:p>
+        </p:txBody>
+      </p:sp>
+      <p:sp>
+        <p:nvSpPr>
+          <p:cNvPr id="4" name="Slide Number Placeholder 3"/>
+          <p:cNvSpPr>
+            <a:spLocks noGrp="1"/>
+          </p:cNvSpPr>
+          <p:nvPr>
+            <p:ph type="sldNum" sz="quarter" idx="10"/>
+          </p:nvPr>
+        </p:nvSpPr>
+        <p:spPr/>
+        <p:txBody>
+          <a:bodyPr/>
+          <a:lstStyle/>
+          <a:p>
+            <a:fld id="{F535F173-C1DD-4975-94BF-5B9ED67F7674}" type="slidenum">
+              <a:rPr lang="en-US" smtClean="0"/>
+              <a:pPr/>
+              <a:t>17</a:t>
+            </a:fld>
+            <a:endParaRPr lang="en-US"/>
+          </a:p>
+        </p:txBody>
+      </p:sp>
+    </p:spTree>
+    <p:extLst>
+      <p:ext uri="{BB962C8B-B14F-4D97-AF65-F5344CB8AC3E}">
+        <p14:creationId xmlns:p14="http://schemas.microsoft.com/office/powerpoint/2010/main" val="35205596"/>
+      </p:ext>
+    </p:extLst>
+  </p:cSld>
+  <p:clrMapOvr>
+    <a:masterClrMapping/>
+  </p:clrMapOvr>
+</p:notes>
+</file>
+
 <file path=ppt/notesSlides/notesSlide2.xml><?xml version="1.0" encoding="utf-8"?>
 <p:notes xmlns:a="http://schemas.openxmlformats.org/drawingml/2006/main" xmlns:r="http://schemas.openxmlformats.org/officeDocument/2006/relationships" xmlns:p="http://schemas.openxmlformats.org/presentationml/2006/main">
   <p:cSld>
@@ -765,7 +852,7 @@
       </p:grpSpPr>
       <p:sp>
         <p:nvSpPr>
-          <p:cNvPr id="2" name="Slide Image Placeholder 1"/>
+          <p:cNvPr id="2" name="Marcador de Posição da Imagem do Diapositivo 1"/>
           <p:cNvSpPr>
             <a:spLocks noGrp="1" noRot="1" noChangeAspect="1"/>
           </p:cNvSpPr>
@@ -777,7 +864,7 @@
       </p:sp>
       <p:sp>
         <p:nvSpPr>
-          <p:cNvPr id="3" name="Notes Placeholder 2"/>
+          <p:cNvPr id="3" name="Marcador de Posição de Notas 2"/>
           <p:cNvSpPr>
             <a:spLocks noGrp="1"/>
           </p:cNvSpPr>
@@ -790,18 +877,18 @@
           <a:bodyPr/>
           <a:lstStyle/>
           <a:p>
-            <a:endParaRPr lang="en-US" baseline="0" dirty="0"/>
-          </a:p>
-        </p:txBody>
-      </p:sp>
-      <p:sp>
-        <p:nvSpPr>
-          <p:cNvPr id="4" name="Slide Number Placeholder 3"/>
-          <p:cNvSpPr>
-            <a:spLocks noGrp="1"/>
-          </p:cNvSpPr>
-          <p:nvPr>
-            <p:ph type="sldNum" sz="quarter" idx="10"/>
+            <a:endParaRPr lang="en-US" noProof="0" dirty="0"/>
+          </a:p>
+        </p:txBody>
+      </p:sp>
+      <p:sp>
+        <p:nvSpPr>
+          <p:cNvPr id="4" name="Marcador de Posição do Número do Diapositivo 3"/>
+          <p:cNvSpPr>
+            <a:spLocks noGrp="1"/>
+          </p:cNvSpPr>
+          <p:nvPr>
+            <p:ph type="sldNum" sz="quarter" idx="5"/>
           </p:nvPr>
         </p:nvSpPr>
         <p:spPr/>
@@ -821,7 +908,7 @@
     </p:spTree>
     <p:extLst>
       <p:ext uri="{BB962C8B-B14F-4D97-AF65-F5344CB8AC3E}">
-        <p14:creationId xmlns:p14="http://schemas.microsoft.com/office/powerpoint/2010/main" val="1355792998"/>
+        <p14:creationId xmlns:p14="http://schemas.microsoft.com/office/powerpoint/2010/main" val="2059427213"/>
       </p:ext>
     </p:extLst>
   </p:cSld>
@@ -897,7 +984,7 @@
             <a:fld id="{F535F173-C1DD-4975-94BF-5B9ED67F7674}" type="slidenum">
               <a:rPr lang="en-US" smtClean="0"/>
               <a:pPr/>
-              <a:t>6</a:t>
+              <a:t>7</a:t>
             </a:fld>
             <a:endParaRPr lang="en-US"/>
           </a:p>
@@ -1067,7 +1154,7 @@
             <a:fld id="{F535F173-C1DD-4975-94BF-5B9ED67F7674}" type="slidenum">
               <a:rPr lang="en-US" smtClean="0"/>
               <a:pPr/>
-              <a:t>9</a:t>
+              <a:t>10</a:t>
             </a:fld>
             <a:endParaRPr lang="en-US"/>
           </a:p>
@@ -1152,7 +1239,7 @@
             <a:fld id="{F535F173-C1DD-4975-94BF-5B9ED67F7674}" type="slidenum">
               <a:rPr lang="en-US" smtClean="0"/>
               <a:pPr/>
-              <a:t>10</a:t>
+              <a:t>11</a:t>
             </a:fld>
             <a:endParaRPr lang="en-US"/>
           </a:p>
@@ -1322,7 +1409,7 @@
             <a:fld id="{F535F173-C1DD-4975-94BF-5B9ED67F7674}" type="slidenum">
               <a:rPr lang="en-US" smtClean="0"/>
               <a:pPr/>
-              <a:t>13</a:t>
+              <a:t>14</a:t>
             </a:fld>
             <a:endParaRPr lang="en-US"/>
           </a:p>
@@ -1416,7 +1503,7 @@
     </p:spTree>
     <p:extLst>
       <p:ext uri="{BB962C8B-B14F-4D97-AF65-F5344CB8AC3E}">
-        <p14:creationId xmlns:p14="http://schemas.microsoft.com/office/powerpoint/2010/main" val="35205596"/>
+        <p14:creationId xmlns:p14="http://schemas.microsoft.com/office/powerpoint/2010/main" val="1355792998"/>
       </p:ext>
     </p:extLst>
   </p:cSld>
@@ -4006,15 +4093,28 @@
           <a:p>
             <a:r>
               <a:rPr lang="en-US" sz="3600" dirty="0"/>
-              <a:t>Semantics:</a:t>
-            </a:r>
+              <a:t>Description:</a:t>
+            </a:r>
+          </a:p>
+          <a:p>
+            <a:pPr lvl="1"/>
+            <a:endParaRPr lang="en-US" sz="3200" dirty="0"/>
+          </a:p>
+          <a:p>
+            <a:r>
+              <a:rPr lang="en-US" sz="3600" dirty="0"/>
+              <a:t>Dataset type:</a:t>
+            </a:r>
+          </a:p>
+          <a:p>
+            <a:endParaRPr lang="en-US" sz="3600" dirty="0"/>
           </a:p>
         </p:txBody>
       </p:sp>
     </p:spTree>
     <p:extLst>
       <p:ext uri="{BB962C8B-B14F-4D97-AF65-F5344CB8AC3E}">
-        <p14:creationId xmlns:p14="http://schemas.microsoft.com/office/powerpoint/2010/main" val="3208609425"/>
+        <p14:creationId xmlns:p14="http://schemas.microsoft.com/office/powerpoint/2010/main" val="1967416131"/>
       </p:ext>
     </p:extLst>
   </p:cSld>
@@ -4043,12 +4143,12 @@
       </p:grpSpPr>
       <p:sp>
         <p:nvSpPr>
-          <p:cNvPr id="6" name="Text Placeholder 5"/>
-          <p:cNvSpPr>
-            <a:spLocks noGrp="1"/>
-          </p:cNvSpPr>
-          <p:nvPr>
-            <p:ph type="body" sz="quarter" idx="11"/>
+          <p:cNvPr id="2" name="Title 1"/>
+          <p:cNvSpPr>
+            <a:spLocks noGrp="1"/>
+          </p:cNvSpPr>
+          <p:nvPr>
+            <p:ph type="title"/>
           </p:nvPr>
         </p:nvSpPr>
         <p:spPr/>
@@ -4056,80 +4156,101 @@
           <a:bodyPr/>
           <a:lstStyle/>
           <a:p>
-            <a:endParaRPr lang="en-US" dirty="0"/>
-          </a:p>
-        </p:txBody>
-      </p:sp>
-      <p:sp>
-        <p:nvSpPr>
-          <p:cNvPr id="29" name="Text Placeholder 28"/>
-          <p:cNvSpPr>
-            <a:spLocks noGrp="1"/>
-          </p:cNvSpPr>
-          <p:nvPr>
-            <p:ph type="body" sz="quarter" idx="10"/>
-          </p:nvPr>
-        </p:nvSpPr>
-        <p:spPr/>
-        <p:txBody>
-          <a:bodyPr/>
-          <a:lstStyle/>
-          <a:p>
-            <a:r>
-              <a:rPr lang="pt-PT" sz="16600" dirty="0"/>
-              <a:t>04</a:t>
-            </a:r>
-          </a:p>
-        </p:txBody>
-      </p:sp>
-      <p:sp>
-        <p:nvSpPr>
-          <p:cNvPr id="4" name="Title 3"/>
-          <p:cNvSpPr>
-            <a:spLocks noGrp="1"/>
-          </p:cNvSpPr>
-          <p:nvPr>
-            <p:ph type="title"/>
+            <a:r>
+              <a:rPr lang="en-US" dirty="0"/>
+              <a:t>Data abstraction</a:t>
+            </a:r>
+            <a:endParaRPr lang="pt-PT" dirty="0"/>
+          </a:p>
+        </p:txBody>
+      </p:sp>
+      <p:sp>
+        <p:nvSpPr>
+          <p:cNvPr id="3" name="Content Placeholder 2"/>
+          <p:cNvSpPr>
+            <a:spLocks noGrp="1"/>
+          </p:cNvSpPr>
+          <p:nvPr>
+            <p:ph idx="1"/>
           </p:nvPr>
         </p:nvSpPr>
         <p:spPr>
           <a:xfrm>
-            <a:off x="2281222" y="3214686"/>
-            <a:ext cx="6786578" cy="3033714"/>
+            <a:off x="457200" y="1094346"/>
+            <a:ext cx="8229600" cy="5214974"/>
           </a:xfrm>
-          <a:solidFill>
-            <a:srgbClr val="FFFFFF">
-              <a:alpha val="80000"/>
-            </a:srgbClr>
-          </a:solidFill>
         </p:spPr>
         <p:txBody>
-          <a:bodyPr rIns="288000">
+          <a:bodyPr>
             <a:noAutofit/>
           </a:bodyPr>
           <a:lstStyle/>
           <a:p>
-            <a:pPr marL="0" algn="r"/>
-            <a:r>
-              <a:rPr lang="pt-PT" sz="6000" dirty="0" err="1"/>
-              <a:t>Dataset</a:t>
-            </a:r>
-            <a:r>
-              <a:rPr lang="pt-PT" sz="6000" dirty="0"/>
-              <a:t> </a:t>
-            </a:r>
-            <a:r>
-              <a:rPr lang="pt-PT" sz="6000" dirty="0" err="1"/>
-              <a:t>processing</a:t>
-            </a:r>
-            <a:endParaRPr lang="pt-PT" sz="6000" dirty="0"/>
+            <a:pPr lvl="1"/>
+            <a:r>
+              <a:rPr lang="en-US" sz="3200" dirty="0"/>
+              <a:t>Item1 description</a:t>
+            </a:r>
+          </a:p>
+          <a:p>
+            <a:pPr lvl="1"/>
+            <a:r>
+              <a:rPr lang="en-US" sz="2400" dirty="0"/>
+              <a:t>	Attribute1 description</a:t>
+            </a:r>
+            <a:endParaRPr lang="en-US" sz="1800" dirty="0"/>
+          </a:p>
+          <a:p>
+            <a:pPr lvl="1"/>
+            <a:r>
+              <a:rPr lang="en-US" sz="2400" dirty="0"/>
+              <a:t>	Attribute2 description</a:t>
+            </a:r>
+          </a:p>
+          <a:p>
+            <a:pPr lvl="1"/>
+            <a:endParaRPr lang="en-US" sz="1800" dirty="0"/>
+          </a:p>
+          <a:p>
+            <a:pPr lvl="1"/>
+            <a:r>
+              <a:rPr lang="en-US" sz="3200" dirty="0"/>
+              <a:t>Item2 description</a:t>
+            </a:r>
+          </a:p>
+          <a:p>
+            <a:pPr lvl="1"/>
+            <a:r>
+              <a:rPr lang="en-US" sz="2400" dirty="0"/>
+              <a:t>	Attribute1 description</a:t>
+            </a:r>
+            <a:endParaRPr lang="en-US" sz="1800" dirty="0"/>
+          </a:p>
+          <a:p>
+            <a:pPr lvl="1"/>
+            <a:r>
+              <a:rPr lang="en-US" sz="2400" dirty="0"/>
+              <a:t>	Attribute2 description</a:t>
+            </a:r>
+            <a:endParaRPr lang="en-US" sz="1800" dirty="0"/>
+          </a:p>
+          <a:p>
+            <a:pPr lvl="1"/>
+            <a:endParaRPr lang="en-US" sz="3200" dirty="0"/>
+          </a:p>
+          <a:p>
+            <a:pPr lvl="1"/>
+            <a:r>
+              <a:rPr lang="en-US" sz="3200" dirty="0"/>
+              <a:t>…</a:t>
+            </a:r>
           </a:p>
         </p:txBody>
       </p:sp>
     </p:spTree>
     <p:extLst>
       <p:ext uri="{BB962C8B-B14F-4D97-AF65-F5344CB8AC3E}">
-        <p14:creationId xmlns:p14="http://schemas.microsoft.com/office/powerpoint/2010/main" val="4045494449"/>
+        <p14:creationId xmlns:p14="http://schemas.microsoft.com/office/powerpoint/2010/main" val="1828594822"/>
       </p:ext>
     </p:extLst>
   </p:cSld>
@@ -4173,7 +4294,7 @@
           <a:p>
             <a:r>
               <a:rPr lang="en-US" dirty="0"/>
-              <a:t>Dataset processing</a:t>
+              <a:t>Data abstraction</a:t>
             </a:r>
             <a:endParaRPr lang="pt-PT" dirty="0"/>
           </a:p>
@@ -4202,36 +4323,8 @@
           <a:lstStyle/>
           <a:p>
             <a:r>
-              <a:rPr lang="en-US" sz="4000" dirty="0"/>
-              <a:t>Dataset cleaning description</a:t>
-            </a:r>
-          </a:p>
-          <a:p>
-            <a:endParaRPr lang="en-US" sz="4000" dirty="0"/>
-          </a:p>
-          <a:p>
-            <a:pPr lvl="1"/>
-            <a:r>
               <a:rPr lang="en-US" sz="3600" dirty="0"/>
-              <a:t>Entry1</a:t>
-            </a:r>
-          </a:p>
-          <a:p>
-            <a:pPr lvl="1"/>
-            <a:r>
-              <a:rPr lang="en-US" sz="3600" dirty="0"/>
-              <a:t>Entry2</a:t>
-            </a:r>
-          </a:p>
-          <a:p>
-            <a:pPr lvl="1"/>
-            <a:endParaRPr lang="en-US" sz="3600" dirty="0"/>
-          </a:p>
-          <a:p>
-            <a:pPr lvl="1"/>
-            <a:r>
-              <a:rPr lang="en-US" sz="3600" dirty="0"/>
-              <a:t>…</a:t>
+              <a:t>Semantics:</a:t>
             </a:r>
           </a:p>
         </p:txBody>
@@ -4239,7 +4332,7 @@
     </p:spTree>
     <p:extLst>
       <p:ext uri="{BB962C8B-B14F-4D97-AF65-F5344CB8AC3E}">
-        <p14:creationId xmlns:p14="http://schemas.microsoft.com/office/powerpoint/2010/main" val="3456915046"/>
+        <p14:creationId xmlns:p14="http://schemas.microsoft.com/office/powerpoint/2010/main" val="3208609425"/>
       </p:ext>
     </p:extLst>
   </p:cSld>
@@ -4268,96 +4361,93 @@
       </p:grpSpPr>
       <p:sp>
         <p:nvSpPr>
-          <p:cNvPr id="2" name="Title 1"/>
+          <p:cNvPr id="6" name="Text Placeholder 5"/>
+          <p:cNvSpPr>
+            <a:spLocks noGrp="1"/>
+          </p:cNvSpPr>
+          <p:nvPr>
+            <p:ph type="body" sz="quarter" idx="11"/>
+          </p:nvPr>
+        </p:nvSpPr>
+        <p:spPr/>
+        <p:txBody>
+          <a:bodyPr/>
+          <a:lstStyle/>
+          <a:p>
+            <a:endParaRPr lang="en-US" dirty="0"/>
+          </a:p>
+        </p:txBody>
+      </p:sp>
+      <p:sp>
+        <p:nvSpPr>
+          <p:cNvPr id="29" name="Text Placeholder 28"/>
+          <p:cNvSpPr>
+            <a:spLocks noGrp="1"/>
+          </p:cNvSpPr>
+          <p:nvPr>
+            <p:ph type="body" sz="quarter" idx="10"/>
+          </p:nvPr>
+        </p:nvSpPr>
+        <p:spPr/>
+        <p:txBody>
+          <a:bodyPr/>
+          <a:lstStyle/>
+          <a:p>
+            <a:r>
+              <a:rPr lang="pt-PT" sz="16600" dirty="0"/>
+              <a:t>04</a:t>
+            </a:r>
+          </a:p>
+        </p:txBody>
+      </p:sp>
+      <p:sp>
+        <p:nvSpPr>
+          <p:cNvPr id="4" name="Title 3"/>
           <p:cNvSpPr>
             <a:spLocks noGrp="1"/>
           </p:cNvSpPr>
           <p:nvPr>
             <p:ph type="title"/>
-          </p:nvPr>
-        </p:nvSpPr>
-        <p:spPr/>
-        <p:txBody>
-          <a:bodyPr/>
-          <a:lstStyle/>
-          <a:p>
-            <a:r>
-              <a:rPr lang="en-US" dirty="0"/>
-              <a:t>Dataset processing</a:t>
-            </a:r>
-            <a:endParaRPr lang="pt-PT" dirty="0"/>
-          </a:p>
-        </p:txBody>
-      </p:sp>
-      <p:sp>
-        <p:nvSpPr>
-          <p:cNvPr id="3" name="Content Placeholder 2"/>
-          <p:cNvSpPr>
-            <a:spLocks noGrp="1"/>
-          </p:cNvSpPr>
-          <p:nvPr>
-            <p:ph idx="1"/>
           </p:nvPr>
         </p:nvSpPr>
         <p:spPr>
           <a:xfrm>
-            <a:off x="457200" y="1094346"/>
-            <a:ext cx="8229600" cy="5214974"/>
+            <a:off x="2281222" y="3214686"/>
+            <a:ext cx="6786578" cy="3033714"/>
           </a:xfrm>
+          <a:solidFill>
+            <a:srgbClr val="FFFFFF">
+              <a:alpha val="80000"/>
+            </a:srgbClr>
+          </a:solidFill>
         </p:spPr>
         <p:txBody>
-          <a:bodyPr>
+          <a:bodyPr rIns="288000">
             <a:noAutofit/>
           </a:bodyPr>
           <a:lstStyle/>
           <a:p>
-            <a:r>
-              <a:rPr lang="en-US" sz="4000" dirty="0"/>
-              <a:t>Problems found:</a:t>
-            </a:r>
-          </a:p>
-          <a:p>
-            <a:pPr lvl="1"/>
-            <a:r>
-              <a:rPr lang="en-US" sz="3600" dirty="0"/>
-              <a:t>Problem 1</a:t>
-            </a:r>
-          </a:p>
-          <a:p>
-            <a:pPr lvl="1"/>
-            <a:r>
-              <a:rPr lang="en-US" sz="3600" dirty="0"/>
-              <a:t>Solution</a:t>
-            </a:r>
-          </a:p>
-          <a:p>
-            <a:pPr lvl="1"/>
-            <a:endParaRPr lang="en-US" sz="3600" dirty="0"/>
-          </a:p>
-          <a:p>
-            <a:pPr lvl="1"/>
-            <a:r>
-              <a:rPr lang="en-US" sz="3600" dirty="0"/>
-              <a:t>Problem 2</a:t>
-            </a:r>
-          </a:p>
-          <a:p>
-            <a:pPr lvl="1"/>
-            <a:r>
-              <a:rPr lang="en-US" sz="3600" dirty="0"/>
-              <a:t>Solution</a:t>
-            </a:r>
-            <a:endParaRPr lang="en-US" sz="4000" dirty="0"/>
-          </a:p>
-          <a:p>
-            <a:endParaRPr lang="en-US" sz="4000" dirty="0"/>
+            <a:pPr marL="0" algn="r"/>
+            <a:r>
+              <a:rPr lang="pt-PT" sz="6000" dirty="0" err="1"/>
+              <a:t>Dataset</a:t>
+            </a:r>
+            <a:r>
+              <a:rPr lang="pt-PT" sz="6000" dirty="0"/>
+              <a:t> </a:t>
+            </a:r>
+            <a:r>
+              <a:rPr lang="pt-PT" sz="6000" dirty="0" err="1"/>
+              <a:t>processing</a:t>
+            </a:r>
+            <a:endParaRPr lang="pt-PT" sz="6000" dirty="0"/>
           </a:p>
         </p:txBody>
       </p:sp>
     </p:spTree>
     <p:extLst>
       <p:ext uri="{BB962C8B-B14F-4D97-AF65-F5344CB8AC3E}">
-        <p14:creationId xmlns:p14="http://schemas.microsoft.com/office/powerpoint/2010/main" val="2665434140"/>
+        <p14:creationId xmlns:p14="http://schemas.microsoft.com/office/powerpoint/2010/main" val="4045494449"/>
       </p:ext>
     </p:extLst>
   </p:cSld>
@@ -4386,6 +4476,234 @@
       </p:grpSpPr>
       <p:sp>
         <p:nvSpPr>
+          <p:cNvPr id="2" name="Title 1"/>
+          <p:cNvSpPr>
+            <a:spLocks noGrp="1"/>
+          </p:cNvSpPr>
+          <p:nvPr>
+            <p:ph type="title"/>
+          </p:nvPr>
+        </p:nvSpPr>
+        <p:spPr/>
+        <p:txBody>
+          <a:bodyPr/>
+          <a:lstStyle/>
+          <a:p>
+            <a:r>
+              <a:rPr lang="en-US" dirty="0"/>
+              <a:t>Dataset processing</a:t>
+            </a:r>
+            <a:endParaRPr lang="pt-PT" dirty="0"/>
+          </a:p>
+        </p:txBody>
+      </p:sp>
+      <p:sp>
+        <p:nvSpPr>
+          <p:cNvPr id="3" name="Content Placeholder 2"/>
+          <p:cNvSpPr>
+            <a:spLocks noGrp="1"/>
+          </p:cNvSpPr>
+          <p:nvPr>
+            <p:ph idx="1"/>
+          </p:nvPr>
+        </p:nvSpPr>
+        <p:spPr>
+          <a:xfrm>
+            <a:off x="457200" y="1094346"/>
+            <a:ext cx="8229600" cy="5214974"/>
+          </a:xfrm>
+        </p:spPr>
+        <p:txBody>
+          <a:bodyPr>
+            <a:noAutofit/>
+          </a:bodyPr>
+          <a:lstStyle/>
+          <a:p>
+            <a:r>
+              <a:rPr lang="en-US" sz="4000" dirty="0"/>
+              <a:t>Dataset cleaning description</a:t>
+            </a:r>
+          </a:p>
+          <a:p>
+            <a:endParaRPr lang="en-US" sz="4000" dirty="0"/>
+          </a:p>
+          <a:p>
+            <a:pPr lvl="1"/>
+            <a:r>
+              <a:rPr lang="en-US" sz="3600" dirty="0"/>
+              <a:t>Entry1</a:t>
+            </a:r>
+          </a:p>
+          <a:p>
+            <a:pPr lvl="1"/>
+            <a:r>
+              <a:rPr lang="en-US" sz="3600" dirty="0"/>
+              <a:t>Entry2</a:t>
+            </a:r>
+          </a:p>
+          <a:p>
+            <a:pPr lvl="1"/>
+            <a:endParaRPr lang="en-US" sz="3600" dirty="0"/>
+          </a:p>
+          <a:p>
+            <a:pPr lvl="1"/>
+            <a:r>
+              <a:rPr lang="en-US" sz="3600" dirty="0"/>
+              <a:t>…</a:t>
+            </a:r>
+          </a:p>
+        </p:txBody>
+      </p:sp>
+    </p:spTree>
+    <p:extLst>
+      <p:ext uri="{BB962C8B-B14F-4D97-AF65-F5344CB8AC3E}">
+        <p14:creationId xmlns:p14="http://schemas.microsoft.com/office/powerpoint/2010/main" val="3456915046"/>
+      </p:ext>
+    </p:extLst>
+  </p:cSld>
+  <p:clrMapOvr>
+    <a:masterClrMapping/>
+  </p:clrMapOvr>
+</p:sld>
+</file>
+
+<file path=ppt/slides/slide15.xml><?xml version="1.0" encoding="utf-8"?>
+<p:sld xmlns:a="http://schemas.openxmlformats.org/drawingml/2006/main" xmlns:r="http://schemas.openxmlformats.org/officeDocument/2006/relationships" xmlns:p="http://schemas.openxmlformats.org/presentationml/2006/main">
+  <p:cSld>
+    <p:spTree>
+      <p:nvGrpSpPr>
+        <p:cNvPr id="1" name=""/>
+        <p:cNvGrpSpPr/>
+        <p:nvPr/>
+      </p:nvGrpSpPr>
+      <p:grpSpPr>
+        <a:xfrm>
+          <a:off x="0" y="0"/>
+          <a:ext cx="0" cy="0"/>
+          <a:chOff x="0" y="0"/>
+          <a:chExt cx="0" cy="0"/>
+        </a:xfrm>
+      </p:grpSpPr>
+      <p:sp>
+        <p:nvSpPr>
+          <p:cNvPr id="2" name="Title 1"/>
+          <p:cNvSpPr>
+            <a:spLocks noGrp="1"/>
+          </p:cNvSpPr>
+          <p:nvPr>
+            <p:ph type="title"/>
+          </p:nvPr>
+        </p:nvSpPr>
+        <p:spPr/>
+        <p:txBody>
+          <a:bodyPr/>
+          <a:lstStyle/>
+          <a:p>
+            <a:r>
+              <a:rPr lang="en-US" dirty="0"/>
+              <a:t>Dataset processing</a:t>
+            </a:r>
+            <a:endParaRPr lang="pt-PT" dirty="0"/>
+          </a:p>
+        </p:txBody>
+      </p:sp>
+      <p:sp>
+        <p:nvSpPr>
+          <p:cNvPr id="3" name="Content Placeholder 2"/>
+          <p:cNvSpPr>
+            <a:spLocks noGrp="1"/>
+          </p:cNvSpPr>
+          <p:nvPr>
+            <p:ph idx="1"/>
+          </p:nvPr>
+        </p:nvSpPr>
+        <p:spPr>
+          <a:xfrm>
+            <a:off x="457200" y="1094346"/>
+            <a:ext cx="8229600" cy="5214974"/>
+          </a:xfrm>
+        </p:spPr>
+        <p:txBody>
+          <a:bodyPr>
+            <a:noAutofit/>
+          </a:bodyPr>
+          <a:lstStyle/>
+          <a:p>
+            <a:r>
+              <a:rPr lang="en-US" sz="4000" dirty="0"/>
+              <a:t>Problems found:</a:t>
+            </a:r>
+          </a:p>
+          <a:p>
+            <a:pPr lvl="1"/>
+            <a:r>
+              <a:rPr lang="en-US" sz="3600" dirty="0"/>
+              <a:t>Problem 1</a:t>
+            </a:r>
+          </a:p>
+          <a:p>
+            <a:pPr lvl="1"/>
+            <a:r>
+              <a:rPr lang="en-US" sz="3600" dirty="0"/>
+              <a:t>Solution</a:t>
+            </a:r>
+          </a:p>
+          <a:p>
+            <a:pPr lvl="1"/>
+            <a:endParaRPr lang="en-US" sz="3600" dirty="0"/>
+          </a:p>
+          <a:p>
+            <a:pPr lvl="1"/>
+            <a:r>
+              <a:rPr lang="en-US" sz="3600" dirty="0"/>
+              <a:t>Problem 2</a:t>
+            </a:r>
+          </a:p>
+          <a:p>
+            <a:pPr lvl="1"/>
+            <a:r>
+              <a:rPr lang="en-US" sz="3600" dirty="0"/>
+              <a:t>Solution</a:t>
+            </a:r>
+            <a:endParaRPr lang="en-US" sz="4000" dirty="0"/>
+          </a:p>
+          <a:p>
+            <a:endParaRPr lang="en-US" sz="4000" dirty="0"/>
+          </a:p>
+        </p:txBody>
+      </p:sp>
+    </p:spTree>
+    <p:extLst>
+      <p:ext uri="{BB962C8B-B14F-4D97-AF65-F5344CB8AC3E}">
+        <p14:creationId xmlns:p14="http://schemas.microsoft.com/office/powerpoint/2010/main" val="2665434140"/>
+      </p:ext>
+    </p:extLst>
+  </p:cSld>
+  <p:clrMapOvr>
+    <a:masterClrMapping/>
+  </p:clrMapOvr>
+</p:sld>
+</file>
+
+<file path=ppt/slides/slide16.xml><?xml version="1.0" encoding="utf-8"?>
+<p:sld xmlns:a="http://schemas.openxmlformats.org/drawingml/2006/main" xmlns:r="http://schemas.openxmlformats.org/officeDocument/2006/relationships" xmlns:p="http://schemas.openxmlformats.org/presentationml/2006/main">
+  <p:cSld>
+    <p:spTree>
+      <p:nvGrpSpPr>
+        <p:cNvPr id="1" name=""/>
+        <p:cNvGrpSpPr/>
+        <p:nvPr/>
+      </p:nvGrpSpPr>
+      <p:grpSpPr>
+        <a:xfrm>
+          <a:off x="0" y="0"/>
+          <a:ext cx="0" cy="0"/>
+          <a:chOff x="0" y="0"/>
+          <a:chExt cx="0" cy="0"/>
+        </a:xfrm>
+      </p:grpSpPr>
+      <p:sp>
+        <p:nvSpPr>
           <p:cNvPr id="6" name="Text Placeholder 5"/>
           <p:cNvSpPr>
             <a:spLocks noGrp="1"/>
@@ -4474,7 +4792,7 @@
 </p:sld>
 </file>
 
-<file path=ppt/slides/slide15.xml><?xml version="1.0" encoding="utf-8"?>
+<file path=ppt/slides/slide17.xml><?xml version="1.0" encoding="utf-8"?>
 <p:sld xmlns:a="http://schemas.openxmlformats.org/drawingml/2006/main" xmlns:r="http://schemas.openxmlformats.org/officeDocument/2006/relationships" xmlns:p="http://schemas.openxmlformats.org/presentationml/2006/main">
   <p:cSld>
     <p:spTree>
@@ -4749,22 +5067,109 @@
           </a:bodyPr>
           <a:lstStyle/>
           <a:p>
+            <a:pPr marL="571500" indent="-571500">
+              <a:buFont typeface="Arial" panose="020B0604020202020204" pitchFamily="34" charset="0"/>
+              <a:buChar char="•"/>
+            </a:pPr>
             <a:r>
               <a:rPr lang="en-US" sz="4000" dirty="0"/>
-              <a:t>Description</a:t>
-            </a:r>
+              <a:t>Eurostat</a:t>
+            </a:r>
+          </a:p>
+          <a:p>
+            <a:pPr lvl="1">
+              <a:buFont typeface="Arial" panose="020B0604020202020204" pitchFamily="34" charset="0"/>
+              <a:buChar char="•"/>
+            </a:pPr>
+            <a:r>
+              <a:rPr lang="en-US" sz="2500" dirty="0"/>
+              <a:t>Early leavers from education</a:t>
+            </a:r>
+          </a:p>
+          <a:p>
+            <a:pPr lvl="1">
+              <a:buFont typeface="Arial" panose="020B0604020202020204" pitchFamily="34" charset="0"/>
+              <a:buChar char="•"/>
+            </a:pPr>
+            <a:endParaRPr lang="en-US" sz="2100" dirty="0"/>
           </a:p>
           <a:p>
             <a:endParaRPr lang="en-US" sz="4000" dirty="0"/>
           </a:p>
-          <a:p>
-            <a:r>
-              <a:rPr lang="en-US" sz="4000" dirty="0"/>
-              <a:t>Data sample</a:t>
-            </a:r>
-          </a:p>
-        </p:txBody>
-      </p:sp>
+        </p:txBody>
+      </p:sp>
+      <p:pic>
+        <p:nvPicPr>
+          <p:cNvPr id="5" name="Imagem 4" descr="Uma imagem com desenho&#10;&#10;Descrição gerada automaticamente">
+            <a:extLst>
+              <a:ext uri="{FF2B5EF4-FFF2-40B4-BE49-F238E27FC236}">
+                <a16:creationId xmlns:a16="http://schemas.microsoft.com/office/drawing/2014/main" id="{CC51C291-8C94-475E-9AF9-76301D0D39CE}"/>
+              </a:ext>
+            </a:extLst>
+          </p:cNvPr>
+          <p:cNvPicPr>
+            <a:picLocks noChangeAspect="1"/>
+          </p:cNvPicPr>
+          <p:nvPr/>
+        </p:nvPicPr>
+        <p:blipFill>
+          <a:blip r:embed="rId3">
+            <a:extLst>
+              <a:ext uri="{28A0092B-C50C-407E-A947-70E740481C1C}">
+                <a14:useLocalDpi xmlns:a14="http://schemas.microsoft.com/office/drawing/2010/main" val="0"/>
+              </a:ext>
+            </a:extLst>
+          </a:blip>
+          <a:stretch>
+            <a:fillRect/>
+          </a:stretch>
+        </p:blipFill>
+        <p:spPr>
+          <a:xfrm>
+            <a:off x="4571984" y="733721"/>
+            <a:ext cx="4474840" cy="1469239"/>
+          </a:xfrm>
+          <a:prstGeom prst="rect">
+            <a:avLst/>
+          </a:prstGeom>
+        </p:spPr>
+      </p:pic>
+      <p:pic>
+        <p:nvPicPr>
+          <p:cNvPr id="7" name="Imagem 6" descr="Uma imagem com fotografia, pessoas, computador, grupo&#10;&#10;Descrição gerada automaticamente">
+            <a:extLst>
+              <a:ext uri="{FF2B5EF4-FFF2-40B4-BE49-F238E27FC236}">
+                <a16:creationId xmlns:a16="http://schemas.microsoft.com/office/drawing/2014/main" id="{0C5F7BA8-1EC0-4B55-8B3E-3606A2712A96}"/>
+              </a:ext>
+            </a:extLst>
+          </p:cNvPr>
+          <p:cNvPicPr>
+            <a:picLocks noChangeAspect="1"/>
+          </p:cNvPicPr>
+          <p:nvPr/>
+        </p:nvPicPr>
+        <p:blipFill>
+          <a:blip r:embed="rId4">
+            <a:extLst>
+              <a:ext uri="{28A0092B-C50C-407E-A947-70E740481C1C}">
+                <a14:useLocalDpi xmlns:a14="http://schemas.microsoft.com/office/drawing/2010/main" val="0"/>
+              </a:ext>
+            </a:extLst>
+          </a:blip>
+          <a:stretch>
+            <a:fillRect/>
+          </a:stretch>
+        </p:blipFill>
+        <p:spPr>
+          <a:xfrm>
+            <a:off x="932926" y="2634342"/>
+            <a:ext cx="7278116" cy="2667372"/>
+          </a:xfrm>
+          <a:prstGeom prst="rect">
+            <a:avLst/>
+          </a:prstGeom>
+        </p:spPr>
+      </p:pic>
     </p:spTree>
     <p:extLst>
       <p:ext uri="{BB962C8B-B14F-4D97-AF65-F5344CB8AC3E}">
@@ -4797,12 +5202,18 @@
       </p:grpSpPr>
       <p:sp>
         <p:nvSpPr>
-          <p:cNvPr id="6" name="Text Placeholder 5"/>
-          <p:cNvSpPr>
-            <a:spLocks noGrp="1"/>
-          </p:cNvSpPr>
-          <p:nvPr>
-            <p:ph type="body" sz="quarter" idx="11"/>
+          <p:cNvPr id="2" name="Título 1">
+            <a:extLst>
+              <a:ext uri="{FF2B5EF4-FFF2-40B4-BE49-F238E27FC236}">
+                <a16:creationId xmlns:a16="http://schemas.microsoft.com/office/drawing/2014/main" id="{08514F0C-F05E-4923-8C72-92155CDF47DF}"/>
+              </a:ext>
+            </a:extLst>
+          </p:cNvPr>
+          <p:cNvSpPr>
+            <a:spLocks noGrp="1"/>
+          </p:cNvSpPr>
+          <p:nvPr>
+            <p:ph type="title"/>
           </p:nvPr>
         </p:nvSpPr>
         <p:spPr/>
@@ -4810,83 +5221,158 @@
           <a:bodyPr/>
           <a:lstStyle/>
           <a:p>
-            <a:endParaRPr lang="en-US" dirty="0"/>
-          </a:p>
-        </p:txBody>
-      </p:sp>
-      <p:sp>
-        <p:nvSpPr>
-          <p:cNvPr id="29" name="Text Placeholder 28"/>
-          <p:cNvSpPr>
-            <a:spLocks noGrp="1"/>
-          </p:cNvSpPr>
-          <p:nvPr>
-            <p:ph type="body" sz="quarter" idx="10"/>
+            <a:endParaRPr lang="pt-PT"/>
+          </a:p>
+        </p:txBody>
+      </p:sp>
+      <p:sp>
+        <p:nvSpPr>
+          <p:cNvPr id="3" name="Marcador de Posição de Conteúdo 2">
+            <a:extLst>
+              <a:ext uri="{FF2B5EF4-FFF2-40B4-BE49-F238E27FC236}">
+                <a16:creationId xmlns:a16="http://schemas.microsoft.com/office/drawing/2014/main" id="{762EEDB0-E0F7-4BF4-8379-8E237F8C2A54}"/>
+              </a:ext>
+            </a:extLst>
+          </p:cNvPr>
+          <p:cNvSpPr>
+            <a:spLocks noGrp="1"/>
+          </p:cNvSpPr>
+          <p:nvPr>
+            <p:ph idx="1"/>
           </p:nvPr>
         </p:nvSpPr>
         <p:spPr/>
         <p:txBody>
-          <a:bodyPr/>
-          <a:lstStyle/>
-          <a:p>
-            <a:r>
-              <a:rPr lang="pt-PT" sz="16600" dirty="0"/>
-              <a:t>02</a:t>
-            </a:r>
-          </a:p>
-        </p:txBody>
-      </p:sp>
-      <p:sp>
-        <p:nvSpPr>
-          <p:cNvPr id="4" name="Title 3"/>
-          <p:cNvSpPr>
-            <a:spLocks noGrp="1"/>
-          </p:cNvSpPr>
-          <p:nvPr>
-            <p:ph type="title"/>
-          </p:nvPr>
-        </p:nvSpPr>
+          <a:bodyPr>
+            <a:normAutofit/>
+          </a:bodyPr>
+          <a:lstStyle/>
+          <a:p>
+            <a:pPr marL="971550" lvl="1" indent="-571500">
+              <a:buFont typeface="Arial" panose="020B0604020202020204" pitchFamily="34" charset="0"/>
+              <a:buChar char="•"/>
+            </a:pPr>
+            <a:r>
+              <a:rPr lang="en-US" sz="2500" dirty="0"/>
+              <a:t>Average income by education level</a:t>
+            </a:r>
+          </a:p>
+          <a:p>
+            <a:pPr marL="971550" lvl="1" indent="-571500">
+              <a:buFont typeface="Arial" panose="020B0604020202020204" pitchFamily="34" charset="0"/>
+              <a:buChar char="•"/>
+            </a:pPr>
+            <a:endParaRPr lang="en-US" sz="2100" dirty="0"/>
+          </a:p>
+          <a:p>
+            <a:pPr marL="971550" lvl="1" indent="-571500">
+              <a:buFont typeface="Arial" panose="020B0604020202020204" pitchFamily="34" charset="0"/>
+              <a:buChar char="•"/>
+            </a:pPr>
+            <a:endParaRPr lang="en-US" sz="2100" dirty="0"/>
+          </a:p>
+          <a:p>
+            <a:pPr marL="971550" lvl="1" indent="-571500">
+              <a:buFont typeface="Arial" panose="020B0604020202020204" pitchFamily="34" charset="0"/>
+              <a:buChar char="•"/>
+            </a:pPr>
+            <a:endParaRPr lang="en-US" sz="2500" dirty="0"/>
+          </a:p>
+          <a:p>
+            <a:pPr marL="971550" lvl="1" indent="-571500">
+              <a:buFont typeface="Arial" panose="020B0604020202020204" pitchFamily="34" charset="0"/>
+              <a:buChar char="•"/>
+            </a:pPr>
+            <a:r>
+              <a:rPr lang="en-US" sz="2500" dirty="0"/>
+              <a:t>Share of household expense in books/ reading material</a:t>
+            </a:r>
+          </a:p>
+          <a:p>
+            <a:pPr marL="971550" lvl="1" indent="-571500">
+              <a:buFont typeface="Arial" panose="020B0604020202020204" pitchFamily="34" charset="0"/>
+              <a:buChar char="•"/>
+            </a:pPr>
+            <a:endParaRPr lang="en-US" sz="2100" dirty="0"/>
+          </a:p>
+        </p:txBody>
+      </p:sp>
+      <p:pic>
+        <p:nvPicPr>
+          <p:cNvPr id="5" name="Imagem 4">
+            <a:extLst>
+              <a:ext uri="{FF2B5EF4-FFF2-40B4-BE49-F238E27FC236}">
+                <a16:creationId xmlns:a16="http://schemas.microsoft.com/office/drawing/2014/main" id="{08D3A171-9B99-460D-97B7-DE1F85C31650}"/>
+              </a:ext>
+            </a:extLst>
+          </p:cNvPr>
+          <p:cNvPicPr>
+            <a:picLocks noChangeAspect="1"/>
+          </p:cNvPicPr>
+          <p:nvPr/>
+        </p:nvPicPr>
+        <p:blipFill>
+          <a:blip r:embed="rId2">
+            <a:extLst>
+              <a:ext uri="{28A0092B-C50C-407E-A947-70E740481C1C}">
+                <a14:useLocalDpi xmlns:a14="http://schemas.microsoft.com/office/drawing/2010/main" val="0"/>
+              </a:ext>
+            </a:extLst>
+          </a:blip>
+          <a:stretch>
+            <a:fillRect/>
+          </a:stretch>
+        </p:blipFill>
         <p:spPr>
           <a:xfrm>
-            <a:off x="1907704" y="3214686"/>
-            <a:ext cx="7160096" cy="3033714"/>
+            <a:off x="926339" y="1844101"/>
+            <a:ext cx="7279200" cy="757732"/>
           </a:xfrm>
-          <a:solidFill>
-            <a:srgbClr val="FFFFFF">
-              <a:alpha val="80000"/>
-            </a:srgbClr>
-          </a:solidFill>
+          <a:prstGeom prst="rect">
+            <a:avLst/>
+          </a:prstGeom>
         </p:spPr>
-        <p:txBody>
-          <a:bodyPr rIns="288000">
-            <a:noAutofit/>
-          </a:bodyPr>
-          <a:lstStyle/>
-          <a:p>
-            <a:pPr marL="0" algn="r"/>
-            <a:r>
-              <a:rPr lang="pt-PT" sz="6000" dirty="0" err="1"/>
-              <a:t>Selected</a:t>
-            </a:r>
-            <a:r>
-              <a:rPr lang="pt-PT" sz="6000" dirty="0"/>
-              <a:t> / </a:t>
-            </a:r>
-            <a:r>
-              <a:rPr lang="pt-PT" sz="6000" dirty="0" err="1"/>
-              <a:t>derived</a:t>
-            </a:r>
-            <a:r>
-              <a:rPr lang="pt-PT" sz="6000" dirty="0"/>
-              <a:t> data</a:t>
-            </a:r>
-          </a:p>
-        </p:txBody>
-      </p:sp>
+      </p:pic>
+      <p:pic>
+        <p:nvPicPr>
+          <p:cNvPr id="7" name="Imagem 6" descr="Uma imagem com captura de ecrã, fotografia, ecrã, preto&#10;&#10;Descrição gerada automaticamente">
+            <a:extLst>
+              <a:ext uri="{FF2B5EF4-FFF2-40B4-BE49-F238E27FC236}">
+                <a16:creationId xmlns:a16="http://schemas.microsoft.com/office/drawing/2014/main" id="{B87AD21D-3A4F-4304-8AF3-8CD7346A280C}"/>
+              </a:ext>
+            </a:extLst>
+          </p:cNvPr>
+          <p:cNvPicPr>
+            <a:picLocks noChangeAspect="1"/>
+          </p:cNvPicPr>
+          <p:nvPr/>
+        </p:nvPicPr>
+        <p:blipFill>
+          <a:blip r:embed="rId3">
+            <a:extLst>
+              <a:ext uri="{28A0092B-C50C-407E-A947-70E740481C1C}">
+                <a14:useLocalDpi xmlns:a14="http://schemas.microsoft.com/office/drawing/2010/main" val="0"/>
+              </a:ext>
+            </a:extLst>
+          </a:blip>
+          <a:stretch>
+            <a:fillRect/>
+          </a:stretch>
+        </p:blipFill>
+        <p:spPr>
+          <a:xfrm>
+            <a:off x="926339" y="3917805"/>
+            <a:ext cx="7279200" cy="1909298"/>
+          </a:xfrm>
+          <a:prstGeom prst="rect">
+            <a:avLst/>
+          </a:prstGeom>
+        </p:spPr>
+      </p:pic>
     </p:spTree>
     <p:extLst>
       <p:ext uri="{BB962C8B-B14F-4D97-AF65-F5344CB8AC3E}">
-        <p14:creationId xmlns:p14="http://schemas.microsoft.com/office/powerpoint/2010/main" val="627357321"/>
+        <p14:creationId xmlns:p14="http://schemas.microsoft.com/office/powerpoint/2010/main" val="3788798939"/>
       </p:ext>
     </p:extLst>
   </p:cSld>
@@ -4915,7 +5401,13 @@
       </p:grpSpPr>
       <p:sp>
         <p:nvSpPr>
-          <p:cNvPr id="2" name="Title 1"/>
+          <p:cNvPr id="2" name="Título 1">
+            <a:extLst>
+              <a:ext uri="{FF2B5EF4-FFF2-40B4-BE49-F238E27FC236}">
+                <a16:creationId xmlns:a16="http://schemas.microsoft.com/office/drawing/2014/main" id="{D4F6C074-6AE6-41AC-9209-18B76971328B}"/>
+              </a:ext>
+            </a:extLst>
+          </p:cNvPr>
           <p:cNvSpPr>
             <a:spLocks noGrp="1"/>
           </p:cNvSpPr>
@@ -4928,17 +5420,19 @@
           <a:bodyPr/>
           <a:lstStyle/>
           <a:p>
-            <a:r>
-              <a:rPr lang="en-US" dirty="0"/>
-              <a:t>Selected data</a:t>
-            </a:r>
-            <a:endParaRPr lang="pt-PT" dirty="0"/>
-          </a:p>
-        </p:txBody>
-      </p:sp>
-      <p:sp>
-        <p:nvSpPr>
-          <p:cNvPr id="3" name="Content Placeholder 2"/>
+            <a:endParaRPr lang="pt-PT"/>
+          </a:p>
+        </p:txBody>
+      </p:sp>
+      <p:sp>
+        <p:nvSpPr>
+          <p:cNvPr id="3" name="Marcador de Posição de Conteúdo 2">
+            <a:extLst>
+              <a:ext uri="{FF2B5EF4-FFF2-40B4-BE49-F238E27FC236}">
+                <a16:creationId xmlns:a16="http://schemas.microsoft.com/office/drawing/2014/main" id="{3A14ABEB-85CD-4852-9CFE-FB30D06417F6}"/>
+              </a:ext>
+            </a:extLst>
+          </p:cNvPr>
           <p:cNvSpPr>
             <a:spLocks noGrp="1"/>
           </p:cNvSpPr>
@@ -4946,28 +5440,182 @@
             <p:ph idx="1"/>
           </p:nvPr>
         </p:nvSpPr>
-        <p:spPr/>
+        <p:spPr>
+          <a:xfrm>
+            <a:off x="457200" y="1285860"/>
+            <a:ext cx="8229600" cy="5214974"/>
+          </a:xfrm>
+        </p:spPr>
         <p:txBody>
           <a:bodyPr>
-            <a:noAutofit/>
+            <a:normAutofit/>
           </a:bodyPr>
           <a:lstStyle/>
           <a:p>
-            <a:r>
-              <a:rPr lang="en-US" sz="4000" dirty="0"/>
-              <a:t>Data description</a:t>
-            </a:r>
-          </a:p>
-          <a:p>
-            <a:pPr lvl="1"/>
-            <a:endParaRPr lang="en-US" dirty="0"/>
-          </a:p>
-        </p:txBody>
-      </p:sp>
+            <a:pPr lvl="1">
+              <a:buFont typeface="Arial" panose="020B0604020202020204" pitchFamily="34" charset="0"/>
+              <a:buChar char="•"/>
+            </a:pPr>
+            <a:r>
+              <a:rPr lang="pt-PT" sz="2500" dirty="0" err="1"/>
+              <a:t>Average</a:t>
+            </a:r>
+            <a:r>
+              <a:rPr lang="pt-PT" sz="2500" dirty="0"/>
+              <a:t> time </a:t>
+            </a:r>
+            <a:r>
+              <a:rPr lang="pt-PT" sz="2500" dirty="0" err="1"/>
+              <a:t>spent</a:t>
+            </a:r>
+            <a:r>
+              <a:rPr lang="pt-PT" sz="2500" dirty="0"/>
+              <a:t> Reading</a:t>
+            </a:r>
+          </a:p>
+          <a:p>
+            <a:pPr lvl="1">
+              <a:buFont typeface="Arial" panose="020B0604020202020204" pitchFamily="34" charset="0"/>
+              <a:buChar char="•"/>
+            </a:pPr>
+            <a:endParaRPr lang="pt-PT" sz="2100" dirty="0"/>
+          </a:p>
+          <a:p>
+            <a:pPr lvl="1">
+              <a:buFont typeface="Arial" panose="020B0604020202020204" pitchFamily="34" charset="0"/>
+              <a:buChar char="•"/>
+            </a:pPr>
+            <a:endParaRPr lang="pt-PT" sz="2100" dirty="0"/>
+          </a:p>
+          <a:p>
+            <a:pPr lvl="1">
+              <a:buFont typeface="Arial" panose="020B0604020202020204" pitchFamily="34" charset="0"/>
+              <a:buChar char="•"/>
+            </a:pPr>
+            <a:endParaRPr lang="pt-PT" sz="2100" dirty="0"/>
+          </a:p>
+          <a:p>
+            <a:pPr lvl="1">
+              <a:buFont typeface="Arial" panose="020B0604020202020204" pitchFamily="34" charset="0"/>
+              <a:buChar char="•"/>
+            </a:pPr>
+            <a:endParaRPr lang="pt-PT" sz="2100" dirty="0"/>
+          </a:p>
+          <a:p>
+            <a:pPr lvl="1">
+              <a:buFont typeface="Arial" panose="020B0604020202020204" pitchFamily="34" charset="0"/>
+              <a:buChar char="•"/>
+            </a:pPr>
+            <a:r>
+              <a:rPr lang="pt-PT" sz="2500" dirty="0" err="1"/>
+              <a:t>Participation</a:t>
+            </a:r>
+            <a:r>
+              <a:rPr lang="pt-PT" sz="2500" dirty="0"/>
+              <a:t> rate in </a:t>
+            </a:r>
+            <a:r>
+              <a:rPr lang="pt-PT" sz="2500" dirty="0" err="1"/>
+              <a:t>education</a:t>
+            </a:r>
+            <a:r>
+              <a:rPr lang="pt-PT" sz="2500" dirty="0"/>
+              <a:t> </a:t>
+            </a:r>
+            <a:r>
+              <a:rPr lang="pt-PT" sz="2500" dirty="0" err="1"/>
+              <a:t>and</a:t>
+            </a:r>
+            <a:r>
+              <a:rPr lang="pt-PT" sz="2500" dirty="0"/>
+              <a:t> training</a:t>
+            </a:r>
+          </a:p>
+          <a:p>
+            <a:pPr lvl="1">
+              <a:buFont typeface="Arial" panose="020B0604020202020204" pitchFamily="34" charset="0"/>
+              <a:buChar char="•"/>
+            </a:pPr>
+            <a:endParaRPr lang="pt-PT" sz="2100" dirty="0"/>
+          </a:p>
+        </p:txBody>
+      </p:sp>
+      <p:pic>
+        <p:nvPicPr>
+          <p:cNvPr id="5" name="Imagem 4" descr="Uma imagem com captura de ecrã, computador, muitos, grupo&#10;&#10;Descrição gerada automaticamente">
+            <a:extLst>
+              <a:ext uri="{FF2B5EF4-FFF2-40B4-BE49-F238E27FC236}">
+                <a16:creationId xmlns:a16="http://schemas.microsoft.com/office/drawing/2014/main" id="{20B9E525-6A26-4E53-B312-971927EF7337}"/>
+              </a:ext>
+            </a:extLst>
+          </p:cNvPr>
+          <p:cNvPicPr>
+            <a:picLocks noChangeAspect="1"/>
+          </p:cNvPicPr>
+          <p:nvPr/>
+        </p:nvPicPr>
+        <p:blipFill>
+          <a:blip r:embed="rId3">
+            <a:extLst>
+              <a:ext uri="{28A0092B-C50C-407E-A947-70E740481C1C}">
+                <a14:useLocalDpi xmlns:a14="http://schemas.microsoft.com/office/drawing/2010/main" val="0"/>
+              </a:ext>
+            </a:extLst>
+          </a:blip>
+          <a:stretch>
+            <a:fillRect/>
+          </a:stretch>
+        </p:blipFill>
+        <p:spPr>
+          <a:xfrm>
+            <a:off x="924417" y="1859721"/>
+            <a:ext cx="7279200" cy="1122309"/>
+          </a:xfrm>
+          <a:prstGeom prst="rect">
+            <a:avLst/>
+          </a:prstGeom>
+        </p:spPr>
+      </p:pic>
+      <p:pic>
+        <p:nvPicPr>
+          <p:cNvPr id="7" name="Imagem 6" descr="Uma imagem com captura de ecrã, sala&#10;&#10;Descrição gerada automaticamente">
+            <a:extLst>
+              <a:ext uri="{FF2B5EF4-FFF2-40B4-BE49-F238E27FC236}">
+                <a16:creationId xmlns:a16="http://schemas.microsoft.com/office/drawing/2014/main" id="{AB04C82B-11C1-4921-A4F1-4B4022005F3A}"/>
+              </a:ext>
+            </a:extLst>
+          </p:cNvPr>
+          <p:cNvPicPr>
+            <a:picLocks noChangeAspect="1"/>
+          </p:cNvPicPr>
+          <p:nvPr/>
+        </p:nvPicPr>
+        <p:blipFill>
+          <a:blip r:embed="rId4">
+            <a:extLst>
+              <a:ext uri="{28A0092B-C50C-407E-A947-70E740481C1C}">
+                <a14:useLocalDpi xmlns:a14="http://schemas.microsoft.com/office/drawing/2010/main" val="0"/>
+              </a:ext>
+            </a:extLst>
+          </a:blip>
+          <a:stretch>
+            <a:fillRect/>
+          </a:stretch>
+        </p:blipFill>
+        <p:spPr>
+          <a:xfrm>
+            <a:off x="924417" y="4005064"/>
+            <a:ext cx="7279200" cy="1060845"/>
+          </a:xfrm>
+          <a:prstGeom prst="rect">
+            <a:avLst/>
+          </a:prstGeom>
+        </p:spPr>
+      </p:pic>
     </p:spTree>
     <p:extLst>
       <p:ext uri="{BB962C8B-B14F-4D97-AF65-F5344CB8AC3E}">
-        <p14:creationId xmlns:p14="http://schemas.microsoft.com/office/powerpoint/2010/main" val="2962997025"/>
+        <p14:creationId xmlns:p14="http://schemas.microsoft.com/office/powerpoint/2010/main" val="1552009504"/>
       </p:ext>
     </p:extLst>
   </p:cSld>
@@ -4996,7 +5644,48 @@
       </p:grpSpPr>
       <p:sp>
         <p:nvSpPr>
-          <p:cNvPr id="2" name="Title 1"/>
+          <p:cNvPr id="6" name="Text Placeholder 5"/>
+          <p:cNvSpPr>
+            <a:spLocks noGrp="1"/>
+          </p:cNvSpPr>
+          <p:nvPr>
+            <p:ph type="body" sz="quarter" idx="11"/>
+          </p:nvPr>
+        </p:nvSpPr>
+        <p:spPr/>
+        <p:txBody>
+          <a:bodyPr/>
+          <a:lstStyle/>
+          <a:p>
+            <a:endParaRPr lang="en-US" dirty="0"/>
+          </a:p>
+        </p:txBody>
+      </p:sp>
+      <p:sp>
+        <p:nvSpPr>
+          <p:cNvPr id="29" name="Text Placeholder 28"/>
+          <p:cNvSpPr>
+            <a:spLocks noGrp="1"/>
+          </p:cNvSpPr>
+          <p:nvPr>
+            <p:ph type="body" sz="quarter" idx="10"/>
+          </p:nvPr>
+        </p:nvSpPr>
+        <p:spPr/>
+        <p:txBody>
+          <a:bodyPr/>
+          <a:lstStyle/>
+          <a:p>
+            <a:r>
+              <a:rPr lang="pt-PT" sz="16600" dirty="0"/>
+              <a:t>02</a:t>
+            </a:r>
+          </a:p>
+        </p:txBody>
+      </p:sp>
+      <p:sp>
+        <p:nvSpPr>
+          <p:cNvPr id="4" name="Title 3"/>
           <p:cNvSpPr>
             <a:spLocks noGrp="1"/>
           </p:cNvSpPr>
@@ -5004,65 +5693,47 @@
             <p:ph type="title"/>
           </p:nvPr>
         </p:nvSpPr>
-        <p:spPr/>
-        <p:txBody>
-          <a:bodyPr/>
-          <a:lstStyle/>
-          <a:p>
-            <a:r>
-              <a:rPr lang="en-US" dirty="0"/>
-              <a:t>Derived data</a:t>
-            </a:r>
-            <a:endParaRPr lang="pt-PT" dirty="0"/>
-          </a:p>
-        </p:txBody>
-      </p:sp>
-      <p:sp>
-        <p:nvSpPr>
-          <p:cNvPr id="3" name="Content Placeholder 2"/>
-          <p:cNvSpPr>
-            <a:spLocks noGrp="1"/>
-          </p:cNvSpPr>
-          <p:nvPr>
-            <p:ph idx="1"/>
-          </p:nvPr>
-        </p:nvSpPr>
-        <p:spPr/>
-        <p:txBody>
-          <a:bodyPr>
+        <p:spPr>
+          <a:xfrm>
+            <a:off x="1907704" y="3214686"/>
+            <a:ext cx="7160096" cy="3033714"/>
+          </a:xfrm>
+          <a:solidFill>
+            <a:srgbClr val="FFFFFF">
+              <a:alpha val="80000"/>
+            </a:srgbClr>
+          </a:solidFill>
+        </p:spPr>
+        <p:txBody>
+          <a:bodyPr rIns="288000">
             <a:noAutofit/>
           </a:bodyPr>
           <a:lstStyle/>
           <a:p>
-            <a:r>
-              <a:rPr lang="en-US" sz="4000" dirty="0"/>
-              <a:t>Derived data description</a:t>
-            </a:r>
-          </a:p>
-          <a:p>
-            <a:pPr lvl="1"/>
-            <a:r>
-              <a:rPr lang="en-US" sz="3600" dirty="0"/>
-              <a:t>Which measures?</a:t>
-            </a:r>
-          </a:p>
-          <a:p>
-            <a:pPr lvl="1"/>
-            <a:r>
-              <a:rPr lang="en-US" sz="3600" dirty="0"/>
-              <a:t>Why?</a:t>
-            </a:r>
-          </a:p>
-          <a:p>
-            <a:pPr lvl="1"/>
-            <a:endParaRPr lang="en-US" dirty="0"/>
+            <a:pPr marL="0" algn="r"/>
+            <a:r>
+              <a:rPr lang="pt-PT" sz="6000" dirty="0" err="1"/>
+              <a:t>Selected</a:t>
+            </a:r>
+            <a:r>
+              <a:rPr lang="pt-PT" sz="6000" dirty="0"/>
+              <a:t> / </a:t>
+            </a:r>
+            <a:r>
+              <a:rPr lang="pt-PT" sz="6000" dirty="0" err="1"/>
+              <a:t>derived</a:t>
+            </a:r>
+            <a:r>
+              <a:rPr lang="pt-PT" sz="6000" dirty="0"/>
+              <a:t> data</a:t>
+            </a:r>
           </a:p>
         </p:txBody>
       </p:sp>
     </p:spTree>
     <p:extLst>
       <p:ext uri="{BB962C8B-B14F-4D97-AF65-F5344CB8AC3E}">
-        <p14:creationId xmlns:p14="http://schemas.microsoft.com/office/powerpoint/2010/main" val="1783310095"/>
+        <p14:creationId xmlns:p14="http://schemas.microsoft.com/office/powerpoint/2010/main" val="627357321"/>
       </p:ext>
     </p:extLst>
   </p:cSld>
@@ -5091,12 +5762,12 @@
       </p:grpSpPr>
       <p:sp>
         <p:nvSpPr>
-          <p:cNvPr id="6" name="Text Placeholder 5"/>
-          <p:cNvSpPr>
-            <a:spLocks noGrp="1"/>
-          </p:cNvSpPr>
-          <p:nvPr>
-            <p:ph type="body" sz="quarter" idx="11"/>
+          <p:cNvPr id="2" name="Title 1"/>
+          <p:cNvSpPr>
+            <a:spLocks noGrp="1"/>
+          </p:cNvSpPr>
+          <p:nvPr>
+            <p:ph type="title"/>
           </p:nvPr>
         </p:nvSpPr>
         <p:spPr/>
@@ -5104,76 +5775,116 @@
           <a:bodyPr/>
           <a:lstStyle/>
           <a:p>
-            <a:endParaRPr lang="en-US" dirty="0"/>
-          </a:p>
-        </p:txBody>
-      </p:sp>
-      <p:sp>
-        <p:nvSpPr>
-          <p:cNvPr id="29" name="Text Placeholder 28"/>
-          <p:cNvSpPr>
-            <a:spLocks noGrp="1"/>
-          </p:cNvSpPr>
-          <p:nvPr>
-            <p:ph type="body" sz="quarter" idx="10"/>
+            <a:r>
+              <a:rPr lang="en-US" dirty="0"/>
+              <a:t>Selected data</a:t>
+            </a:r>
+            <a:endParaRPr lang="pt-PT" dirty="0"/>
+          </a:p>
+        </p:txBody>
+      </p:sp>
+      <p:sp>
+        <p:nvSpPr>
+          <p:cNvPr id="3" name="Content Placeholder 2"/>
+          <p:cNvSpPr>
+            <a:spLocks noGrp="1"/>
+          </p:cNvSpPr>
+          <p:nvPr>
+            <p:ph idx="1"/>
           </p:nvPr>
         </p:nvSpPr>
         <p:spPr/>
         <p:txBody>
-          <a:bodyPr/>
-          <a:lstStyle/>
-          <a:p>
-            <a:r>
-              <a:rPr lang="pt-PT" sz="16600" dirty="0"/>
-              <a:t>03</a:t>
-            </a:r>
-          </a:p>
-        </p:txBody>
-      </p:sp>
-      <p:sp>
-        <p:nvSpPr>
-          <p:cNvPr id="4" name="Title 3"/>
-          <p:cNvSpPr>
-            <a:spLocks noGrp="1"/>
-          </p:cNvSpPr>
-          <p:nvPr>
-            <p:ph type="title"/>
-          </p:nvPr>
-        </p:nvSpPr>
-        <p:spPr>
-          <a:xfrm>
-            <a:off x="2281222" y="3214686"/>
-            <a:ext cx="6786578" cy="3033714"/>
-          </a:xfrm>
-          <a:solidFill>
-            <a:srgbClr val="FFFFFF">
-              <a:alpha val="80000"/>
-            </a:srgbClr>
-          </a:solidFill>
-        </p:spPr>
-        <p:txBody>
-          <a:bodyPr rIns="288000">
+          <a:bodyPr>
             <a:noAutofit/>
           </a:bodyPr>
           <a:lstStyle/>
           <a:p>
-            <a:pPr marL="0" algn="r"/>
-            <a:r>
-              <a:rPr lang="pt-PT" sz="6000" dirty="0"/>
-              <a:t>Data </a:t>
-            </a:r>
-            <a:r>
-              <a:rPr lang="pt-PT" sz="6000" dirty="0" err="1"/>
-              <a:t>abstraction</a:t>
-            </a:r>
-            <a:endParaRPr lang="pt-PT" sz="6000" dirty="0"/>
+            <a:r>
+              <a:rPr lang="en-US" sz="4000" dirty="0"/>
+              <a:t>Data description</a:t>
+            </a:r>
+          </a:p>
+          <a:p>
+            <a:pPr>
+              <a:buFont typeface="Arial" panose="020B0604020202020204" pitchFamily="34" charset="0"/>
+              <a:buChar char="•"/>
+            </a:pPr>
+            <a:r>
+              <a:rPr lang="en-US" sz="2500" b="0" dirty="0">
+                <a:solidFill>
+                  <a:schemeClr val="tx1"/>
+                </a:solidFill>
+              </a:rPr>
+              <a:t>Reading Time</a:t>
+            </a:r>
+          </a:p>
+          <a:p>
+            <a:pPr>
+              <a:buFont typeface="Arial" panose="020B0604020202020204" pitchFamily="34" charset="0"/>
+              <a:buChar char="•"/>
+            </a:pPr>
+            <a:r>
+              <a:rPr lang="en-US" sz="2500" b="0" dirty="0">
+                <a:solidFill>
+                  <a:schemeClr val="tx1"/>
+                </a:solidFill>
+              </a:rPr>
+              <a:t>Average income</a:t>
+            </a:r>
+          </a:p>
+          <a:p>
+            <a:pPr>
+              <a:buFont typeface="Arial" panose="020B0604020202020204" pitchFamily="34" charset="0"/>
+              <a:buChar char="•"/>
+            </a:pPr>
+            <a:r>
+              <a:rPr lang="en-US" sz="2500" b="0" dirty="0">
+                <a:solidFill>
+                  <a:schemeClr val="tx1"/>
+                </a:solidFill>
+              </a:rPr>
+              <a:t>Academic success</a:t>
+            </a:r>
+          </a:p>
+          <a:p>
+            <a:pPr>
+              <a:buFont typeface="Arial" panose="020B0604020202020204" pitchFamily="34" charset="0"/>
+              <a:buChar char="•"/>
+            </a:pPr>
+            <a:r>
+              <a:rPr lang="en-US" sz="2500" b="0" dirty="0">
+                <a:solidFill>
+                  <a:schemeClr val="tx1"/>
+                </a:solidFill>
+              </a:rPr>
+              <a:t>Expenditure in books</a:t>
+            </a:r>
+          </a:p>
+          <a:p>
+            <a:pPr>
+              <a:buFont typeface="Arial" panose="020B0604020202020204" pitchFamily="34" charset="0"/>
+              <a:buChar char="•"/>
+            </a:pPr>
+            <a:r>
+              <a:rPr lang="en-US" sz="2500" b="0" dirty="0">
+                <a:solidFill>
+                  <a:schemeClr val="tx1"/>
+                </a:solidFill>
+              </a:rPr>
+              <a:t>Participation in education</a:t>
+            </a:r>
+          </a:p>
+          <a:p>
+            <a:pPr lvl="1"/>
+            <a:endParaRPr lang="en-US" dirty="0"/>
           </a:p>
         </p:txBody>
       </p:sp>
     </p:spTree>
     <p:extLst>
       <p:ext uri="{BB962C8B-B14F-4D97-AF65-F5344CB8AC3E}">
-        <p14:creationId xmlns:p14="http://schemas.microsoft.com/office/powerpoint/2010/main" val="760072998"/>
+        <p14:creationId xmlns:p14="http://schemas.microsoft.com/office/powerpoint/2010/main" val="2962997025"/>
       </p:ext>
     </p:extLst>
   </p:cSld>
@@ -5217,7 +5928,7 @@
           <a:p>
             <a:r>
               <a:rPr lang="en-US" dirty="0"/>
-              <a:t>Data abstraction</a:t>
+              <a:t>Derived data</a:t>
             </a:r>
             <a:endParaRPr lang="pt-PT" dirty="0"/>
           </a:p>
@@ -5233,12 +5944,7 @@
             <p:ph idx="1"/>
           </p:nvPr>
         </p:nvSpPr>
-        <p:spPr>
-          <a:xfrm>
-            <a:off x="457200" y="1094346"/>
-            <a:ext cx="8229600" cy="5214974"/>
-          </a:xfrm>
-        </p:spPr>
+        <p:spPr/>
         <p:txBody>
           <a:bodyPr>
             <a:noAutofit/>
@@ -5246,29 +5952,70 @@
           <a:lstStyle/>
           <a:p>
             <a:r>
-              <a:rPr lang="en-US" sz="3600" dirty="0"/>
-              <a:t>Description:</a:t>
+              <a:rPr lang="en-US" sz="4000" dirty="0"/>
+              <a:t>Derived data description</a:t>
             </a:r>
           </a:p>
           <a:p>
             <a:pPr lvl="1"/>
-            <a:endParaRPr lang="en-US" sz="3200" dirty="0"/>
-          </a:p>
-          <a:p>
-            <a:r>
-              <a:rPr lang="en-US" sz="3600" dirty="0"/>
-              <a:t>Dataset type:</a:t>
-            </a:r>
-          </a:p>
-          <a:p>
+            <a:r>
+              <a:rPr lang="en-US" sz="2500" dirty="0"/>
+              <a:t>In the end, we want average values </a:t>
+            </a:r>
+            <a:r>
+              <a:rPr lang="en-US" sz="2500" dirty="0">
+                <a:solidFill>
+                  <a:schemeClr val="bg2"/>
+                </a:solidFill>
+              </a:rPr>
+              <a:t>by country</a:t>
+            </a:r>
+            <a:r>
+              <a:rPr lang="en-US" sz="2500" dirty="0"/>
+              <a:t>…</a:t>
+            </a:r>
             <a:endParaRPr lang="en-US" sz="3600" dirty="0"/>
+          </a:p>
+          <a:p>
+            <a:pPr lvl="1"/>
+            <a:endParaRPr lang="en-US" sz="3600" dirty="0"/>
+          </a:p>
+          <a:p>
+            <a:pPr marL="1200150" lvl="2" indent="-342900">
+              <a:buFont typeface="Arial" panose="020B0604020202020204" pitchFamily="34" charset="0"/>
+              <a:buChar char="•"/>
+            </a:pPr>
+            <a:r>
+              <a:rPr lang="en-US" sz="2500" dirty="0"/>
+              <a:t>Users can explore the European Union countries and visualize the existing information for each country</a:t>
+            </a:r>
+          </a:p>
+          <a:p>
+            <a:pPr marL="1200150" lvl="2" indent="-342900">
+              <a:buFont typeface="Arial" panose="020B0604020202020204" pitchFamily="34" charset="0"/>
+              <a:buChar char="•"/>
+            </a:pPr>
+            <a:r>
+              <a:rPr lang="en-US" sz="2500" dirty="0"/>
+              <a:t>Compare between countries</a:t>
+            </a:r>
+          </a:p>
+          <a:p>
+            <a:pPr marL="1200150" lvl="2" indent="-342900">
+              <a:buFont typeface="Arial" panose="020B0604020202020204" pitchFamily="34" charset="0"/>
+              <a:buChar char="•"/>
+            </a:pPr>
+            <a:r>
+              <a:rPr lang="en-US" sz="2500" dirty="0"/>
+              <a:t>Understand the correlation between different kinds of information</a:t>
+            </a:r>
           </a:p>
         </p:txBody>
       </p:sp>
     </p:spTree>
     <p:extLst>
       <p:ext uri="{BB962C8B-B14F-4D97-AF65-F5344CB8AC3E}">
-        <p14:creationId xmlns:p14="http://schemas.microsoft.com/office/powerpoint/2010/main" val="1967416131"/>
+        <p14:creationId xmlns:p14="http://schemas.microsoft.com/office/powerpoint/2010/main" val="1783310095"/>
       </p:ext>
     </p:extLst>
   </p:cSld>
@@ -5297,114 +6044,89 @@
       </p:grpSpPr>
       <p:sp>
         <p:nvSpPr>
-          <p:cNvPr id="2" name="Title 1"/>
+          <p:cNvPr id="6" name="Text Placeholder 5"/>
+          <p:cNvSpPr>
+            <a:spLocks noGrp="1"/>
+          </p:cNvSpPr>
+          <p:nvPr>
+            <p:ph type="body" sz="quarter" idx="11"/>
+          </p:nvPr>
+        </p:nvSpPr>
+        <p:spPr/>
+        <p:txBody>
+          <a:bodyPr/>
+          <a:lstStyle/>
+          <a:p>
+            <a:endParaRPr lang="en-US" dirty="0"/>
+          </a:p>
+        </p:txBody>
+      </p:sp>
+      <p:sp>
+        <p:nvSpPr>
+          <p:cNvPr id="29" name="Text Placeholder 28"/>
+          <p:cNvSpPr>
+            <a:spLocks noGrp="1"/>
+          </p:cNvSpPr>
+          <p:nvPr>
+            <p:ph type="body" sz="quarter" idx="10"/>
+          </p:nvPr>
+        </p:nvSpPr>
+        <p:spPr/>
+        <p:txBody>
+          <a:bodyPr/>
+          <a:lstStyle/>
+          <a:p>
+            <a:r>
+              <a:rPr lang="pt-PT" sz="16600" dirty="0"/>
+              <a:t>03</a:t>
+            </a:r>
+          </a:p>
+        </p:txBody>
+      </p:sp>
+      <p:sp>
+        <p:nvSpPr>
+          <p:cNvPr id="4" name="Title 3"/>
           <p:cNvSpPr>
             <a:spLocks noGrp="1"/>
           </p:cNvSpPr>
           <p:nvPr>
             <p:ph type="title"/>
-          </p:nvPr>
-        </p:nvSpPr>
-        <p:spPr/>
-        <p:txBody>
-          <a:bodyPr/>
-          <a:lstStyle/>
-          <a:p>
-            <a:r>
-              <a:rPr lang="en-US" dirty="0"/>
-              <a:t>Data abstraction</a:t>
-            </a:r>
-            <a:endParaRPr lang="pt-PT" dirty="0"/>
-          </a:p>
-        </p:txBody>
-      </p:sp>
-      <p:sp>
-        <p:nvSpPr>
-          <p:cNvPr id="3" name="Content Placeholder 2"/>
-          <p:cNvSpPr>
-            <a:spLocks noGrp="1"/>
-          </p:cNvSpPr>
-          <p:nvPr>
-            <p:ph idx="1"/>
           </p:nvPr>
         </p:nvSpPr>
         <p:spPr>
           <a:xfrm>
-            <a:off x="457200" y="1094346"/>
-            <a:ext cx="8229600" cy="5214974"/>
+            <a:off x="2281222" y="3214686"/>
+            <a:ext cx="6786578" cy="3033714"/>
           </a:xfrm>
+          <a:solidFill>
+            <a:srgbClr val="FFFFFF">
+              <a:alpha val="80000"/>
+            </a:srgbClr>
+          </a:solidFill>
         </p:spPr>
         <p:txBody>
-          <a:bodyPr>
+          <a:bodyPr rIns="288000">
             <a:noAutofit/>
           </a:bodyPr>
           <a:lstStyle/>
           <a:p>
-            <a:pPr lvl="1"/>
-            <a:r>
-              <a:rPr lang="en-US" sz="3200" dirty="0"/>
-              <a:t>Item1 description</a:t>
-            </a:r>
-          </a:p>
-          <a:p>
-            <a:pPr lvl="1"/>
-            <a:r>
-              <a:rPr lang="en-US" sz="2400" dirty="0"/>
-              <a:t>	Attribute1 description</a:t>
-            </a:r>
-            <a:endParaRPr lang="en-US" sz="1800" dirty="0"/>
-          </a:p>
-          <a:p>
-            <a:pPr lvl="1"/>
-            <a:r>
-              <a:rPr lang="en-US" sz="2400" dirty="0"/>
-              <a:t>	Attribute2 description</a:t>
-            </a:r>
-          </a:p>
-          <a:p>
-            <a:pPr lvl="1"/>
-            <a:endParaRPr lang="en-US" sz="1800" dirty="0"/>
-          </a:p>
-          <a:p>
-            <a:pPr lvl="1"/>
-            <a:r>
-              <a:rPr lang="en-US" sz="3200" dirty="0"/>
-              <a:t>Item2 description</a:t>
-            </a:r>
-          </a:p>
-          <a:p>
-            <a:pPr lvl="1"/>
-            <a:r>
-              <a:rPr lang="en-US" sz="2400" dirty="0"/>
-              <a:t>	Attribute1 description</a:t>
-            </a:r>
-            <a:endParaRPr lang="en-US" sz="1800" dirty="0"/>
-          </a:p>
-          <a:p>
-            <a:pPr lvl="1"/>
-            <a:r>
-              <a:rPr lang="en-US" sz="2400" dirty="0"/>
-              <a:t>	Attribute2 description</a:t>
-            </a:r>
-            <a:endParaRPr lang="en-US" sz="1800" dirty="0"/>
-          </a:p>
-          <a:p>
-            <a:pPr lvl="1"/>
-            <a:endParaRPr lang="en-US" sz="3200" dirty="0"/>
-          </a:p>
-          <a:p>
-            <a:pPr lvl="1"/>
-            <a:r>
-              <a:rPr lang="en-US" sz="3200" dirty="0"/>
-              <a:t>…</a:t>
-            </a:r>
+            <a:pPr marL="0" algn="r"/>
+            <a:r>
+              <a:rPr lang="pt-PT" sz="6000" dirty="0"/>
+              <a:t>Data </a:t>
+            </a:r>
+            <a:r>
+              <a:rPr lang="pt-PT" sz="6000" dirty="0" err="1"/>
+              <a:t>abstraction</a:t>
+            </a:r>
+            <a:endParaRPr lang="pt-PT" sz="6000" dirty="0"/>
           </a:p>
         </p:txBody>
       </p:sp>
     </p:spTree>
     <p:extLst>
       <p:ext uri="{BB962C8B-B14F-4D97-AF65-F5344CB8AC3E}">
-        <p14:creationId xmlns:p14="http://schemas.microsoft.com/office/powerpoint/2010/main" val="1828594822"/>
+        <p14:creationId xmlns:p14="http://schemas.microsoft.com/office/powerpoint/2010/main" val="760072998"/>
       </p:ext>
     </p:extLst>
   </p:cSld>

</xml_diff>

<commit_message>
edited ppt and finnished adding existing material, waiting for review
</commit_message>
<xml_diff>
--- a/CheckpointII/Lab04-PresentationTemplate.pptx
+++ b/CheckpointII/Lab04-PresentationTemplate.pptx
@@ -5,10 +5,10 @@
     <p:sldMasterId id="2147483648" r:id="rId1"/>
   </p:sldMasterIdLst>
   <p:notesMasterIdLst>
-    <p:notesMasterId r:id="rId19"/>
+    <p:notesMasterId r:id="rId24"/>
   </p:notesMasterIdLst>
   <p:handoutMasterIdLst>
-    <p:handoutMasterId r:id="rId20"/>
+    <p:handoutMasterId r:id="rId25"/>
   </p:handoutMasterIdLst>
   <p:sldIdLst>
     <p:sldId id="256" r:id="rId2"/>
@@ -22,12 +22,17 @@
     <p:sldId id="1099" r:id="rId10"/>
     <p:sldId id="1100" r:id="rId11"/>
     <p:sldId id="1106" r:id="rId12"/>
-    <p:sldId id="1107" r:id="rId13"/>
-    <p:sldId id="1101" r:id="rId14"/>
-    <p:sldId id="1102" r:id="rId15"/>
-    <p:sldId id="1108" r:id="rId16"/>
-    <p:sldId id="1103" r:id="rId17"/>
-    <p:sldId id="1104" r:id="rId18"/>
+    <p:sldId id="1111" r:id="rId13"/>
+    <p:sldId id="1112" r:id="rId14"/>
+    <p:sldId id="1107" r:id="rId15"/>
+    <p:sldId id="1101" r:id="rId16"/>
+    <p:sldId id="1102" r:id="rId17"/>
+    <p:sldId id="1108" r:id="rId18"/>
+    <p:sldId id="1103" r:id="rId19"/>
+    <p:sldId id="1104" r:id="rId20"/>
+    <p:sldId id="1113" r:id="rId21"/>
+    <p:sldId id="1114" r:id="rId22"/>
+    <p:sldId id="1115" r:id="rId23"/>
   </p:sldIdLst>
   <p:sldSz cx="9144000" cy="6858000" type="screen4x3"/>
   <p:notesSz cx="6858000" cy="9144000"/>
@@ -814,7 +819,7 @@
             <a:fld id="{F535F173-C1DD-4975-94BF-5B9ED67F7674}" type="slidenum">
               <a:rPr lang="en-US" smtClean="0"/>
               <a:pPr/>
-              <a:t>17</a:t>
+              <a:t>19</a:t>
             </a:fld>
             <a:endParaRPr lang="en-US"/>
           </a:p>
@@ -1324,7 +1329,7 @@
             <a:fld id="{F535F173-C1DD-4975-94BF-5B9ED67F7674}" type="slidenum">
               <a:rPr lang="en-US" smtClean="0"/>
               <a:pPr/>
-              <a:t>12</a:t>
+              <a:t>14</a:t>
             </a:fld>
             <a:endParaRPr lang="en-US"/>
           </a:p>
@@ -1409,7 +1414,7 @@
             <a:fld id="{F535F173-C1DD-4975-94BF-5B9ED67F7674}" type="slidenum">
               <a:rPr lang="en-US" smtClean="0"/>
               <a:pPr/>
-              <a:t>14</a:t>
+              <a:t>16</a:t>
             </a:fld>
             <a:endParaRPr lang="en-US"/>
           </a:p>
@@ -1494,7 +1499,7 @@
             <a:fld id="{F535F173-C1DD-4975-94BF-5B9ED67F7674}" type="slidenum">
               <a:rPr lang="en-US" smtClean="0"/>
               <a:pPr/>
-              <a:t>15</a:t>
+              <a:t>17</a:t>
             </a:fld>
             <a:endParaRPr lang="en-US"/>
           </a:p>
@@ -4097,8 +4102,89 @@
             </a:r>
           </a:p>
           <a:p>
-            <a:pPr lvl="1"/>
-            <a:endParaRPr lang="en-US" sz="3200" dirty="0"/>
+            <a:r>
+              <a:rPr lang="en-US" sz="2500" dirty="0"/>
+              <a:t>	</a:t>
+            </a:r>
+            <a:r>
+              <a:rPr lang="en-US" sz="2500" b="0" dirty="0">
+                <a:solidFill>
+                  <a:schemeClr val="tx1"/>
+                </a:solidFill>
+              </a:rPr>
+              <a:t>Abstractly the data will consist in </a:t>
+            </a:r>
+          </a:p>
+          <a:p>
+            <a:pPr algn="ctr"/>
+            <a:r>
+              <a:rPr lang="en-US" sz="2500" dirty="0">
+                <a:solidFill>
+                  <a:schemeClr val="tx1"/>
+                </a:solidFill>
+              </a:rPr>
+              <a:t>(Country, Year, M</a:t>
+            </a:r>
+            <a:r>
+              <a:rPr lang="en-US" sz="2500" baseline="-25000" dirty="0">
+                <a:solidFill>
+                  <a:schemeClr val="tx1"/>
+                </a:solidFill>
+              </a:rPr>
+              <a:t>1</a:t>
+            </a:r>
+            <a:r>
+              <a:rPr lang="en-US" sz="2500" dirty="0">
+                <a:solidFill>
+                  <a:schemeClr val="tx1"/>
+                </a:solidFill>
+              </a:rPr>
+              <a:t>*, M</a:t>
+            </a:r>
+            <a:r>
+              <a:rPr lang="en-US" sz="2500" baseline="-25000" dirty="0">
+                <a:solidFill>
+                  <a:schemeClr val="tx1"/>
+                </a:solidFill>
+              </a:rPr>
+              <a:t>2</a:t>
+            </a:r>
+            <a:r>
+              <a:rPr lang="en-US" sz="2500" dirty="0">
+                <a:solidFill>
+                  <a:schemeClr val="tx1"/>
+                </a:solidFill>
+              </a:rPr>
+              <a:t>*,…)</a:t>
+            </a:r>
+            <a:endParaRPr lang="en-US" sz="2500" b="0" dirty="0">
+              <a:solidFill>
+                <a:schemeClr val="tx1"/>
+              </a:solidFill>
+            </a:endParaRPr>
+          </a:p>
+          <a:p>
+            <a:r>
+              <a:rPr lang="en-US" sz="2500" b="0" dirty="0">
+                <a:solidFill>
+                  <a:schemeClr val="tx1"/>
+                </a:solidFill>
+              </a:rPr>
+              <a:t>	</a:t>
+            </a:r>
+            <a:r>
+              <a:rPr lang="en-US" sz="2000" b="0" dirty="0">
+                <a:solidFill>
+                  <a:schemeClr val="tx1"/>
+                </a:solidFill>
+              </a:rPr>
+              <a:t>*Metrics used</a:t>
+            </a:r>
+            <a:endParaRPr lang="en-US" sz="2000" dirty="0">
+              <a:solidFill>
+                <a:schemeClr val="tx1"/>
+              </a:solidFill>
+            </a:endParaRPr>
           </a:p>
           <a:p>
             <a:r>
@@ -4107,7 +4193,28 @@
             </a:r>
           </a:p>
           <a:p>
-            <a:endParaRPr lang="en-US" sz="3600" dirty="0"/>
+            <a:pPr lvl="1">
+              <a:buFont typeface="Arial" panose="020B0604020202020204" pitchFamily="34" charset="0"/>
+              <a:buChar char="•"/>
+            </a:pPr>
+            <a:r>
+              <a:rPr lang="en-US" sz="2500" dirty="0"/>
+              <a:t>Table (by country)</a:t>
+            </a:r>
+          </a:p>
+          <a:p>
+            <a:pPr lvl="1">
+              <a:buFont typeface="Arial" panose="020B0604020202020204" pitchFamily="34" charset="0"/>
+              <a:buChar char="•"/>
+            </a:pPr>
+            <a:r>
+              <a:rPr lang="en-US" sz="2500" dirty="0"/>
+              <a:t>Multidimensional Table (by country, sex, time)</a:t>
+            </a:r>
+          </a:p>
+          <a:p>
+            <a:pPr marL="57150" indent="0"/>
+            <a:endParaRPr lang="en-US" sz="2500" dirty="0"/>
           </a:p>
         </p:txBody>
       </p:sp>
@@ -4188,23 +4295,44 @@
           <a:p>
             <a:pPr lvl="1"/>
             <a:r>
-              <a:rPr lang="en-US" sz="3200" dirty="0"/>
-              <a:t>Item1 description</a:t>
+              <a:rPr lang="en-US" sz="3200" dirty="0">
+                <a:solidFill>
+                  <a:schemeClr val="bg2"/>
+                </a:solidFill>
+              </a:rPr>
+              <a:t>1 - Participation rate in training and education</a:t>
             </a:r>
           </a:p>
           <a:p>
             <a:pPr lvl="1"/>
             <a:r>
               <a:rPr lang="en-US" sz="2400" dirty="0"/>
-              <a:t>	Attribute1 description</a:t>
-            </a:r>
-            <a:endParaRPr lang="en-US" sz="1800" dirty="0"/>
+              <a:t>	</a:t>
+            </a:r>
+            <a:r>
+              <a:rPr lang="en-US" sz="2500" b="1" dirty="0"/>
+              <a:t>“Year” 		: Quantitative</a:t>
+            </a:r>
           </a:p>
           <a:p>
             <a:pPr lvl="1"/>
             <a:r>
-              <a:rPr lang="en-US" sz="2400" dirty="0"/>
-              <a:t>	Attribute2 description</a:t>
+              <a:rPr lang="en-US" sz="2500" b="1" dirty="0"/>
+              <a:t>	“Sex”		: Nominal</a:t>
+            </a:r>
+          </a:p>
+          <a:p>
+            <a:pPr lvl="1"/>
+            <a:r>
+              <a:rPr lang="en-US" sz="2500" b="1" dirty="0"/>
+              <a:t>	“Value”		: Ratio</a:t>
+            </a:r>
+          </a:p>
+          <a:p>
+            <a:pPr lvl="1"/>
+            <a:r>
+              <a:rPr lang="en-US" sz="2500" b="1" dirty="0"/>
+              <a:t>	“Country”	: Nominal</a:t>
             </a:r>
           </a:p>
           <a:p>
@@ -4214,36 +4342,49 @@
           <a:p>
             <a:pPr lvl="1"/>
             <a:r>
-              <a:rPr lang="en-US" sz="3200" dirty="0"/>
-              <a:t>Item2 description</a:t>
+              <a:rPr lang="en-US" sz="3200" dirty="0">
+                <a:solidFill>
+                  <a:schemeClr val="bg2"/>
+                </a:solidFill>
+              </a:rPr>
+              <a:t>2 - Early leavers from education</a:t>
             </a:r>
           </a:p>
           <a:p>
             <a:pPr lvl="1"/>
             <a:r>
               <a:rPr lang="en-US" sz="2400" dirty="0"/>
-              <a:t>	Attribute1 description</a:t>
-            </a:r>
+              <a:t>	</a:t>
+            </a:r>
+            <a:r>
+              <a:rPr lang="en-US" sz="2500" b="1" dirty="0"/>
+              <a:t>“Year” 		: Quantitative</a:t>
+            </a:r>
+          </a:p>
+          <a:p>
+            <a:pPr lvl="1"/>
+            <a:r>
+              <a:rPr lang="en-US" sz="2500" b="1" dirty="0"/>
+              <a:t>	“Sex”		: Nominal</a:t>
+            </a:r>
+          </a:p>
+          <a:p>
+            <a:pPr lvl="1"/>
+            <a:r>
+              <a:rPr lang="en-US" sz="2500" b="1" dirty="0"/>
+              <a:t>	“Value”		: Ratio</a:t>
+            </a:r>
+          </a:p>
+          <a:p>
+            <a:pPr lvl="1"/>
+            <a:r>
+              <a:rPr lang="en-US" sz="2500" b="1" dirty="0"/>
+              <a:t>	“Country”	: Nominal</a:t>
+            </a:r>
+          </a:p>
+          <a:p>
+            <a:pPr lvl="1"/>
             <a:endParaRPr lang="en-US" sz="1800" dirty="0"/>
-          </a:p>
-          <a:p>
-            <a:pPr lvl="1"/>
-            <a:r>
-              <a:rPr lang="en-US" sz="2400" dirty="0"/>
-              <a:t>	Attribute2 description</a:t>
-            </a:r>
-            <a:endParaRPr lang="en-US" sz="1800" dirty="0"/>
-          </a:p>
-          <a:p>
-            <a:pPr lvl="1"/>
-            <a:endParaRPr lang="en-US" sz="3200" dirty="0"/>
-          </a:p>
-          <a:p>
-            <a:pPr lvl="1"/>
-            <a:r>
-              <a:rPr lang="en-US" sz="3200" dirty="0"/>
-              <a:t>…</a:t>
-            </a:r>
           </a:p>
         </p:txBody>
       </p:sp>
@@ -4279,7 +4420,13 @@
       </p:grpSpPr>
       <p:sp>
         <p:nvSpPr>
-          <p:cNvPr id="2" name="Title 1"/>
+          <p:cNvPr id="2" name="Título 1">
+            <a:extLst>
+              <a:ext uri="{FF2B5EF4-FFF2-40B4-BE49-F238E27FC236}">
+                <a16:creationId xmlns:a16="http://schemas.microsoft.com/office/drawing/2014/main" id="{CB299239-D832-4794-AA8B-DAA6375ABC20}"/>
+              </a:ext>
+            </a:extLst>
+          </p:cNvPr>
           <p:cNvSpPr>
             <a:spLocks noGrp="1"/>
           </p:cNvSpPr>
@@ -4292,17 +4439,19 @@
           <a:bodyPr/>
           <a:lstStyle/>
           <a:p>
-            <a:r>
-              <a:rPr lang="en-US" dirty="0"/>
-              <a:t>Data abstraction</a:t>
-            </a:r>
-            <a:endParaRPr lang="pt-PT" dirty="0"/>
-          </a:p>
-        </p:txBody>
-      </p:sp>
-      <p:sp>
-        <p:nvSpPr>
-          <p:cNvPr id="3" name="Content Placeholder 2"/>
+            <a:endParaRPr lang="en-US"/>
+          </a:p>
+        </p:txBody>
+      </p:sp>
+      <p:sp>
+        <p:nvSpPr>
+          <p:cNvPr id="3" name="Marcador de Posição de Conteúdo 2">
+            <a:extLst>
+              <a:ext uri="{FF2B5EF4-FFF2-40B4-BE49-F238E27FC236}">
+                <a16:creationId xmlns:a16="http://schemas.microsoft.com/office/drawing/2014/main" id="{8C642FF4-D449-4D70-8C17-996C7DD73B31}"/>
+              </a:ext>
+            </a:extLst>
+          </p:cNvPr>
           <p:cNvSpPr>
             <a:spLocks noGrp="1"/>
           </p:cNvSpPr>
@@ -4310,29 +4459,93 @@
             <p:ph idx="1"/>
           </p:nvPr>
         </p:nvSpPr>
-        <p:spPr>
-          <a:xfrm>
-            <a:off x="457200" y="1094346"/>
-            <a:ext cx="8229600" cy="5214974"/>
-          </a:xfrm>
-        </p:spPr>
+        <p:spPr/>
         <p:txBody>
           <a:bodyPr>
-            <a:noAutofit/>
+            <a:normAutofit/>
           </a:bodyPr>
           <a:lstStyle/>
           <a:p>
             <a:r>
-              <a:rPr lang="en-US" sz="3600" dirty="0"/>
-              <a:t>Semantics:</a:t>
-            </a:r>
+              <a:rPr lang="en-US" b="0" dirty="0"/>
+              <a:t>	3 – Average income by level of education</a:t>
+            </a:r>
+          </a:p>
+          <a:p>
+            <a:pPr lvl="1"/>
+            <a:r>
+              <a:rPr lang="en-US" b="0" dirty="0"/>
+              <a:t>	</a:t>
+            </a:r>
+            <a:r>
+              <a:rPr lang="en-US" sz="2500" b="1" dirty="0"/>
+              <a:t>“Year” 		: Quantitative</a:t>
+            </a:r>
+          </a:p>
+          <a:p>
+            <a:pPr lvl="1"/>
+            <a:r>
+              <a:rPr lang="en-US" sz="2500" b="1" dirty="0"/>
+              <a:t>	“Value”		: Ratio</a:t>
+            </a:r>
+          </a:p>
+          <a:p>
+            <a:pPr lvl="1"/>
+            <a:r>
+              <a:rPr lang="en-US" sz="2500" b="1" dirty="0"/>
+              <a:t>	“Country”	: Nominal</a:t>
+            </a:r>
+          </a:p>
+          <a:p>
+            <a:pPr lvl="1"/>
+            <a:endParaRPr lang="en-US" sz="2500" b="1" dirty="0"/>
+          </a:p>
+          <a:p>
+            <a:pPr lvl="1"/>
+            <a:r>
+              <a:rPr lang="en-US" sz="3200" dirty="0">
+                <a:solidFill>
+                  <a:schemeClr val="bg2"/>
+                </a:solidFill>
+              </a:rPr>
+              <a:t>4 – Share of household expenditure in books</a:t>
+            </a:r>
+          </a:p>
+          <a:p>
+            <a:pPr lvl="1"/>
+            <a:r>
+              <a:rPr lang="en-US" sz="2500" b="1" dirty="0"/>
+              <a:t>	“Year” 		: Quantitative</a:t>
+            </a:r>
+          </a:p>
+          <a:p>
+            <a:pPr lvl="1"/>
+            <a:r>
+              <a:rPr lang="en-US" sz="2500" b="1" dirty="0"/>
+              <a:t>	“Value”		: Ratio</a:t>
+            </a:r>
+          </a:p>
+          <a:p>
+            <a:pPr lvl="1"/>
+            <a:r>
+              <a:rPr lang="en-US" sz="2500" b="1" dirty="0"/>
+              <a:t>	“Country”	: Nominal</a:t>
+            </a:r>
+          </a:p>
+          <a:p>
+            <a:pPr lvl="1"/>
+            <a:endParaRPr lang="en-US" sz="3200" dirty="0">
+              <a:solidFill>
+                <a:schemeClr val="bg2"/>
+              </a:solidFill>
+            </a:endParaRPr>
           </a:p>
         </p:txBody>
       </p:sp>
     </p:spTree>
     <p:extLst>
       <p:ext uri="{BB962C8B-B14F-4D97-AF65-F5344CB8AC3E}">
-        <p14:creationId xmlns:p14="http://schemas.microsoft.com/office/powerpoint/2010/main" val="3208609425"/>
+        <p14:creationId xmlns:p14="http://schemas.microsoft.com/office/powerpoint/2010/main" val="3885455355"/>
       </p:ext>
     </p:extLst>
   </p:cSld>
@@ -4361,12 +4574,18 @@
       </p:grpSpPr>
       <p:sp>
         <p:nvSpPr>
-          <p:cNvPr id="6" name="Text Placeholder 5"/>
-          <p:cNvSpPr>
-            <a:spLocks noGrp="1"/>
-          </p:cNvSpPr>
-          <p:nvPr>
-            <p:ph type="body" sz="quarter" idx="11"/>
+          <p:cNvPr id="2" name="Título 1">
+            <a:extLst>
+              <a:ext uri="{FF2B5EF4-FFF2-40B4-BE49-F238E27FC236}">
+                <a16:creationId xmlns:a16="http://schemas.microsoft.com/office/drawing/2014/main" id="{08BEFCE3-1538-45DC-BFBE-ACF2C9352C98}"/>
+              </a:ext>
+            </a:extLst>
+          </p:cNvPr>
+          <p:cNvSpPr>
+            <a:spLocks noGrp="1"/>
+          </p:cNvSpPr>
+          <p:nvPr>
+            <p:ph type="title"/>
           </p:nvPr>
         </p:nvSpPr>
         <p:spPr/>
@@ -4374,18 +4593,24 @@
           <a:bodyPr/>
           <a:lstStyle/>
           <a:p>
-            <a:endParaRPr lang="en-US" dirty="0"/>
-          </a:p>
-        </p:txBody>
-      </p:sp>
-      <p:sp>
-        <p:nvSpPr>
-          <p:cNvPr id="29" name="Text Placeholder 28"/>
-          <p:cNvSpPr>
-            <a:spLocks noGrp="1"/>
-          </p:cNvSpPr>
-          <p:nvPr>
-            <p:ph type="body" sz="quarter" idx="10"/>
+            <a:endParaRPr lang="en-US"/>
+          </a:p>
+        </p:txBody>
+      </p:sp>
+      <p:sp>
+        <p:nvSpPr>
+          <p:cNvPr id="3" name="Marcador de Posição de Conteúdo 2">
+            <a:extLst>
+              <a:ext uri="{FF2B5EF4-FFF2-40B4-BE49-F238E27FC236}">
+                <a16:creationId xmlns:a16="http://schemas.microsoft.com/office/drawing/2014/main" id="{34811E17-693E-4280-8B66-99E7A8B0D7D9}"/>
+              </a:ext>
+            </a:extLst>
+          </p:cNvPr>
+          <p:cNvSpPr>
+            <a:spLocks noGrp="1"/>
+          </p:cNvSpPr>
+          <p:nvPr>
+            <p:ph idx="1"/>
           </p:nvPr>
         </p:nvSpPr>
         <p:spPr/>
@@ -4394,60 +4619,34 @@
           <a:lstStyle/>
           <a:p>
             <a:r>
-              <a:rPr lang="pt-PT" sz="16600" dirty="0"/>
-              <a:t>04</a:t>
-            </a:r>
-          </a:p>
-        </p:txBody>
-      </p:sp>
-      <p:sp>
-        <p:nvSpPr>
-          <p:cNvPr id="4" name="Title 3"/>
-          <p:cNvSpPr>
-            <a:spLocks noGrp="1"/>
-          </p:cNvSpPr>
-          <p:nvPr>
-            <p:ph type="title"/>
-          </p:nvPr>
-        </p:nvSpPr>
-        <p:spPr>
-          <a:xfrm>
-            <a:off x="2281222" y="3214686"/>
-            <a:ext cx="6786578" cy="3033714"/>
-          </a:xfrm>
-          <a:solidFill>
-            <a:srgbClr val="FFFFFF">
-              <a:alpha val="80000"/>
-            </a:srgbClr>
-          </a:solidFill>
-        </p:spPr>
-        <p:txBody>
-          <a:bodyPr rIns="288000">
-            <a:noAutofit/>
-          </a:bodyPr>
-          <a:lstStyle/>
-          <a:p>
-            <a:pPr marL="0" algn="r"/>
-            <a:r>
-              <a:rPr lang="pt-PT" sz="6000" dirty="0" err="1"/>
-              <a:t>Dataset</a:t>
-            </a:r>
-            <a:r>
-              <a:rPr lang="pt-PT" sz="6000" dirty="0"/>
-              <a:t> </a:t>
-            </a:r>
-            <a:r>
-              <a:rPr lang="pt-PT" sz="6000" dirty="0" err="1"/>
-              <a:t>processing</a:t>
-            </a:r>
-            <a:endParaRPr lang="pt-PT" sz="6000" dirty="0"/>
+              <a:rPr lang="en-US" b="0" dirty="0"/>
+              <a:t>	5 – Time spent reading</a:t>
+            </a:r>
+          </a:p>
+          <a:p>
+            <a:pPr lvl="1"/>
+            <a:r>
+              <a:rPr lang="en-US" sz="2500" b="0" dirty="0"/>
+              <a:t>	</a:t>
+            </a:r>
+            <a:r>
+              <a:rPr lang="en-US" sz="2500" b="1" dirty="0"/>
+              <a:t>“Value”		: Ratio</a:t>
+            </a:r>
+          </a:p>
+          <a:p>
+            <a:pPr lvl="1"/>
+            <a:r>
+              <a:rPr lang="en-US" sz="2500" b="1" dirty="0"/>
+              <a:t>	“Country”	: Nominal</a:t>
+            </a:r>
           </a:p>
         </p:txBody>
       </p:sp>
     </p:spTree>
     <p:extLst>
       <p:ext uri="{BB962C8B-B14F-4D97-AF65-F5344CB8AC3E}">
-        <p14:creationId xmlns:p14="http://schemas.microsoft.com/office/powerpoint/2010/main" val="4045494449"/>
+        <p14:creationId xmlns:p14="http://schemas.microsoft.com/office/powerpoint/2010/main" val="3252813597"/>
       </p:ext>
     </p:extLst>
   </p:cSld>
@@ -4491,7 +4690,7 @@
           <a:p>
             <a:r>
               <a:rPr lang="en-US" dirty="0"/>
-              <a:t>Dataset processing</a:t>
+              <a:t>Data abstraction</a:t>
             </a:r>
             <a:endParaRPr lang="pt-PT" dirty="0"/>
           </a:p>
@@ -4520,36 +4719,104 @@
           <a:lstStyle/>
           <a:p>
             <a:r>
-              <a:rPr lang="en-US" sz="4000" dirty="0"/>
-              <a:t>Dataset cleaning description</a:t>
-            </a:r>
-          </a:p>
-          <a:p>
-            <a:endParaRPr lang="en-US" sz="4000" dirty="0"/>
-          </a:p>
-          <a:p>
-            <a:pPr lvl="1"/>
-            <a:r>
               <a:rPr lang="en-US" sz="3600" dirty="0"/>
-              <a:t>Entry1</a:t>
-            </a:r>
-          </a:p>
-          <a:p>
-            <a:pPr lvl="1"/>
-            <a:r>
-              <a:rPr lang="en-US" sz="3600" dirty="0"/>
-              <a:t>Entry2</a:t>
-            </a:r>
-          </a:p>
-          <a:p>
-            <a:pPr lvl="1"/>
-            <a:endParaRPr lang="en-US" sz="3600" dirty="0"/>
-          </a:p>
-          <a:p>
-            <a:pPr lvl="1"/>
-            <a:r>
-              <a:rPr lang="en-US" sz="3600" dirty="0"/>
-              <a:t>…</a:t>
+              <a:t>Semantics:</a:t>
+            </a:r>
+          </a:p>
+          <a:p>
+            <a:pPr marL="571500" indent="-571500">
+              <a:buFont typeface="Arial" panose="020B0604020202020204" pitchFamily="34" charset="0"/>
+              <a:buChar char="•"/>
+            </a:pPr>
+            <a:r>
+              <a:rPr lang="en-US" sz="2500" dirty="0"/>
+              <a:t>Year </a:t>
+            </a:r>
+            <a:r>
+              <a:rPr lang="en-US" sz="2500" b="0" dirty="0">
+                <a:solidFill>
+                  <a:schemeClr val="tx1"/>
+                </a:solidFill>
+              </a:rPr>
+              <a:t>– year to which the item belongs</a:t>
+            </a:r>
+          </a:p>
+          <a:p>
+            <a:pPr marL="571500" indent="-571500">
+              <a:buFont typeface="Arial" panose="020B0604020202020204" pitchFamily="34" charset="0"/>
+              <a:buChar char="•"/>
+            </a:pPr>
+            <a:r>
+              <a:rPr lang="en-US" sz="2500" dirty="0"/>
+              <a:t>Sex </a:t>
+            </a:r>
+            <a:r>
+              <a:rPr lang="en-US" sz="2500" b="0" dirty="0">
+                <a:solidFill>
+                  <a:schemeClr val="tx1"/>
+                </a:solidFill>
+              </a:rPr>
+              <a:t>– sex of the population to which the item belongs to</a:t>
+            </a:r>
+          </a:p>
+          <a:p>
+            <a:pPr marL="571500" indent="-571500">
+              <a:buFont typeface="Arial" panose="020B0604020202020204" pitchFamily="34" charset="0"/>
+              <a:buChar char="•"/>
+            </a:pPr>
+            <a:r>
+              <a:rPr lang="en-US" sz="2500" dirty="0"/>
+              <a:t>Value</a:t>
+            </a:r>
+            <a:r>
+              <a:rPr lang="en-US" sz="2500" dirty="0">
+                <a:solidFill>
+                  <a:schemeClr val="tx1"/>
+                </a:solidFill>
+              </a:rPr>
+              <a:t> </a:t>
+            </a:r>
+            <a:r>
+              <a:rPr lang="en-US" sz="2500" b="0" dirty="0">
+                <a:solidFill>
+                  <a:schemeClr val="tx1"/>
+                </a:solidFill>
+              </a:rPr>
+              <a:t>–</a:t>
+            </a:r>
+            <a:r>
+              <a:rPr lang="en-US" sz="2500" dirty="0">
+                <a:solidFill>
+                  <a:schemeClr val="tx1"/>
+                </a:solidFill>
+              </a:rPr>
+              <a:t> </a:t>
+            </a:r>
+            <a:r>
+              <a:rPr lang="en-US" sz="2500" b="0" dirty="0">
+                <a:solidFill>
+                  <a:schemeClr val="tx1"/>
+                </a:solidFill>
+              </a:rPr>
+              <a:t>it’s correspondent to the metrics used</a:t>
+            </a:r>
+          </a:p>
+          <a:p>
+            <a:pPr marL="571500" indent="-571500">
+              <a:buFont typeface="Arial" panose="020B0604020202020204" pitchFamily="34" charset="0"/>
+              <a:buChar char="•"/>
+            </a:pPr>
+            <a:r>
+              <a:rPr lang="en-US" sz="2500" dirty="0"/>
+              <a:t>Country </a:t>
+            </a:r>
+            <a:r>
+              <a:rPr lang="en-US" sz="2500" b="0" dirty="0">
+                <a:solidFill>
+                  <a:schemeClr val="tx1"/>
+                </a:solidFill>
+              </a:rPr>
+              <a:t>– it describes a country</a:t>
             </a:r>
           </a:p>
         </p:txBody>
@@ -4557,7 +4824,7 @@
     </p:spTree>
     <p:extLst>
       <p:ext uri="{BB962C8B-B14F-4D97-AF65-F5344CB8AC3E}">
-        <p14:creationId xmlns:p14="http://schemas.microsoft.com/office/powerpoint/2010/main" val="3456915046"/>
+        <p14:creationId xmlns:p14="http://schemas.microsoft.com/office/powerpoint/2010/main" val="3208609425"/>
       </p:ext>
     </p:extLst>
   </p:cSld>
@@ -4586,96 +4853,93 @@
       </p:grpSpPr>
       <p:sp>
         <p:nvSpPr>
-          <p:cNvPr id="2" name="Title 1"/>
+          <p:cNvPr id="6" name="Text Placeholder 5"/>
+          <p:cNvSpPr>
+            <a:spLocks noGrp="1"/>
+          </p:cNvSpPr>
+          <p:nvPr>
+            <p:ph type="body" sz="quarter" idx="11"/>
+          </p:nvPr>
+        </p:nvSpPr>
+        <p:spPr/>
+        <p:txBody>
+          <a:bodyPr/>
+          <a:lstStyle/>
+          <a:p>
+            <a:endParaRPr lang="en-US" dirty="0"/>
+          </a:p>
+        </p:txBody>
+      </p:sp>
+      <p:sp>
+        <p:nvSpPr>
+          <p:cNvPr id="29" name="Text Placeholder 28"/>
+          <p:cNvSpPr>
+            <a:spLocks noGrp="1"/>
+          </p:cNvSpPr>
+          <p:nvPr>
+            <p:ph type="body" sz="quarter" idx="10"/>
+          </p:nvPr>
+        </p:nvSpPr>
+        <p:spPr/>
+        <p:txBody>
+          <a:bodyPr/>
+          <a:lstStyle/>
+          <a:p>
+            <a:r>
+              <a:rPr lang="pt-PT" sz="16600" dirty="0"/>
+              <a:t>04</a:t>
+            </a:r>
+          </a:p>
+        </p:txBody>
+      </p:sp>
+      <p:sp>
+        <p:nvSpPr>
+          <p:cNvPr id="4" name="Title 3"/>
           <p:cNvSpPr>
             <a:spLocks noGrp="1"/>
           </p:cNvSpPr>
           <p:nvPr>
             <p:ph type="title"/>
-          </p:nvPr>
-        </p:nvSpPr>
-        <p:spPr/>
-        <p:txBody>
-          <a:bodyPr/>
-          <a:lstStyle/>
-          <a:p>
-            <a:r>
-              <a:rPr lang="en-US" dirty="0"/>
-              <a:t>Dataset processing</a:t>
-            </a:r>
-            <a:endParaRPr lang="pt-PT" dirty="0"/>
-          </a:p>
-        </p:txBody>
-      </p:sp>
-      <p:sp>
-        <p:nvSpPr>
-          <p:cNvPr id="3" name="Content Placeholder 2"/>
-          <p:cNvSpPr>
-            <a:spLocks noGrp="1"/>
-          </p:cNvSpPr>
-          <p:nvPr>
-            <p:ph idx="1"/>
           </p:nvPr>
         </p:nvSpPr>
         <p:spPr>
           <a:xfrm>
-            <a:off x="457200" y="1094346"/>
-            <a:ext cx="8229600" cy="5214974"/>
+            <a:off x="2281222" y="3214686"/>
+            <a:ext cx="6786578" cy="3033714"/>
           </a:xfrm>
+          <a:solidFill>
+            <a:srgbClr val="FFFFFF">
+              <a:alpha val="80000"/>
+            </a:srgbClr>
+          </a:solidFill>
         </p:spPr>
         <p:txBody>
-          <a:bodyPr>
+          <a:bodyPr rIns="288000">
             <a:noAutofit/>
           </a:bodyPr>
           <a:lstStyle/>
           <a:p>
-            <a:r>
-              <a:rPr lang="en-US" sz="4000" dirty="0"/>
-              <a:t>Problems found:</a:t>
-            </a:r>
-          </a:p>
-          <a:p>
-            <a:pPr lvl="1"/>
-            <a:r>
-              <a:rPr lang="en-US" sz="3600" dirty="0"/>
-              <a:t>Problem 1</a:t>
-            </a:r>
-          </a:p>
-          <a:p>
-            <a:pPr lvl="1"/>
-            <a:r>
-              <a:rPr lang="en-US" sz="3600" dirty="0"/>
-              <a:t>Solution</a:t>
-            </a:r>
-          </a:p>
-          <a:p>
-            <a:pPr lvl="1"/>
-            <a:endParaRPr lang="en-US" sz="3600" dirty="0"/>
-          </a:p>
-          <a:p>
-            <a:pPr lvl="1"/>
-            <a:r>
-              <a:rPr lang="en-US" sz="3600" dirty="0"/>
-              <a:t>Problem 2</a:t>
-            </a:r>
-          </a:p>
-          <a:p>
-            <a:pPr lvl="1"/>
-            <a:r>
-              <a:rPr lang="en-US" sz="3600" dirty="0"/>
-              <a:t>Solution</a:t>
-            </a:r>
-            <a:endParaRPr lang="en-US" sz="4000" dirty="0"/>
-          </a:p>
-          <a:p>
-            <a:endParaRPr lang="en-US" sz="4000" dirty="0"/>
+            <a:pPr marL="0" algn="r"/>
+            <a:r>
+              <a:rPr lang="pt-PT" sz="6000" dirty="0" err="1"/>
+              <a:t>Dataset</a:t>
+            </a:r>
+            <a:r>
+              <a:rPr lang="pt-PT" sz="6000" dirty="0"/>
+              <a:t> </a:t>
+            </a:r>
+            <a:r>
+              <a:rPr lang="pt-PT" sz="6000" dirty="0" err="1"/>
+              <a:t>processing</a:t>
+            </a:r>
+            <a:endParaRPr lang="pt-PT" sz="6000" dirty="0"/>
           </a:p>
         </p:txBody>
       </p:sp>
     </p:spTree>
     <p:extLst>
       <p:ext uri="{BB962C8B-B14F-4D97-AF65-F5344CB8AC3E}">
-        <p14:creationId xmlns:p14="http://schemas.microsoft.com/office/powerpoint/2010/main" val="2665434140"/>
+        <p14:creationId xmlns:p14="http://schemas.microsoft.com/office/powerpoint/2010/main" val="4045494449"/>
       </p:ext>
     </p:extLst>
   </p:cSld>
@@ -4704,12 +4968,12 @@
       </p:grpSpPr>
       <p:sp>
         <p:nvSpPr>
-          <p:cNvPr id="6" name="Text Placeholder 5"/>
-          <p:cNvSpPr>
-            <a:spLocks noGrp="1"/>
-          </p:cNvSpPr>
-          <p:nvPr>
-            <p:ph type="body" sz="quarter" idx="11"/>
+          <p:cNvPr id="2" name="Title 1"/>
+          <p:cNvSpPr>
+            <a:spLocks noGrp="1"/>
+          </p:cNvSpPr>
+          <p:nvPr>
+            <p:ph type="title"/>
           </p:nvPr>
         </p:nvSpPr>
         <p:spPr/>
@@ -4717,72 +4981,178 @@
           <a:bodyPr/>
           <a:lstStyle/>
           <a:p>
-            <a:endParaRPr lang="en-US" dirty="0"/>
-          </a:p>
-        </p:txBody>
-      </p:sp>
-      <p:sp>
-        <p:nvSpPr>
-          <p:cNvPr id="29" name="Text Placeholder 28"/>
-          <p:cNvSpPr>
-            <a:spLocks noGrp="1"/>
-          </p:cNvSpPr>
-          <p:nvPr>
-            <p:ph type="body" sz="quarter" idx="10"/>
-          </p:nvPr>
-        </p:nvSpPr>
-        <p:spPr/>
-        <p:txBody>
-          <a:bodyPr/>
-          <a:lstStyle/>
-          <a:p>
-            <a:r>
-              <a:rPr lang="pt-PT" sz="16600" dirty="0"/>
-              <a:t>05</a:t>
-            </a:r>
-          </a:p>
-        </p:txBody>
-      </p:sp>
-      <p:sp>
-        <p:nvSpPr>
-          <p:cNvPr id="4" name="Title 3"/>
-          <p:cNvSpPr>
-            <a:spLocks noGrp="1"/>
-          </p:cNvSpPr>
-          <p:nvPr>
-            <p:ph type="title"/>
+            <a:r>
+              <a:rPr lang="en-US" dirty="0"/>
+              <a:t>Dataset processing</a:t>
+            </a:r>
+            <a:endParaRPr lang="pt-PT" dirty="0"/>
+          </a:p>
+        </p:txBody>
+      </p:sp>
+      <p:sp>
+        <p:nvSpPr>
+          <p:cNvPr id="3" name="Content Placeholder 2"/>
+          <p:cNvSpPr>
+            <a:spLocks noGrp="1"/>
+          </p:cNvSpPr>
+          <p:nvPr>
+            <p:ph idx="1"/>
           </p:nvPr>
         </p:nvSpPr>
         <p:spPr>
           <a:xfrm>
-            <a:off x="2281222" y="3214686"/>
-            <a:ext cx="6786578" cy="3033714"/>
+            <a:off x="457200" y="1094346"/>
+            <a:ext cx="8229600" cy="5214974"/>
           </a:xfrm>
-          <a:solidFill>
-            <a:srgbClr val="FFFFFF">
-              <a:alpha val="80000"/>
-            </a:srgbClr>
-          </a:solidFill>
         </p:spPr>
         <p:txBody>
-          <a:bodyPr rIns="288000">
+          <a:bodyPr>
             <a:noAutofit/>
           </a:bodyPr>
           <a:lstStyle/>
           <a:p>
-            <a:pPr marL="0" algn="r"/>
-            <a:r>
-              <a:rPr lang="pt-PT" sz="6000" dirty="0" err="1"/>
-              <a:t>Mapping</a:t>
-            </a:r>
-            <a:endParaRPr lang="pt-PT" sz="6000" dirty="0"/>
+            <a:r>
+              <a:rPr lang="en-US" sz="4000" dirty="0"/>
+              <a:t>Dataset cleaning description</a:t>
+            </a:r>
+          </a:p>
+          <a:p>
+            <a:pPr lvl="1" eaLnBrk="0" fontAlgn="base" hangingPunct="0">
+              <a:spcBef>
+                <a:spcPct val="0"/>
+              </a:spcBef>
+              <a:spcAft>
+                <a:spcPct val="0"/>
+              </a:spcAft>
+              <a:buFont typeface="Arial" panose="020B0604020202020204" pitchFamily="34" charset="0"/>
+              <a:buChar char="•"/>
+            </a:pPr>
+            <a:r>
+              <a:rPr lang="en-GB" altLang="en-US" sz="2500" b="0" dirty="0">
+                <a:solidFill>
+                  <a:schemeClr val="tx1"/>
+                </a:solidFill>
+              </a:rPr>
+              <a:t>Clean</a:t>
+            </a:r>
+          </a:p>
+          <a:p>
+            <a:pPr lvl="1" eaLnBrk="0" fontAlgn="base" hangingPunct="0">
+              <a:spcBef>
+                <a:spcPct val="0"/>
+              </a:spcBef>
+              <a:spcAft>
+                <a:spcPct val="0"/>
+              </a:spcAft>
+              <a:buFont typeface="Arial" panose="020B0604020202020204" pitchFamily="34" charset="0"/>
+              <a:buChar char="•"/>
+            </a:pPr>
+            <a:r>
+              <a:rPr lang="en-GB" altLang="en-US" sz="2500" dirty="0"/>
+              <a:t>S</a:t>
+            </a:r>
+            <a:r>
+              <a:rPr lang="en-GB" altLang="en-US" sz="2500" b="0" dirty="0">
+                <a:solidFill>
+                  <a:schemeClr val="tx1"/>
+                </a:solidFill>
+              </a:rPr>
+              <a:t>tandardize</a:t>
+            </a:r>
+          </a:p>
+          <a:p>
+            <a:pPr lvl="1" eaLnBrk="0" fontAlgn="base" hangingPunct="0">
+              <a:spcBef>
+                <a:spcPct val="0"/>
+              </a:spcBef>
+              <a:spcAft>
+                <a:spcPct val="0"/>
+              </a:spcAft>
+              <a:buFont typeface="Arial" panose="020B0604020202020204" pitchFamily="34" charset="0"/>
+              <a:buChar char="•"/>
+            </a:pPr>
+            <a:r>
+              <a:rPr lang="en-GB" altLang="en-US" sz="2500" b="0" dirty="0">
+                <a:solidFill>
+                  <a:schemeClr val="tx1"/>
+                </a:solidFill>
+              </a:rPr>
+              <a:t>Clean unwanted attributes</a:t>
+            </a:r>
+          </a:p>
+          <a:p>
+            <a:pPr lvl="1" eaLnBrk="0" fontAlgn="base" hangingPunct="0">
+              <a:spcBef>
+                <a:spcPct val="0"/>
+              </a:spcBef>
+              <a:spcAft>
+                <a:spcPct val="0"/>
+              </a:spcAft>
+              <a:buFont typeface="Arial" panose="020B0604020202020204" pitchFamily="34" charset="0"/>
+              <a:buChar char="•"/>
+            </a:pPr>
+            <a:r>
+              <a:rPr lang="en-GB" altLang="en-US" sz="2500" dirty="0"/>
+              <a:t>Standardize unknown </a:t>
+            </a:r>
+            <a:r>
+              <a:rPr lang="en-GB" altLang="en-US" sz="2500" b="0" dirty="0">
+                <a:solidFill>
+                  <a:schemeClr val="tx1"/>
+                </a:solidFill>
+              </a:rPr>
+              <a:t>cell values</a:t>
+            </a:r>
+          </a:p>
+          <a:p>
+            <a:pPr lvl="1" eaLnBrk="0" fontAlgn="base" hangingPunct="0">
+              <a:spcBef>
+                <a:spcPct val="0"/>
+              </a:spcBef>
+              <a:spcAft>
+                <a:spcPct val="0"/>
+              </a:spcAft>
+              <a:buFont typeface="Arial" panose="020B0604020202020204" pitchFamily="34" charset="0"/>
+              <a:buChar char="•"/>
+            </a:pPr>
+            <a:r>
+              <a:rPr lang="en-GB" altLang="en-US" sz="2500" b="0" dirty="0">
+                <a:solidFill>
+                  <a:schemeClr val="tx1"/>
+                </a:solidFill>
+              </a:rPr>
+              <a:t>Sort rows</a:t>
+            </a:r>
+          </a:p>
+          <a:p>
+            <a:pPr lvl="1" eaLnBrk="0" fontAlgn="base" hangingPunct="0">
+              <a:spcBef>
+                <a:spcPct val="0"/>
+              </a:spcBef>
+              <a:spcAft>
+                <a:spcPct val="0"/>
+              </a:spcAft>
+              <a:buFont typeface="Arial" panose="020B0604020202020204" pitchFamily="34" charset="0"/>
+              <a:buChar char="•"/>
+            </a:pPr>
+            <a:r>
+              <a:rPr lang="en-GB" altLang="en-US" sz="2500" b="0" dirty="0">
+                <a:solidFill>
+                  <a:schemeClr val="tx1"/>
+                </a:solidFill>
+              </a:rPr>
+              <a:t>Average by country</a:t>
+            </a:r>
+          </a:p>
+          <a:p>
+            <a:endParaRPr lang="en-US" sz="4000" dirty="0"/>
           </a:p>
         </p:txBody>
       </p:sp>
     </p:spTree>
     <p:extLst>
       <p:ext uri="{BB962C8B-B14F-4D97-AF65-F5344CB8AC3E}">
-        <p14:creationId xmlns:p14="http://schemas.microsoft.com/office/powerpoint/2010/main" val="2312607420"/>
+        <p14:creationId xmlns:p14="http://schemas.microsoft.com/office/powerpoint/2010/main" val="3456915046"/>
       </p:ext>
     </p:extLst>
   </p:cSld>
@@ -4826,7 +5196,7 @@
           <a:p>
             <a:r>
               <a:rPr lang="en-US" dirty="0"/>
-              <a:t>Mapping</a:t>
+              <a:t>Dataset processing</a:t>
             </a:r>
             <a:endParaRPr lang="pt-PT" dirty="0"/>
           </a:p>
@@ -4834,7 +5204,7 @@
       </p:sp>
       <p:sp>
         <p:nvSpPr>
-          <p:cNvPr id="5" name="Content Placeholder 2"/>
+          <p:cNvPr id="3" name="Content Placeholder 2"/>
           <p:cNvSpPr>
             <a:spLocks noGrp="1"/>
           </p:cNvSpPr>
@@ -4856,46 +5226,338 @@
           <a:p>
             <a:r>
               <a:rPr lang="en-US" sz="4000" dirty="0"/>
-              <a:t>Question 1</a:t>
+              <a:t>Problems found:</a:t>
+            </a:r>
+          </a:p>
+          <a:p>
+            <a:pPr marL="800100" lvl="1" indent="-342900">
+              <a:buFont typeface="Arial" panose="020B0604020202020204" pitchFamily="34" charset="0"/>
+              <a:buChar char="•"/>
+            </a:pPr>
+            <a:r>
+              <a:rPr lang="en-US" sz="2500" dirty="0"/>
+              <a:t>Gaps in years</a:t>
             </a:r>
           </a:p>
           <a:p>
             <a:pPr lvl="1"/>
             <a:r>
-              <a:rPr lang="en-US" sz="3600" dirty="0"/>
-              <a:t>Data</a:t>
-            </a:r>
+              <a:rPr lang="en-US" sz="2500" dirty="0"/>
+              <a:t>Solution: Only use data from corresponding years when merging data.</a:t>
+            </a:r>
+          </a:p>
+          <a:p>
+            <a:pPr marL="800100" lvl="1" indent="-342900">
+              <a:buFont typeface="Arial" panose="020B0604020202020204" pitchFamily="34" charset="0"/>
+              <a:buChar char="•"/>
+            </a:pPr>
+            <a:r>
+              <a:rPr lang="en-US" sz="2500" dirty="0"/>
+              <a:t>Lack of data</a:t>
+            </a:r>
+          </a:p>
+          <a:p>
+            <a:pPr lvl="1"/>
+            <a:r>
+              <a:rPr lang="en-US" sz="2500" dirty="0"/>
+              <a:t>Solution: </a:t>
+            </a:r>
+          </a:p>
+          <a:p>
+            <a:pPr marL="800100" lvl="1" indent="-342900">
+              <a:buFont typeface="Arial" panose="020B0604020202020204" pitchFamily="34" charset="0"/>
+              <a:buChar char="•"/>
+            </a:pPr>
+            <a:endParaRPr lang="en-US" sz="2500" dirty="0"/>
+          </a:p>
+          <a:p>
+            <a:endParaRPr lang="en-US" sz="4000" dirty="0"/>
+          </a:p>
+        </p:txBody>
+      </p:sp>
+    </p:spTree>
+    <p:extLst>
+      <p:ext uri="{BB962C8B-B14F-4D97-AF65-F5344CB8AC3E}">
+        <p14:creationId xmlns:p14="http://schemas.microsoft.com/office/powerpoint/2010/main" val="2665434140"/>
+      </p:ext>
+    </p:extLst>
+  </p:cSld>
+  <p:clrMapOvr>
+    <a:masterClrMapping/>
+  </p:clrMapOvr>
+</p:sld>
+</file>
+
+<file path=ppt/slides/slide18.xml><?xml version="1.0" encoding="utf-8"?>
+<p:sld xmlns:a="http://schemas.openxmlformats.org/drawingml/2006/main" xmlns:r="http://schemas.openxmlformats.org/officeDocument/2006/relationships" xmlns:p="http://schemas.openxmlformats.org/presentationml/2006/main">
+  <p:cSld>
+    <p:spTree>
+      <p:nvGrpSpPr>
+        <p:cNvPr id="1" name=""/>
+        <p:cNvGrpSpPr/>
+        <p:nvPr/>
+      </p:nvGrpSpPr>
+      <p:grpSpPr>
+        <a:xfrm>
+          <a:off x="0" y="0"/>
+          <a:ext cx="0" cy="0"/>
+          <a:chOff x="0" y="0"/>
+          <a:chExt cx="0" cy="0"/>
+        </a:xfrm>
+      </p:grpSpPr>
+      <p:sp>
+        <p:nvSpPr>
+          <p:cNvPr id="6" name="Text Placeholder 5"/>
+          <p:cNvSpPr>
+            <a:spLocks noGrp="1"/>
+          </p:cNvSpPr>
+          <p:nvPr>
+            <p:ph type="body" sz="quarter" idx="11"/>
+          </p:nvPr>
+        </p:nvSpPr>
+        <p:spPr/>
+        <p:txBody>
+          <a:bodyPr/>
+          <a:lstStyle/>
+          <a:p>
+            <a:endParaRPr lang="en-US" dirty="0"/>
+          </a:p>
+        </p:txBody>
+      </p:sp>
+      <p:sp>
+        <p:nvSpPr>
+          <p:cNvPr id="29" name="Text Placeholder 28"/>
+          <p:cNvSpPr>
+            <a:spLocks noGrp="1"/>
+          </p:cNvSpPr>
+          <p:nvPr>
+            <p:ph type="body" sz="quarter" idx="10"/>
+          </p:nvPr>
+        </p:nvSpPr>
+        <p:spPr/>
+        <p:txBody>
+          <a:bodyPr/>
+          <a:lstStyle/>
+          <a:p>
+            <a:r>
+              <a:rPr lang="pt-PT" sz="16600" dirty="0"/>
+              <a:t>05</a:t>
+            </a:r>
+          </a:p>
+        </p:txBody>
+      </p:sp>
+      <p:sp>
+        <p:nvSpPr>
+          <p:cNvPr id="4" name="Title 3"/>
+          <p:cNvSpPr>
+            <a:spLocks noGrp="1"/>
+          </p:cNvSpPr>
+          <p:nvPr>
+            <p:ph type="title"/>
+          </p:nvPr>
+        </p:nvSpPr>
+        <p:spPr>
+          <a:xfrm>
+            <a:off x="2281222" y="3214686"/>
+            <a:ext cx="6786578" cy="3033714"/>
+          </a:xfrm>
+          <a:solidFill>
+            <a:srgbClr val="FFFFFF">
+              <a:alpha val="80000"/>
+            </a:srgbClr>
+          </a:solidFill>
+        </p:spPr>
+        <p:txBody>
+          <a:bodyPr rIns="288000">
+            <a:noAutofit/>
+          </a:bodyPr>
+          <a:lstStyle/>
+          <a:p>
+            <a:pPr marL="0" algn="r"/>
+            <a:r>
+              <a:rPr lang="pt-PT" sz="6000" dirty="0" err="1"/>
+              <a:t>Mapping</a:t>
+            </a:r>
+            <a:endParaRPr lang="pt-PT" sz="6000" dirty="0"/>
+          </a:p>
+        </p:txBody>
+      </p:sp>
+    </p:spTree>
+    <p:extLst>
+      <p:ext uri="{BB962C8B-B14F-4D97-AF65-F5344CB8AC3E}">
+        <p14:creationId xmlns:p14="http://schemas.microsoft.com/office/powerpoint/2010/main" val="2312607420"/>
+      </p:ext>
+    </p:extLst>
+  </p:cSld>
+  <p:clrMapOvr>
+    <a:masterClrMapping/>
+  </p:clrMapOvr>
+</p:sld>
+</file>
+
+<file path=ppt/slides/slide19.xml><?xml version="1.0" encoding="utf-8"?>
+<p:sld xmlns:a="http://schemas.openxmlformats.org/drawingml/2006/main" xmlns:r="http://schemas.openxmlformats.org/officeDocument/2006/relationships" xmlns:p="http://schemas.openxmlformats.org/presentationml/2006/main">
+  <p:cSld>
+    <p:spTree>
+      <p:nvGrpSpPr>
+        <p:cNvPr id="1" name=""/>
+        <p:cNvGrpSpPr/>
+        <p:nvPr/>
+      </p:nvGrpSpPr>
+      <p:grpSpPr>
+        <a:xfrm>
+          <a:off x="0" y="0"/>
+          <a:ext cx="0" cy="0"/>
+          <a:chOff x="0" y="0"/>
+          <a:chExt cx="0" cy="0"/>
+        </a:xfrm>
+      </p:grpSpPr>
+      <p:sp>
+        <p:nvSpPr>
+          <p:cNvPr id="2" name="Title 1"/>
+          <p:cNvSpPr>
+            <a:spLocks noGrp="1"/>
+          </p:cNvSpPr>
+          <p:nvPr>
+            <p:ph type="title"/>
+          </p:nvPr>
+        </p:nvSpPr>
+        <p:spPr/>
+        <p:txBody>
+          <a:bodyPr/>
+          <a:lstStyle/>
+          <a:p>
+            <a:r>
+              <a:rPr lang="en-US" dirty="0"/>
+              <a:t>Mapping</a:t>
+            </a:r>
+            <a:endParaRPr lang="pt-PT" dirty="0"/>
+          </a:p>
+        </p:txBody>
+      </p:sp>
+      <p:sp>
+        <p:nvSpPr>
+          <p:cNvPr id="5" name="Content Placeholder 2"/>
+          <p:cNvSpPr>
+            <a:spLocks noGrp="1"/>
+          </p:cNvSpPr>
+          <p:nvPr>
+            <p:ph idx="1"/>
+          </p:nvPr>
+        </p:nvSpPr>
+        <p:spPr>
+          <a:xfrm>
+            <a:off x="457200" y="1094346"/>
+            <a:ext cx="8229600" cy="5214974"/>
+          </a:xfrm>
+        </p:spPr>
+        <p:txBody>
+          <a:bodyPr>
+            <a:noAutofit/>
+          </a:bodyPr>
+          <a:lstStyle/>
+          <a:p>
+            <a:pPr lvl="0"/>
+            <a:r>
+              <a:rPr lang="en-GB" dirty="0"/>
+              <a:t>How many hours, in average, do the countries in EU spend reading?</a:t>
+            </a:r>
+            <a:endParaRPr lang="pt-PT" sz="2800" dirty="0"/>
           </a:p>
           <a:p>
             <a:pPr lvl="1"/>
             <a:endParaRPr lang="en-US" sz="3600" dirty="0"/>
           </a:p>
           <a:p>
-            <a:r>
-              <a:rPr lang="en-US" sz="4000" dirty="0"/>
-              <a:t>Question 2</a:t>
-            </a:r>
-          </a:p>
-          <a:p>
-            <a:pPr lvl="1"/>
-            <a:r>
-              <a:rPr lang="en-US" sz="3600" dirty="0"/>
-              <a:t>Data</a:t>
-            </a:r>
+            <a:pPr lvl="0"/>
+            <a:endParaRPr lang="en-GB" dirty="0"/>
+          </a:p>
+          <a:p>
+            <a:pPr lvl="0"/>
+            <a:r>
+              <a:rPr lang="en-GB" dirty="0"/>
+              <a:t>What is the average percentage of household expenditure in reading material by country?</a:t>
+            </a:r>
+            <a:endParaRPr lang="pt-PT" dirty="0"/>
           </a:p>
           <a:p>
             <a:pPr lvl="1"/>
             <a:endParaRPr lang="en-US" sz="3600" dirty="0"/>
           </a:p>
-          <a:p>
-            <a:r>
-              <a:rPr lang="en-US" sz="4000" dirty="0"/>
-              <a:t>…</a:t>
-            </a:r>
-            <a:endParaRPr lang="en-US" sz="4400" dirty="0"/>
-          </a:p>
-        </p:txBody>
-      </p:sp>
+        </p:txBody>
+      </p:sp>
+      <p:pic>
+        <p:nvPicPr>
+          <p:cNvPr id="4" name="Imagem 3" descr="Uma imagem com preto, sentado, vermelho, rua&#10;&#10;Descrição gerada automaticamente">
+            <a:extLst>
+              <a:ext uri="{FF2B5EF4-FFF2-40B4-BE49-F238E27FC236}">
+                <a16:creationId xmlns:a16="http://schemas.microsoft.com/office/drawing/2014/main" id="{63FC7291-E8AA-40CE-B547-EE378A810559}"/>
+              </a:ext>
+            </a:extLst>
+          </p:cNvPr>
+          <p:cNvPicPr>
+            <a:picLocks noChangeAspect="1"/>
+          </p:cNvPicPr>
+          <p:nvPr/>
+        </p:nvPicPr>
+        <p:blipFill>
+          <a:blip r:embed="rId3">
+            <a:extLst>
+              <a:ext uri="{28A0092B-C50C-407E-A947-70E740481C1C}">
+                <a14:useLocalDpi xmlns:a14="http://schemas.microsoft.com/office/drawing/2010/main" val="0"/>
+              </a:ext>
+            </a:extLst>
+          </a:blip>
+          <a:stretch>
+            <a:fillRect/>
+          </a:stretch>
+        </p:blipFill>
+        <p:spPr>
+          <a:xfrm>
+            <a:off x="932384" y="2348880"/>
+            <a:ext cx="7279200" cy="816053"/>
+          </a:xfrm>
+          <a:prstGeom prst="rect">
+            <a:avLst/>
+          </a:prstGeom>
+        </p:spPr>
+      </p:pic>
+      <p:pic>
+        <p:nvPicPr>
+          <p:cNvPr id="7" name="Imagem 6" descr="Uma imagem com exterior, texto, sentado, mesa&#10;&#10;Descrição gerada automaticamente">
+            <a:extLst>
+              <a:ext uri="{FF2B5EF4-FFF2-40B4-BE49-F238E27FC236}">
+                <a16:creationId xmlns:a16="http://schemas.microsoft.com/office/drawing/2014/main" id="{913F0F15-5076-463F-A556-443B0000306C}"/>
+              </a:ext>
+            </a:extLst>
+          </p:cNvPr>
+          <p:cNvPicPr>
+            <a:picLocks noChangeAspect="1"/>
+          </p:cNvPicPr>
+          <p:nvPr/>
+        </p:nvPicPr>
+        <p:blipFill>
+          <a:blip r:embed="rId4">
+            <a:extLst>
+              <a:ext uri="{28A0092B-C50C-407E-A947-70E740481C1C}">
+                <a14:useLocalDpi xmlns:a14="http://schemas.microsoft.com/office/drawing/2010/main" val="0"/>
+              </a:ext>
+            </a:extLst>
+          </a:blip>
+          <a:stretch>
+            <a:fillRect/>
+          </a:stretch>
+        </p:blipFill>
+        <p:spPr>
+          <a:xfrm>
+            <a:off x="932384" y="4869160"/>
+            <a:ext cx="7279200" cy="1001933"/>
+          </a:xfrm>
+          <a:prstGeom prst="rect">
+            <a:avLst/>
+          </a:prstGeom>
+        </p:spPr>
+      </p:pic>
     </p:spTree>
     <p:extLst>
       <p:ext uri="{BB962C8B-B14F-4D97-AF65-F5344CB8AC3E}">
@@ -5003,6 +5665,601 @@
         </p:txBody>
       </p:sp>
     </p:spTree>
+  </p:cSld>
+  <p:clrMapOvr>
+    <a:masterClrMapping/>
+  </p:clrMapOvr>
+</p:sld>
+</file>
+
+<file path=ppt/slides/slide20.xml><?xml version="1.0" encoding="utf-8"?>
+<p:sld xmlns:a="http://schemas.openxmlformats.org/drawingml/2006/main" xmlns:r="http://schemas.openxmlformats.org/officeDocument/2006/relationships" xmlns:p="http://schemas.openxmlformats.org/presentationml/2006/main">
+  <p:cSld>
+    <p:spTree>
+      <p:nvGrpSpPr>
+        <p:cNvPr id="1" name=""/>
+        <p:cNvGrpSpPr/>
+        <p:nvPr/>
+      </p:nvGrpSpPr>
+      <p:grpSpPr>
+        <a:xfrm>
+          <a:off x="0" y="0"/>
+          <a:ext cx="0" cy="0"/>
+          <a:chOff x="0" y="0"/>
+          <a:chExt cx="0" cy="0"/>
+        </a:xfrm>
+      </p:grpSpPr>
+      <p:sp>
+        <p:nvSpPr>
+          <p:cNvPr id="2" name="Título 1">
+            <a:extLst>
+              <a:ext uri="{FF2B5EF4-FFF2-40B4-BE49-F238E27FC236}">
+                <a16:creationId xmlns:a16="http://schemas.microsoft.com/office/drawing/2014/main" id="{B457D619-A916-42CF-99B5-EBFB7CC47714}"/>
+              </a:ext>
+            </a:extLst>
+          </p:cNvPr>
+          <p:cNvSpPr>
+            <a:spLocks noGrp="1"/>
+          </p:cNvSpPr>
+          <p:nvPr>
+            <p:ph type="title"/>
+          </p:nvPr>
+        </p:nvSpPr>
+        <p:spPr/>
+        <p:txBody>
+          <a:bodyPr/>
+          <a:lstStyle/>
+          <a:p>
+            <a:endParaRPr lang="en-US"/>
+          </a:p>
+        </p:txBody>
+      </p:sp>
+      <p:sp>
+        <p:nvSpPr>
+          <p:cNvPr id="3" name="Marcador de Posição de Conteúdo 2">
+            <a:extLst>
+              <a:ext uri="{FF2B5EF4-FFF2-40B4-BE49-F238E27FC236}">
+                <a16:creationId xmlns:a16="http://schemas.microsoft.com/office/drawing/2014/main" id="{A08E24C3-5C65-439E-A0C7-07D79E496221}"/>
+              </a:ext>
+            </a:extLst>
+          </p:cNvPr>
+          <p:cNvSpPr>
+            <a:spLocks noGrp="1"/>
+          </p:cNvSpPr>
+          <p:nvPr>
+            <p:ph idx="1"/>
+          </p:nvPr>
+        </p:nvSpPr>
+        <p:spPr/>
+        <p:txBody>
+          <a:bodyPr/>
+          <a:lstStyle/>
+          <a:p>
+            <a:r>
+              <a:rPr lang="en-GB" dirty="0"/>
+              <a:t>Given the reading habits of each country, what is the level of literacy of this country comparing to other EU countries?</a:t>
+            </a:r>
+            <a:endParaRPr lang="pt-PT" dirty="0"/>
+          </a:p>
+          <a:p>
+            <a:r>
+              <a:rPr lang="en-US" dirty="0">
+                <a:highlight>
+                  <a:srgbClr val="FFFF00"/>
+                </a:highlight>
+              </a:rPr>
+              <a:t>(</a:t>
+            </a:r>
+            <a:r>
+              <a:rPr lang="en-US" dirty="0" err="1">
+                <a:highlight>
+                  <a:srgbClr val="FFFF00"/>
+                </a:highlight>
+              </a:rPr>
+              <a:t>nao</a:t>
+            </a:r>
+            <a:r>
+              <a:rPr lang="en-US" dirty="0">
+                <a:highlight>
+                  <a:srgbClr val="FFFF00"/>
+                </a:highlight>
+              </a:rPr>
+              <a:t> </a:t>
+            </a:r>
+            <a:r>
+              <a:rPr lang="en-US" dirty="0" err="1">
+                <a:highlight>
+                  <a:srgbClr val="FFFF00"/>
+                </a:highlight>
+              </a:rPr>
+              <a:t>temos</a:t>
+            </a:r>
+            <a:r>
+              <a:rPr lang="en-US" dirty="0">
+                <a:highlight>
+                  <a:srgbClr val="FFFF00"/>
+                </a:highlight>
+              </a:rPr>
+              <a:t> </a:t>
+            </a:r>
+            <a:r>
+              <a:rPr lang="en-US" dirty="0" err="1">
+                <a:highlight>
+                  <a:srgbClr val="FFFF00"/>
+                </a:highlight>
+              </a:rPr>
+              <a:t>este</a:t>
+            </a:r>
+            <a:r>
+              <a:rPr lang="en-US" dirty="0">
+                <a:highlight>
+                  <a:srgbClr val="FFFF00"/>
+                </a:highlight>
+              </a:rPr>
+              <a:t>)</a:t>
+            </a:r>
+          </a:p>
+          <a:p>
+            <a:r>
+              <a:rPr lang="en-GB" dirty="0"/>
+              <a:t>Given a country’s reading habits, what is the rate of dropout?</a:t>
+            </a:r>
+            <a:endParaRPr lang="pt-PT" dirty="0"/>
+          </a:p>
+          <a:p>
+            <a:endParaRPr lang="en-US" dirty="0"/>
+          </a:p>
+        </p:txBody>
+      </p:sp>
+      <p:pic>
+        <p:nvPicPr>
+          <p:cNvPr id="5" name="Imagem 4">
+            <a:extLst>
+              <a:ext uri="{FF2B5EF4-FFF2-40B4-BE49-F238E27FC236}">
+                <a16:creationId xmlns:a16="http://schemas.microsoft.com/office/drawing/2014/main" id="{7CCF24EB-60E5-4149-A82F-94C0EBA19084}"/>
+              </a:ext>
+            </a:extLst>
+          </p:cNvPr>
+          <p:cNvPicPr>
+            <a:picLocks noChangeAspect="1"/>
+          </p:cNvPicPr>
+          <p:nvPr/>
+        </p:nvPicPr>
+        <p:blipFill>
+          <a:blip r:embed="rId2">
+            <a:extLst>
+              <a:ext uri="{28A0092B-C50C-407E-A947-70E740481C1C}">
+                <a14:useLocalDpi xmlns:a14="http://schemas.microsoft.com/office/drawing/2010/main" val="0"/>
+              </a:ext>
+            </a:extLst>
+          </a:blip>
+          <a:stretch>
+            <a:fillRect/>
+          </a:stretch>
+        </p:blipFill>
+        <p:spPr>
+          <a:xfrm>
+            <a:off x="932384" y="5790079"/>
+            <a:ext cx="7279200" cy="489801"/>
+          </a:xfrm>
+          <a:prstGeom prst="rect">
+            <a:avLst/>
+          </a:prstGeom>
+        </p:spPr>
+      </p:pic>
+      <p:pic>
+        <p:nvPicPr>
+          <p:cNvPr id="7" name="Imagem 6" descr="Uma imagem com preto, sentado, vermelho, rua&#10;&#10;Descrição gerada automaticamente">
+            <a:extLst>
+              <a:ext uri="{FF2B5EF4-FFF2-40B4-BE49-F238E27FC236}">
+                <a16:creationId xmlns:a16="http://schemas.microsoft.com/office/drawing/2014/main" id="{82324F10-2133-4CEE-B497-79E4E93E3D94}"/>
+              </a:ext>
+            </a:extLst>
+          </p:cNvPr>
+          <p:cNvPicPr>
+            <a:picLocks noChangeAspect="1"/>
+          </p:cNvPicPr>
+          <p:nvPr/>
+        </p:nvPicPr>
+        <p:blipFill>
+          <a:blip r:embed="rId3">
+            <a:extLst>
+              <a:ext uri="{28A0092B-C50C-407E-A947-70E740481C1C}">
+                <a14:useLocalDpi xmlns:a14="http://schemas.microsoft.com/office/drawing/2010/main" val="0"/>
+              </a:ext>
+            </a:extLst>
+          </a:blip>
+          <a:stretch>
+            <a:fillRect/>
+          </a:stretch>
+        </p:blipFill>
+        <p:spPr>
+          <a:xfrm>
+            <a:off x="932384" y="4753071"/>
+            <a:ext cx="7279200" cy="816054"/>
+          </a:xfrm>
+          <a:prstGeom prst="rect">
+            <a:avLst/>
+          </a:prstGeom>
+        </p:spPr>
+      </p:pic>
+    </p:spTree>
+    <p:extLst>
+      <p:ext uri="{BB962C8B-B14F-4D97-AF65-F5344CB8AC3E}">
+        <p14:creationId xmlns:p14="http://schemas.microsoft.com/office/powerpoint/2010/main" val="1344873098"/>
+      </p:ext>
+    </p:extLst>
+  </p:cSld>
+  <p:clrMapOvr>
+    <a:masterClrMapping/>
+  </p:clrMapOvr>
+</p:sld>
+</file>
+
+<file path=ppt/slides/slide21.xml><?xml version="1.0" encoding="utf-8"?>
+<p:sld xmlns:a="http://schemas.openxmlformats.org/drawingml/2006/main" xmlns:r="http://schemas.openxmlformats.org/officeDocument/2006/relationships" xmlns:p="http://schemas.openxmlformats.org/presentationml/2006/main">
+  <p:cSld>
+    <p:spTree>
+      <p:nvGrpSpPr>
+        <p:cNvPr id="1" name=""/>
+        <p:cNvGrpSpPr/>
+        <p:nvPr/>
+      </p:nvGrpSpPr>
+      <p:grpSpPr>
+        <a:xfrm>
+          <a:off x="0" y="0"/>
+          <a:ext cx="0" cy="0"/>
+          <a:chOff x="0" y="0"/>
+          <a:chExt cx="0" cy="0"/>
+        </a:xfrm>
+      </p:grpSpPr>
+      <p:sp>
+        <p:nvSpPr>
+          <p:cNvPr id="2" name="Título 1">
+            <a:extLst>
+              <a:ext uri="{FF2B5EF4-FFF2-40B4-BE49-F238E27FC236}">
+                <a16:creationId xmlns:a16="http://schemas.microsoft.com/office/drawing/2014/main" id="{ACB2D9AC-79F8-4DB0-8855-78D1CE555857}"/>
+              </a:ext>
+            </a:extLst>
+          </p:cNvPr>
+          <p:cNvSpPr>
+            <a:spLocks noGrp="1"/>
+          </p:cNvSpPr>
+          <p:nvPr>
+            <p:ph type="title"/>
+          </p:nvPr>
+        </p:nvSpPr>
+        <p:spPr/>
+        <p:txBody>
+          <a:bodyPr/>
+          <a:lstStyle/>
+          <a:p>
+            <a:endParaRPr lang="en-US"/>
+          </a:p>
+        </p:txBody>
+      </p:sp>
+      <p:sp>
+        <p:nvSpPr>
+          <p:cNvPr id="3" name="Marcador de Posição de Conteúdo 2">
+            <a:extLst>
+              <a:ext uri="{FF2B5EF4-FFF2-40B4-BE49-F238E27FC236}">
+                <a16:creationId xmlns:a16="http://schemas.microsoft.com/office/drawing/2014/main" id="{0D264FFD-1503-45FB-9CC5-C656EDB64C4C}"/>
+              </a:ext>
+            </a:extLst>
+          </p:cNvPr>
+          <p:cNvSpPr>
+            <a:spLocks noGrp="1"/>
+          </p:cNvSpPr>
+          <p:nvPr>
+            <p:ph idx="1"/>
+          </p:nvPr>
+        </p:nvSpPr>
+        <p:spPr/>
+        <p:txBody>
+          <a:bodyPr/>
+          <a:lstStyle/>
+          <a:p>
+            <a:r>
+              <a:rPr lang="en-GB" dirty="0"/>
+              <a:t>Is there a correlation between low habit of reading and the high academic success given a country?</a:t>
+            </a:r>
+            <a:endParaRPr lang="pt-PT" dirty="0"/>
+          </a:p>
+          <a:p>
+            <a:endParaRPr lang="en-US" dirty="0"/>
+          </a:p>
+          <a:p>
+            <a:endParaRPr lang="en-GB" dirty="0"/>
+          </a:p>
+          <a:p>
+            <a:endParaRPr lang="en-GB" dirty="0"/>
+          </a:p>
+        </p:txBody>
+      </p:sp>
+      <p:pic>
+        <p:nvPicPr>
+          <p:cNvPr id="5" name="Imagem 4" descr="Uma imagem com preto, sentado, vermelho, rua&#10;&#10;Descrição gerada automaticamente">
+            <a:extLst>
+              <a:ext uri="{FF2B5EF4-FFF2-40B4-BE49-F238E27FC236}">
+                <a16:creationId xmlns:a16="http://schemas.microsoft.com/office/drawing/2014/main" id="{A6EA04E5-1583-4033-A329-4AB6E71691EF}"/>
+              </a:ext>
+            </a:extLst>
+          </p:cNvPr>
+          <p:cNvPicPr>
+            <a:picLocks noChangeAspect="1"/>
+          </p:cNvPicPr>
+          <p:nvPr/>
+        </p:nvPicPr>
+        <p:blipFill>
+          <a:blip r:embed="rId2">
+            <a:extLst>
+              <a:ext uri="{28A0092B-C50C-407E-A947-70E740481C1C}">
+                <a14:useLocalDpi xmlns:a14="http://schemas.microsoft.com/office/drawing/2010/main" val="0"/>
+              </a:ext>
+            </a:extLst>
+          </a:blip>
+          <a:stretch>
+            <a:fillRect/>
+          </a:stretch>
+        </p:blipFill>
+        <p:spPr>
+          <a:xfrm>
+            <a:off x="932384" y="2924944"/>
+            <a:ext cx="7279200" cy="816054"/>
+          </a:xfrm>
+          <a:prstGeom prst="rect">
+            <a:avLst/>
+          </a:prstGeom>
+        </p:spPr>
+      </p:pic>
+      <p:pic>
+        <p:nvPicPr>
+          <p:cNvPr id="7" name="Imagem 6" descr="Uma imagem com preto, laranja, sentado, ecrã&#10;&#10;Descrição gerada automaticamente">
+            <a:extLst>
+              <a:ext uri="{FF2B5EF4-FFF2-40B4-BE49-F238E27FC236}">
+                <a16:creationId xmlns:a16="http://schemas.microsoft.com/office/drawing/2014/main" id="{192C922D-0498-4998-9F43-DBC7BD7A2D2E}"/>
+              </a:ext>
+            </a:extLst>
+          </p:cNvPr>
+          <p:cNvPicPr>
+            <a:picLocks noChangeAspect="1"/>
+          </p:cNvPicPr>
+          <p:nvPr/>
+        </p:nvPicPr>
+        <p:blipFill>
+          <a:blip r:embed="rId3">
+            <a:extLst>
+              <a:ext uri="{28A0092B-C50C-407E-A947-70E740481C1C}">
+                <a14:useLocalDpi xmlns:a14="http://schemas.microsoft.com/office/drawing/2010/main" val="0"/>
+              </a:ext>
+            </a:extLst>
+          </a:blip>
+          <a:stretch>
+            <a:fillRect/>
+          </a:stretch>
+        </p:blipFill>
+        <p:spPr>
+          <a:xfrm>
+            <a:off x="931725" y="4005064"/>
+            <a:ext cx="7279200" cy="923011"/>
+          </a:xfrm>
+          <a:prstGeom prst="rect">
+            <a:avLst/>
+          </a:prstGeom>
+        </p:spPr>
+      </p:pic>
+    </p:spTree>
+    <p:extLst>
+      <p:ext uri="{BB962C8B-B14F-4D97-AF65-F5344CB8AC3E}">
+        <p14:creationId xmlns:p14="http://schemas.microsoft.com/office/powerpoint/2010/main" val="2538618161"/>
+      </p:ext>
+    </p:extLst>
+  </p:cSld>
+  <p:clrMapOvr>
+    <a:masterClrMapping/>
+  </p:clrMapOvr>
+</p:sld>
+</file>
+
+<file path=ppt/slides/slide22.xml><?xml version="1.0" encoding="utf-8"?>
+<p:sld xmlns:a="http://schemas.openxmlformats.org/drawingml/2006/main" xmlns:r="http://schemas.openxmlformats.org/officeDocument/2006/relationships" xmlns:p="http://schemas.openxmlformats.org/presentationml/2006/main">
+  <p:cSld>
+    <p:spTree>
+      <p:nvGrpSpPr>
+        <p:cNvPr id="1" name=""/>
+        <p:cNvGrpSpPr/>
+        <p:nvPr/>
+      </p:nvGrpSpPr>
+      <p:grpSpPr>
+        <a:xfrm>
+          <a:off x="0" y="0"/>
+          <a:ext cx="0" cy="0"/>
+          <a:chOff x="0" y="0"/>
+          <a:chExt cx="0" cy="0"/>
+        </a:xfrm>
+      </p:grpSpPr>
+      <p:sp>
+        <p:nvSpPr>
+          <p:cNvPr id="2" name="Título 1">
+            <a:extLst>
+              <a:ext uri="{FF2B5EF4-FFF2-40B4-BE49-F238E27FC236}">
+                <a16:creationId xmlns:a16="http://schemas.microsoft.com/office/drawing/2014/main" id="{6D8F4238-C0CD-440B-88E5-4ACA21FEA2A6}"/>
+              </a:ext>
+            </a:extLst>
+          </p:cNvPr>
+          <p:cNvSpPr>
+            <a:spLocks noGrp="1"/>
+          </p:cNvSpPr>
+          <p:nvPr>
+            <p:ph type="title"/>
+          </p:nvPr>
+        </p:nvSpPr>
+        <p:spPr/>
+        <p:txBody>
+          <a:bodyPr/>
+          <a:lstStyle/>
+          <a:p>
+            <a:endParaRPr lang="en-US"/>
+          </a:p>
+        </p:txBody>
+      </p:sp>
+      <p:sp>
+        <p:nvSpPr>
+          <p:cNvPr id="3" name="Marcador de Posição de Conteúdo 2">
+            <a:extLst>
+              <a:ext uri="{FF2B5EF4-FFF2-40B4-BE49-F238E27FC236}">
+                <a16:creationId xmlns:a16="http://schemas.microsoft.com/office/drawing/2014/main" id="{B84D6E21-C229-4B1D-B523-FCC91E6721AF}"/>
+              </a:ext>
+            </a:extLst>
+          </p:cNvPr>
+          <p:cNvSpPr>
+            <a:spLocks noGrp="1"/>
+          </p:cNvSpPr>
+          <p:nvPr>
+            <p:ph idx="1"/>
+          </p:nvPr>
+        </p:nvSpPr>
+        <p:spPr/>
+        <p:txBody>
+          <a:bodyPr/>
+          <a:lstStyle/>
+          <a:p>
+            <a:r>
+              <a:rPr lang="en-GB" dirty="0"/>
+              <a:t>What is the (under)achievement of students in reading, mathematics and science?</a:t>
+            </a:r>
+          </a:p>
+          <a:p>
+            <a:r>
+              <a:rPr lang="en-GB" dirty="0">
+                <a:highlight>
+                  <a:srgbClr val="FFFF00"/>
+                </a:highlight>
+              </a:rPr>
+              <a:t>(</a:t>
+            </a:r>
+            <a:r>
+              <a:rPr lang="en-GB" dirty="0" err="1">
+                <a:highlight>
+                  <a:srgbClr val="FFFF00"/>
+                </a:highlight>
+              </a:rPr>
+              <a:t>nao</a:t>
+            </a:r>
+            <a:r>
+              <a:rPr lang="en-GB" dirty="0">
+                <a:highlight>
+                  <a:srgbClr val="FFFF00"/>
+                </a:highlight>
+              </a:rPr>
+              <a:t> </a:t>
+            </a:r>
+            <a:r>
+              <a:rPr lang="en-GB" dirty="0" err="1">
+                <a:highlight>
+                  <a:srgbClr val="FFFF00"/>
+                </a:highlight>
+              </a:rPr>
+              <a:t>temos</a:t>
+            </a:r>
+            <a:r>
+              <a:rPr lang="en-GB" dirty="0">
+                <a:highlight>
+                  <a:srgbClr val="FFFF00"/>
+                </a:highlight>
+              </a:rPr>
+              <a:t> </a:t>
+            </a:r>
+            <a:r>
+              <a:rPr lang="en-GB" dirty="0" err="1">
+                <a:highlight>
+                  <a:srgbClr val="FFFF00"/>
+                </a:highlight>
+              </a:rPr>
+              <a:t>este</a:t>
+            </a:r>
+            <a:r>
+              <a:rPr lang="en-GB" dirty="0">
+                <a:highlight>
+                  <a:srgbClr val="FFFF00"/>
+                </a:highlight>
+              </a:rPr>
+              <a:t>)</a:t>
+            </a:r>
+          </a:p>
+          <a:p>
+            <a:r>
+              <a:rPr lang="en-GB" dirty="0"/>
+              <a:t>What is the adult participation in learning after leaving the formal education?</a:t>
+            </a:r>
+            <a:endParaRPr lang="pt-PT" dirty="0"/>
+          </a:p>
+          <a:p>
+            <a:r>
+              <a:rPr lang="en-US" dirty="0">
+                <a:highlight>
+                  <a:srgbClr val="FFFF00"/>
+                </a:highlight>
+              </a:rPr>
+              <a:t>(</a:t>
+            </a:r>
+            <a:r>
+              <a:rPr lang="en-US" dirty="0" err="1">
+                <a:highlight>
+                  <a:srgbClr val="FFFF00"/>
+                </a:highlight>
+              </a:rPr>
+              <a:t>nao</a:t>
+            </a:r>
+            <a:r>
+              <a:rPr lang="en-US" dirty="0">
+                <a:highlight>
+                  <a:srgbClr val="FFFF00"/>
+                </a:highlight>
+              </a:rPr>
+              <a:t> </a:t>
+            </a:r>
+            <a:r>
+              <a:rPr lang="en-US" dirty="0" err="1">
+                <a:highlight>
+                  <a:srgbClr val="FFFF00"/>
+                </a:highlight>
+              </a:rPr>
+              <a:t>temos</a:t>
+            </a:r>
+            <a:r>
+              <a:rPr lang="en-US" dirty="0">
+                <a:highlight>
+                  <a:srgbClr val="FFFF00"/>
+                </a:highlight>
+              </a:rPr>
+              <a:t> </a:t>
+            </a:r>
+            <a:r>
+              <a:rPr lang="en-US" dirty="0" err="1">
+                <a:highlight>
+                  <a:srgbClr val="FFFF00"/>
+                </a:highlight>
+              </a:rPr>
+              <a:t>este</a:t>
+            </a:r>
+            <a:r>
+              <a:rPr lang="en-US" dirty="0">
+                <a:highlight>
+                  <a:srgbClr val="FFFF00"/>
+                </a:highlight>
+              </a:rPr>
+              <a:t>)</a:t>
+            </a:r>
+          </a:p>
+        </p:txBody>
+      </p:sp>
+    </p:spTree>
+    <p:extLst>
+      <p:ext uri="{BB962C8B-B14F-4D97-AF65-F5344CB8AC3E}">
+        <p14:creationId xmlns:p14="http://schemas.microsoft.com/office/powerpoint/2010/main" val="1171754539"/>
+      </p:ext>
+    </p:extLst>
   </p:cSld>
   <p:clrMapOvr>
     <a:masterClrMapping/>

</xml_diff>